<commit_message>
The last update UML diagram
</commit_message>
<xml_diff>
--- a/Restaurant Management System.pptx
+++ b/Restaurant Management System.pptx
@@ -8,7 +8,8 @@
     <p:sldId id="259" r:id="rId2"/>
     <p:sldId id="256" r:id="rId3"/>
     <p:sldId id="257" r:id="rId4"/>
-    <p:sldId id="258" r:id="rId5"/>
+    <p:sldId id="260" r:id="rId5"/>
+    <p:sldId id="258" r:id="rId6"/>
   </p:sldIdLst>
   <p:sldSz cx="12192000" cy="6858000"/>
   <p:notesSz cx="6858000" cy="9144000"/>
@@ -262,7 +263,7 @@
           <a:p>
             <a:fld id="{3F3F9029-F4B5-47A7-909F-C88AAA7C0C86}" type="datetimeFigureOut">
               <a:rPr lang="en-US" smtClean="0"/>
-              <a:t>6/27/2022</a:t>
+              <a:t>6/28/2022</a:t>
             </a:fld>
             <a:endParaRPr lang="en-US"/>
           </a:p>
@@ -460,7 +461,7 @@
           <a:p>
             <a:fld id="{3F3F9029-F4B5-47A7-909F-C88AAA7C0C86}" type="datetimeFigureOut">
               <a:rPr lang="en-US" smtClean="0"/>
-              <a:t>6/27/2022</a:t>
+              <a:t>6/28/2022</a:t>
             </a:fld>
             <a:endParaRPr lang="en-US"/>
           </a:p>
@@ -668,7 +669,7 @@
           <a:p>
             <a:fld id="{3F3F9029-F4B5-47A7-909F-C88AAA7C0C86}" type="datetimeFigureOut">
               <a:rPr lang="en-US" smtClean="0"/>
-              <a:t>6/27/2022</a:t>
+              <a:t>6/28/2022</a:t>
             </a:fld>
             <a:endParaRPr lang="en-US"/>
           </a:p>
@@ -866,7 +867,7 @@
           <a:p>
             <a:fld id="{3F3F9029-F4B5-47A7-909F-C88AAA7C0C86}" type="datetimeFigureOut">
               <a:rPr lang="en-US" smtClean="0"/>
-              <a:t>6/27/2022</a:t>
+              <a:t>6/28/2022</a:t>
             </a:fld>
             <a:endParaRPr lang="en-US"/>
           </a:p>
@@ -1141,7 +1142,7 @@
           <a:p>
             <a:fld id="{3F3F9029-F4B5-47A7-909F-C88AAA7C0C86}" type="datetimeFigureOut">
               <a:rPr lang="en-US" smtClean="0"/>
-              <a:t>6/27/2022</a:t>
+              <a:t>6/28/2022</a:t>
             </a:fld>
             <a:endParaRPr lang="en-US"/>
           </a:p>
@@ -1406,7 +1407,7 @@
           <a:p>
             <a:fld id="{3F3F9029-F4B5-47A7-909F-C88AAA7C0C86}" type="datetimeFigureOut">
               <a:rPr lang="en-US" smtClean="0"/>
-              <a:t>6/27/2022</a:t>
+              <a:t>6/28/2022</a:t>
             </a:fld>
             <a:endParaRPr lang="en-US"/>
           </a:p>
@@ -1818,7 +1819,7 @@
           <a:p>
             <a:fld id="{3F3F9029-F4B5-47A7-909F-C88AAA7C0C86}" type="datetimeFigureOut">
               <a:rPr lang="en-US" smtClean="0"/>
-              <a:t>6/27/2022</a:t>
+              <a:t>6/28/2022</a:t>
             </a:fld>
             <a:endParaRPr lang="en-US"/>
           </a:p>
@@ -1959,7 +1960,7 @@
           <a:p>
             <a:fld id="{3F3F9029-F4B5-47A7-909F-C88AAA7C0C86}" type="datetimeFigureOut">
               <a:rPr lang="en-US" smtClean="0"/>
-              <a:t>6/27/2022</a:t>
+              <a:t>6/28/2022</a:t>
             </a:fld>
             <a:endParaRPr lang="en-US"/>
           </a:p>
@@ -2072,7 +2073,7 @@
           <a:p>
             <a:fld id="{3F3F9029-F4B5-47A7-909F-C88AAA7C0C86}" type="datetimeFigureOut">
               <a:rPr lang="en-US" smtClean="0"/>
-              <a:t>6/27/2022</a:t>
+              <a:t>6/28/2022</a:t>
             </a:fld>
             <a:endParaRPr lang="en-US"/>
           </a:p>
@@ -2383,7 +2384,7 @@
           <a:p>
             <a:fld id="{3F3F9029-F4B5-47A7-909F-C88AAA7C0C86}" type="datetimeFigureOut">
               <a:rPr lang="en-US" smtClean="0"/>
-              <a:t>6/27/2022</a:t>
+              <a:t>6/28/2022</a:t>
             </a:fld>
             <a:endParaRPr lang="en-US"/>
           </a:p>
@@ -2671,7 +2672,7 @@
           <a:p>
             <a:fld id="{3F3F9029-F4B5-47A7-909F-C88AAA7C0C86}" type="datetimeFigureOut">
               <a:rPr lang="en-US" smtClean="0"/>
-              <a:t>6/27/2022</a:t>
+              <a:t>6/28/2022</a:t>
             </a:fld>
             <a:endParaRPr lang="en-US"/>
           </a:p>
@@ -2912,7 +2913,7 @@
           <a:p>
             <a:fld id="{3F3F9029-F4B5-47A7-909F-C88AAA7C0C86}" type="datetimeFigureOut">
               <a:rPr lang="en-US" smtClean="0"/>
-              <a:t>6/27/2022</a:t>
+              <a:t>6/28/2022</a:t>
             </a:fld>
             <a:endParaRPr lang="en-US"/>
           </a:p>
@@ -3403,7 +3404,7 @@
           <p:nvPr>
             <p:extLst>
               <p:ext uri="{D42A27DB-BD31-4B8C-83A1-F6EECF244321}">
-                <p14:modId xmlns:p14="http://schemas.microsoft.com/office/powerpoint/2010/main" val="317245335"/>
+                <p14:modId xmlns:p14="http://schemas.microsoft.com/office/powerpoint/2010/main" val="3323521287"/>
               </p:ext>
             </p:extLst>
           </p:nvPr>
@@ -3499,13 +3500,95 @@
           <p:nvPr>
             <p:extLst>
               <p:ext uri="{D42A27DB-BD31-4B8C-83A1-F6EECF244321}">
-                <p14:modId xmlns:p14="http://schemas.microsoft.com/office/powerpoint/2010/main" val="2328337842"/>
+                <p14:modId xmlns:p14="http://schemas.microsoft.com/office/powerpoint/2010/main" val="149320406"/>
               </p:ext>
             </p:extLst>
           </p:nvPr>
         </p:nvGraphicFramePr>
         <p:xfrm>
-          <a:off x="7102763" y="719665"/>
+          <a:off x="7088903" y="377129"/>
+          <a:ext cx="3468255" cy="1387823"/>
+        </p:xfrm>
+        <a:graphic>
+          <a:graphicData uri="http://schemas.openxmlformats.org/drawingml/2006/table">
+            <a:tbl>
+              <a:tblPr firstRow="1" bandRow="1">
+                <a:tableStyleId>{5C22544A-7EE6-4342-B048-85BDC9FD1C3A}</a:tableStyleId>
+              </a:tblPr>
+              <a:tblGrid>
+                <a:gridCol w="3468255">
+                  <a:extLst>
+                    <a:ext uri="{9D8B030D-6E8A-4147-A177-3AD203B41FA5}">
+                      <a16:colId xmlns:a16="http://schemas.microsoft.com/office/drawing/2014/main" val="1419940822"/>
+                    </a:ext>
+                  </a:extLst>
+                </a:gridCol>
+              </a:tblGrid>
+              <a:tr h="454785">
+                <a:tc>
+                  <a:txBody>
+                    <a:bodyPr/>
+                    <a:lstStyle/>
+                    <a:p>
+                      <a:pPr algn="ctr"/>
+                      <a:r>
+                        <a:rPr lang="en-US" sz="2400" dirty="0" err="1"/>
+                        <a:t>HumanManagement</a:t>
+                      </a:r>
+                      <a:endParaRPr lang="en-US" sz="2400" dirty="0"/>
+                    </a:p>
+                  </a:txBody>
+                  <a:tcPr/>
+                </a:tc>
+                <a:extLst>
+                  <a:ext uri="{0D108BD9-81ED-4DB2-BD59-A6C34878D82A}">
+                    <a16:rowId xmlns:a16="http://schemas.microsoft.com/office/drawing/2014/main" val="1122576610"/>
+                  </a:ext>
+                </a:extLst>
+              </a:tr>
+              <a:tr h="930623">
+                <a:tc>
+                  <a:txBody>
+                    <a:bodyPr/>
+                    <a:lstStyle/>
+                    <a:p>
+                      <a:endParaRPr lang="en-US" dirty="0"/>
+                    </a:p>
+                  </a:txBody>
+                  <a:tcPr/>
+                </a:tc>
+                <a:extLst>
+                  <a:ext uri="{0D108BD9-81ED-4DB2-BD59-A6C34878D82A}">
+                    <a16:rowId xmlns:a16="http://schemas.microsoft.com/office/drawing/2014/main" val="1648744592"/>
+                  </a:ext>
+                </a:extLst>
+              </a:tr>
+            </a:tbl>
+          </a:graphicData>
+        </a:graphic>
+      </p:graphicFrame>
+      <p:graphicFrame>
+        <p:nvGraphicFramePr>
+          <p:cNvPr id="29" name="Table 28">
+            <a:extLst>
+              <a:ext uri="{FF2B5EF4-FFF2-40B4-BE49-F238E27FC236}">
+                <a16:creationId xmlns:a16="http://schemas.microsoft.com/office/drawing/2014/main" id="{8EA48DA8-9899-27E1-B0AA-6F4892C41DC9}"/>
+              </a:ext>
+            </a:extLst>
+          </p:cNvPr>
+          <p:cNvGraphicFramePr>
+            <a:graphicFrameLocks noGrp="1"/>
+          </p:cNvGraphicFramePr>
+          <p:nvPr>
+            <p:extLst>
+              <p:ext uri="{D42A27DB-BD31-4B8C-83A1-F6EECF244321}">
+                <p14:modId xmlns:p14="http://schemas.microsoft.com/office/powerpoint/2010/main" val="631160946"/>
+              </p:ext>
+            </p:extLst>
+          </p:nvPr>
+        </p:nvGraphicFramePr>
+        <p:xfrm>
+          <a:off x="7088902" y="1968642"/>
           <a:ext cx="3468255" cy="1427789"/>
         </p:xfrm>
         <a:graphic>
@@ -3531,88 +3614,6 @@
                     <a:p>
                       <a:pPr algn="ctr"/>
                       <a:r>
-                        <a:rPr lang="en-US" sz="2400" dirty="0" err="1"/>
-                        <a:t>HumanManagement</a:t>
-                      </a:r>
-                      <a:endParaRPr lang="en-US" sz="2400" dirty="0"/>
-                    </a:p>
-                  </a:txBody>
-                  <a:tcPr/>
-                </a:tc>
-                <a:extLst>
-                  <a:ext uri="{0D108BD9-81ED-4DB2-BD59-A6C34878D82A}">
-                    <a16:rowId xmlns:a16="http://schemas.microsoft.com/office/drawing/2014/main" val="1122576610"/>
-                  </a:ext>
-                </a:extLst>
-              </a:tr>
-              <a:tr h="959092">
-                <a:tc>
-                  <a:txBody>
-                    <a:bodyPr/>
-                    <a:lstStyle/>
-                    <a:p>
-                      <a:endParaRPr lang="en-US" dirty="0"/>
-                    </a:p>
-                  </a:txBody>
-                  <a:tcPr/>
-                </a:tc>
-                <a:extLst>
-                  <a:ext uri="{0D108BD9-81ED-4DB2-BD59-A6C34878D82A}">
-                    <a16:rowId xmlns:a16="http://schemas.microsoft.com/office/drawing/2014/main" val="1648744592"/>
-                  </a:ext>
-                </a:extLst>
-              </a:tr>
-            </a:tbl>
-          </a:graphicData>
-        </a:graphic>
-      </p:graphicFrame>
-      <p:graphicFrame>
-        <p:nvGraphicFramePr>
-          <p:cNvPr id="29" name="Table 28">
-            <a:extLst>
-              <a:ext uri="{FF2B5EF4-FFF2-40B4-BE49-F238E27FC236}">
-                <a16:creationId xmlns:a16="http://schemas.microsoft.com/office/drawing/2014/main" id="{8EA48DA8-9899-27E1-B0AA-6F4892C41DC9}"/>
-              </a:ext>
-            </a:extLst>
-          </p:cNvPr>
-          <p:cNvGraphicFramePr>
-            <a:graphicFrameLocks noGrp="1"/>
-          </p:cNvGraphicFramePr>
-          <p:nvPr>
-            <p:extLst>
-              <p:ext uri="{D42A27DB-BD31-4B8C-83A1-F6EECF244321}">
-                <p14:modId xmlns:p14="http://schemas.microsoft.com/office/powerpoint/2010/main" val="3936225054"/>
-              </p:ext>
-            </p:extLst>
-          </p:nvPr>
-        </p:nvGraphicFramePr>
-        <p:xfrm>
-          <a:off x="7102763" y="2715105"/>
-          <a:ext cx="3468255" cy="1427789"/>
-        </p:xfrm>
-        <a:graphic>
-          <a:graphicData uri="http://schemas.openxmlformats.org/drawingml/2006/table">
-            <a:tbl>
-              <a:tblPr firstRow="1" bandRow="1">
-                <a:tableStyleId>{5C22544A-7EE6-4342-B048-85BDC9FD1C3A}</a:tableStyleId>
-              </a:tblPr>
-              <a:tblGrid>
-                <a:gridCol w="3468255">
-                  <a:extLst>
-                    <a:ext uri="{9D8B030D-6E8A-4147-A177-3AD203B41FA5}">
-                      <a16:colId xmlns:a16="http://schemas.microsoft.com/office/drawing/2014/main" val="1419940822"/>
-                    </a:ext>
-                  </a:extLst>
-                </a:gridCol>
-              </a:tblGrid>
-              <a:tr h="468697">
-                <a:tc>
-                  <a:txBody>
-                    <a:bodyPr/>
-                    <a:lstStyle/>
-                    <a:p>
-                      <a:pPr algn="ctr"/>
-                      <a:r>
                         <a:rPr lang="en-US" sz="2400" dirty="0"/>
                         <a:t>Address</a:t>
                       </a:r>
@@ -3679,13 +3680,13 @@
           <p:nvPr>
             <p:extLst>
               <p:ext uri="{D42A27DB-BD31-4B8C-83A1-F6EECF244321}">
-                <p14:modId xmlns:p14="http://schemas.microsoft.com/office/powerpoint/2010/main" val="2435026843"/>
+                <p14:modId xmlns:p14="http://schemas.microsoft.com/office/powerpoint/2010/main" val="2411681101"/>
               </p:ext>
             </p:extLst>
           </p:nvPr>
         </p:nvGraphicFramePr>
         <p:xfrm>
-          <a:off x="7102763" y="4710545"/>
+          <a:off x="7088902" y="5146577"/>
           <a:ext cx="3468255" cy="1427789"/>
         </p:xfrm>
         <a:graphic>
@@ -3880,7 +3881,7 @@
         </p:nvCxnSpPr>
         <p:spPr>
           <a:xfrm>
-            <a:off x="6197596" y="3608724"/>
+            <a:off x="6197596" y="2906358"/>
             <a:ext cx="891307" cy="0"/>
           </a:xfrm>
           <a:prstGeom prst="line">
@@ -3954,7 +3955,7 @@
         </p:nvSpPr>
         <p:spPr>
           <a:xfrm flipH="1">
-            <a:off x="6707444" y="3308667"/>
+            <a:off x="6693599" y="2497870"/>
             <a:ext cx="409164" cy="369332"/>
           </a:xfrm>
           <a:prstGeom prst="rect">
@@ -3975,6 +3976,130 @@
           </a:p>
         </p:txBody>
       </p:sp>
+      <p:graphicFrame>
+        <p:nvGraphicFramePr>
+          <p:cNvPr id="12" name="Table 11">
+            <a:extLst>
+              <a:ext uri="{FF2B5EF4-FFF2-40B4-BE49-F238E27FC236}">
+                <a16:creationId xmlns:a16="http://schemas.microsoft.com/office/drawing/2014/main" id="{1B362FF9-1965-2DEC-7CD4-2FF2D0E0BA5F}"/>
+              </a:ext>
+            </a:extLst>
+          </p:cNvPr>
+          <p:cNvGraphicFramePr>
+            <a:graphicFrameLocks noGrp="1"/>
+          </p:cNvGraphicFramePr>
+          <p:nvPr>
+            <p:extLst>
+              <p:ext uri="{D42A27DB-BD31-4B8C-83A1-F6EECF244321}">
+                <p14:modId xmlns:p14="http://schemas.microsoft.com/office/powerpoint/2010/main" val="256370662"/>
+              </p:ext>
+            </p:extLst>
+          </p:nvPr>
+        </p:nvGraphicFramePr>
+        <p:xfrm>
+          <a:off x="7116609" y="3488074"/>
+          <a:ext cx="3392366" cy="1427789"/>
+        </p:xfrm>
+        <a:graphic>
+          <a:graphicData uri="http://schemas.openxmlformats.org/drawingml/2006/table">
+            <a:tbl>
+              <a:tblPr firstRow="1" bandRow="1">
+                <a:tableStyleId>{5C22544A-7EE6-4342-B048-85BDC9FD1C3A}</a:tableStyleId>
+              </a:tblPr>
+              <a:tblGrid>
+                <a:gridCol w="3392366">
+                  <a:extLst>
+                    <a:ext uri="{9D8B030D-6E8A-4147-A177-3AD203B41FA5}">
+                      <a16:colId xmlns:a16="http://schemas.microsoft.com/office/drawing/2014/main" val="1419940822"/>
+                    </a:ext>
+                  </a:extLst>
+                </a:gridCol>
+              </a:tblGrid>
+              <a:tr h="468697">
+                <a:tc>
+                  <a:txBody>
+                    <a:bodyPr/>
+                    <a:lstStyle/>
+                    <a:p>
+                      <a:pPr algn="ctr"/>
+                      <a:r>
+                        <a:rPr lang="en-US" sz="2400" dirty="0" err="1"/>
+                        <a:t>StockManagement</a:t>
+                      </a:r>
+                      <a:endParaRPr lang="en-US" sz="2400" dirty="0"/>
+                    </a:p>
+                  </a:txBody>
+                  <a:tcPr/>
+                </a:tc>
+                <a:extLst>
+                  <a:ext uri="{0D108BD9-81ED-4DB2-BD59-A6C34878D82A}">
+                    <a16:rowId xmlns:a16="http://schemas.microsoft.com/office/drawing/2014/main" val="1122576610"/>
+                  </a:ext>
+                </a:extLst>
+              </a:tr>
+              <a:tr h="959092">
+                <a:tc>
+                  <a:txBody>
+                    <a:bodyPr/>
+                    <a:lstStyle/>
+                    <a:p>
+                      <a:pPr marL="0" indent="0">
+                        <a:buFontTx/>
+                        <a:buNone/>
+                      </a:pPr>
+                      <a:endParaRPr lang="en-US" dirty="0"/>
+                    </a:p>
+                  </a:txBody>
+                  <a:tcPr/>
+                </a:tc>
+                <a:extLst>
+                  <a:ext uri="{0D108BD9-81ED-4DB2-BD59-A6C34878D82A}">
+                    <a16:rowId xmlns:a16="http://schemas.microsoft.com/office/drawing/2014/main" val="1648744592"/>
+                  </a:ext>
+                </a:extLst>
+              </a:tr>
+            </a:tbl>
+          </a:graphicData>
+        </a:graphic>
+      </p:graphicFrame>
+      <p:cxnSp>
+        <p:nvCxnSpPr>
+          <p:cNvPr id="14" name="Straight Connector 13">
+            <a:extLst>
+              <a:ext uri="{FF2B5EF4-FFF2-40B4-BE49-F238E27FC236}">
+                <a16:creationId xmlns:a16="http://schemas.microsoft.com/office/drawing/2014/main" id="{54F5CDF4-3C98-0DAA-8293-65F0F5A8BE95}"/>
+              </a:ext>
+            </a:extLst>
+          </p:cNvPr>
+          <p:cNvCxnSpPr>
+            <a:cxnSpLocks/>
+          </p:cNvCxnSpPr>
+          <p:nvPr/>
+        </p:nvCxnSpPr>
+        <p:spPr>
+          <a:xfrm>
+            <a:off x="6217476" y="3747872"/>
+            <a:ext cx="891307" cy="0"/>
+          </a:xfrm>
+          <a:prstGeom prst="line">
+            <a:avLst/>
+          </a:prstGeom>
+        </p:spPr>
+        <p:style>
+          <a:lnRef idx="1">
+            <a:schemeClr val="accent1"/>
+          </a:lnRef>
+          <a:fillRef idx="0">
+            <a:schemeClr val="accent1"/>
+          </a:fillRef>
+          <a:effectRef idx="0">
+            <a:schemeClr val="accent1"/>
+          </a:effectRef>
+          <a:fontRef idx="minor">
+            <a:schemeClr val="tx1"/>
+          </a:fontRef>
+        </p:style>
+      </p:cxnSp>
     </p:spTree>
     <p:extLst>
       <p:ext uri="{BB962C8B-B14F-4D97-AF65-F5344CB8AC3E}">
@@ -4020,13 +4145,13 @@
           <p:nvPr>
             <p:extLst>
               <p:ext uri="{D42A27DB-BD31-4B8C-83A1-F6EECF244321}">
-                <p14:modId xmlns:p14="http://schemas.microsoft.com/office/powerpoint/2010/main" val="3902708696"/>
+                <p14:modId xmlns:p14="http://schemas.microsoft.com/office/powerpoint/2010/main" val="714557291"/>
               </p:ext>
             </p:extLst>
           </p:nvPr>
         </p:nvGraphicFramePr>
         <p:xfrm>
-          <a:off x="2877127" y="110065"/>
+          <a:off x="4202343" y="110065"/>
           <a:ext cx="3468255" cy="1427789"/>
         </p:xfrm>
         <a:graphic>
@@ -4104,7 +4229,7 @@
         </p:nvCxnSpPr>
         <p:spPr>
           <a:xfrm>
-            <a:off x="1664855" y="4170218"/>
+            <a:off x="2990071" y="4170218"/>
             <a:ext cx="0" cy="664279"/>
           </a:xfrm>
           <a:prstGeom prst="line">
@@ -4141,13 +4266,13 @@
           <p:nvPr>
             <p:extLst>
               <p:ext uri="{D42A27DB-BD31-4B8C-83A1-F6EECF244321}">
-                <p14:modId xmlns:p14="http://schemas.microsoft.com/office/powerpoint/2010/main" val="3925589177"/>
+                <p14:modId xmlns:p14="http://schemas.microsoft.com/office/powerpoint/2010/main" val="462665107"/>
               </p:ext>
             </p:extLst>
           </p:nvPr>
         </p:nvGraphicFramePr>
         <p:xfrm>
-          <a:off x="447965" y="2022765"/>
+          <a:off x="1773181" y="2022765"/>
           <a:ext cx="2433780" cy="2147453"/>
         </p:xfrm>
         <a:graphic>
@@ -4268,13 +4393,13 @@
           <p:nvPr>
             <p:extLst>
               <p:ext uri="{D42A27DB-BD31-4B8C-83A1-F6EECF244321}">
-                <p14:modId xmlns:p14="http://schemas.microsoft.com/office/powerpoint/2010/main" val="502358581"/>
+                <p14:modId xmlns:p14="http://schemas.microsoft.com/office/powerpoint/2010/main" val="1613394278"/>
               </p:ext>
             </p:extLst>
           </p:nvPr>
         </p:nvGraphicFramePr>
         <p:xfrm>
-          <a:off x="447964" y="4876803"/>
+          <a:off x="1773180" y="4876803"/>
           <a:ext cx="2406072" cy="1662542"/>
         </p:xfrm>
         <a:graphic>
@@ -4393,13 +4518,13 @@
           <p:nvPr>
             <p:extLst>
               <p:ext uri="{D42A27DB-BD31-4B8C-83A1-F6EECF244321}">
-                <p14:modId xmlns:p14="http://schemas.microsoft.com/office/powerpoint/2010/main" val="2301510096"/>
+                <p14:modId xmlns:p14="http://schemas.microsoft.com/office/powerpoint/2010/main" val="4279268454"/>
               </p:ext>
             </p:extLst>
           </p:nvPr>
         </p:nvGraphicFramePr>
         <p:xfrm>
-          <a:off x="4518491" y="2022765"/>
+          <a:off x="5843707" y="2022765"/>
           <a:ext cx="1623290" cy="1074811"/>
         </p:xfrm>
         <a:graphic>
@@ -4479,13 +4604,13 @@
           <p:nvPr>
             <p:extLst>
               <p:ext uri="{D42A27DB-BD31-4B8C-83A1-F6EECF244321}">
-                <p14:modId xmlns:p14="http://schemas.microsoft.com/office/powerpoint/2010/main" val="3912106301"/>
+                <p14:modId xmlns:p14="http://schemas.microsoft.com/office/powerpoint/2010/main" val="2545414813"/>
               </p:ext>
             </p:extLst>
           </p:nvPr>
         </p:nvGraphicFramePr>
         <p:xfrm>
-          <a:off x="3394364" y="3989315"/>
+          <a:off x="4719580" y="3989315"/>
           <a:ext cx="2433780" cy="1074811"/>
         </p:xfrm>
         <a:graphic>
@@ -4569,7 +4694,7 @@
         </p:nvCxnSpPr>
         <p:spPr>
           <a:xfrm>
-            <a:off x="3519054" y="1537854"/>
+            <a:off x="4844270" y="1537854"/>
             <a:ext cx="0" cy="2451461"/>
           </a:xfrm>
           <a:prstGeom prst="line">
@@ -4607,7 +4732,7 @@
         </p:nvCxnSpPr>
         <p:spPr>
           <a:xfrm>
-            <a:off x="4987636" y="1590261"/>
+            <a:off x="6312852" y="1590261"/>
             <a:ext cx="0" cy="432504"/>
           </a:xfrm>
           <a:prstGeom prst="line">
@@ -4644,13 +4769,13 @@
           <p:nvPr>
             <p:extLst>
               <p:ext uri="{D42A27DB-BD31-4B8C-83A1-F6EECF244321}">
-                <p14:modId xmlns:p14="http://schemas.microsoft.com/office/powerpoint/2010/main" val="1149321031"/>
+                <p14:modId xmlns:p14="http://schemas.microsoft.com/office/powerpoint/2010/main" val="780451432"/>
               </p:ext>
             </p:extLst>
           </p:nvPr>
         </p:nvGraphicFramePr>
         <p:xfrm>
-          <a:off x="3394364" y="5406815"/>
+          <a:off x="4719580" y="5406815"/>
           <a:ext cx="2433780" cy="1341120"/>
         </p:xfrm>
         <a:graphic>
@@ -4779,7 +4904,7 @@
         </p:nvCxnSpPr>
         <p:spPr>
           <a:xfrm>
-            <a:off x="4006274" y="5056733"/>
+            <a:off x="5331490" y="5056733"/>
             <a:ext cx="0" cy="350082"/>
           </a:xfrm>
           <a:prstGeom prst="line">
@@ -4815,7 +4940,7 @@
         </p:nvSpPr>
         <p:spPr>
           <a:xfrm flipH="1">
-            <a:off x="1655157" y="4526720"/>
+            <a:off x="2980373" y="4526720"/>
             <a:ext cx="409164" cy="369332"/>
           </a:xfrm>
           <a:prstGeom prst="rect">
@@ -4850,7 +4975,7 @@
         </p:nvSpPr>
         <p:spPr>
           <a:xfrm flipH="1">
-            <a:off x="918784" y="4526720"/>
+            <a:off x="2244000" y="4526720"/>
             <a:ext cx="951579" cy="307777"/>
           </a:xfrm>
           <a:prstGeom prst="rect">
@@ -4885,7 +5010,7 @@
         </p:nvSpPr>
         <p:spPr>
           <a:xfrm flipH="1">
-            <a:off x="3241962" y="5166257"/>
+            <a:off x="4567178" y="5166257"/>
             <a:ext cx="951579" cy="307777"/>
           </a:xfrm>
           <a:prstGeom prst="rect">
@@ -4920,7 +5045,7 @@
         </p:nvSpPr>
         <p:spPr>
           <a:xfrm flipH="1">
-            <a:off x="4248039" y="5120018"/>
+            <a:off x="5573255" y="5120018"/>
             <a:ext cx="409164" cy="369332"/>
           </a:xfrm>
           <a:prstGeom prst="rect">
@@ -4957,7 +5082,7 @@
         </p:nvCxnSpPr>
         <p:spPr>
           <a:xfrm flipH="1" flipV="1">
-            <a:off x="2854036" y="3680205"/>
+            <a:off x="4179252" y="3680205"/>
             <a:ext cx="540328" cy="655725"/>
           </a:xfrm>
           <a:prstGeom prst="straightConnector1">
@@ -4997,13 +5122,13 @@
           <p:nvPr>
             <p:extLst>
               <p:ext uri="{D42A27DB-BD31-4B8C-83A1-F6EECF244321}">
-                <p14:modId xmlns:p14="http://schemas.microsoft.com/office/powerpoint/2010/main" val="1947247191"/>
+                <p14:modId xmlns:p14="http://schemas.microsoft.com/office/powerpoint/2010/main" val="3165912417"/>
               </p:ext>
             </p:extLst>
           </p:nvPr>
         </p:nvGraphicFramePr>
         <p:xfrm>
-          <a:off x="6465453" y="3045082"/>
+          <a:off x="7790669" y="3045082"/>
           <a:ext cx="2433780" cy="720286"/>
         </p:xfrm>
         <a:graphic>
@@ -5083,13 +5208,13 @@
           <p:nvPr>
             <p:extLst>
               <p:ext uri="{D42A27DB-BD31-4B8C-83A1-F6EECF244321}">
-                <p14:modId xmlns:p14="http://schemas.microsoft.com/office/powerpoint/2010/main" val="4146322714"/>
+                <p14:modId xmlns:p14="http://schemas.microsoft.com/office/powerpoint/2010/main" val="3982547009"/>
               </p:ext>
             </p:extLst>
           </p:nvPr>
         </p:nvGraphicFramePr>
         <p:xfrm>
-          <a:off x="6465453" y="4008067"/>
+          <a:off x="7790669" y="4008067"/>
           <a:ext cx="2433780" cy="795857"/>
         </p:xfrm>
         <a:graphic>
@@ -5169,13 +5294,13 @@
           <p:nvPr>
             <p:extLst>
               <p:ext uri="{D42A27DB-BD31-4B8C-83A1-F6EECF244321}">
-                <p14:modId xmlns:p14="http://schemas.microsoft.com/office/powerpoint/2010/main" val="744999552"/>
+                <p14:modId xmlns:p14="http://schemas.microsoft.com/office/powerpoint/2010/main" val="2562736567"/>
               </p:ext>
             </p:extLst>
           </p:nvPr>
         </p:nvGraphicFramePr>
         <p:xfrm>
-          <a:off x="6465453" y="4971052"/>
+          <a:off x="7790669" y="4971052"/>
           <a:ext cx="2433780" cy="795857"/>
         </p:xfrm>
         <a:graphic>
@@ -5255,14 +5380,14 @@
           <p:nvPr>
             <p:extLst>
               <p:ext uri="{D42A27DB-BD31-4B8C-83A1-F6EECF244321}">
-                <p14:modId xmlns:p14="http://schemas.microsoft.com/office/powerpoint/2010/main" val="438599999"/>
+                <p14:modId xmlns:p14="http://schemas.microsoft.com/office/powerpoint/2010/main" val="3496364093"/>
               </p:ext>
             </p:extLst>
           </p:nvPr>
         </p:nvGraphicFramePr>
         <p:xfrm>
-          <a:off x="6465453" y="5931597"/>
-          <a:ext cx="2433780" cy="795857"/>
+          <a:off x="7790669" y="5944849"/>
+          <a:ext cx="2433780" cy="813760"/>
         </p:xfrm>
         <a:graphic>
           <a:graphicData uri="http://schemas.openxmlformats.org/drawingml/2006/table">
@@ -5279,7 +5404,7 @@
                   </a:extLst>
                 </a:gridCol>
               </a:tblGrid>
-              <a:tr h="404135">
+              <a:tr h="413226">
                 <a:tc>
                   <a:txBody>
                     <a:bodyPr/>
@@ -5301,7 +5426,7 @@
                   </a:ext>
                 </a:extLst>
               </a:tr>
-              <a:tr h="391722">
+              <a:tr h="400534">
                 <a:tc>
                   <a:txBody>
                     <a:bodyPr/>
@@ -5342,7 +5467,7 @@
         </p:nvCxnSpPr>
         <p:spPr>
           <a:xfrm flipH="1">
-            <a:off x="2886362" y="2540822"/>
+            <a:off x="4211578" y="2540822"/>
             <a:ext cx="1566259" cy="0"/>
           </a:xfrm>
           <a:prstGeom prst="straightConnector1">
@@ -5383,7 +5508,7 @@
         </p:nvCxnSpPr>
         <p:spPr>
           <a:xfrm flipH="1">
-            <a:off x="5834723" y="4711386"/>
+            <a:off x="7159939" y="4711386"/>
             <a:ext cx="261277" cy="0"/>
           </a:xfrm>
           <a:prstGeom prst="straightConnector1">
@@ -5422,7 +5547,7 @@
         </p:nvSpPr>
         <p:spPr>
           <a:xfrm>
-            <a:off x="6102580" y="3423474"/>
+            <a:off x="7427796" y="3423474"/>
             <a:ext cx="358256" cy="2963469"/>
           </a:xfrm>
           <a:prstGeom prst="leftBracket">
@@ -5466,7 +5591,7 @@
         </p:nvCxnSpPr>
         <p:spPr>
           <a:xfrm>
-            <a:off x="6096000" y="4335930"/>
+            <a:off x="7421216" y="4335930"/>
             <a:ext cx="364836" cy="0"/>
           </a:xfrm>
           <a:prstGeom prst="line">
@@ -5502,7 +5627,7 @@
         </p:nvCxnSpPr>
         <p:spPr>
           <a:xfrm>
-            <a:off x="6096000" y="5406272"/>
+            <a:off x="7421216" y="5406272"/>
             <a:ext cx="364836" cy="0"/>
           </a:xfrm>
           <a:prstGeom prst="line">
@@ -5538,7 +5663,7 @@
         </p:nvSpPr>
         <p:spPr>
           <a:xfrm>
-            <a:off x="4987636" y="1800467"/>
+            <a:off x="6312852" y="1800467"/>
             <a:ext cx="498761" cy="369332"/>
           </a:xfrm>
           <a:prstGeom prst="rect">
@@ -5573,7 +5698,7 @@
         </p:nvSpPr>
         <p:spPr>
           <a:xfrm>
-            <a:off x="3507513" y="3753584"/>
+            <a:off x="4832729" y="3753584"/>
             <a:ext cx="498761" cy="369332"/>
           </a:xfrm>
           <a:prstGeom prst="rect">
@@ -5608,7 +5733,7 @@
         </p:nvSpPr>
         <p:spPr>
           <a:xfrm>
-            <a:off x="6181439" y="3146146"/>
+            <a:off x="7506655" y="3146146"/>
             <a:ext cx="498761" cy="369332"/>
           </a:xfrm>
           <a:prstGeom prst="rect">
@@ -5643,7 +5768,7 @@
         </p:nvSpPr>
         <p:spPr>
           <a:xfrm flipH="1">
-            <a:off x="6158344" y="4042696"/>
+            <a:off x="7483560" y="4042696"/>
             <a:ext cx="364837" cy="369332"/>
           </a:xfrm>
           <a:prstGeom prst="rect">
@@ -5678,7 +5803,7 @@
         </p:nvSpPr>
         <p:spPr>
           <a:xfrm>
-            <a:off x="6236511" y="5124288"/>
+            <a:off x="7561727" y="5124288"/>
             <a:ext cx="498761" cy="369332"/>
           </a:xfrm>
           <a:prstGeom prst="rect">
@@ -5713,7 +5838,7 @@
         </p:nvSpPr>
         <p:spPr>
           <a:xfrm>
-            <a:off x="6126018" y="6118532"/>
+            <a:off x="7451234" y="6118532"/>
             <a:ext cx="498761" cy="369332"/>
           </a:xfrm>
           <a:prstGeom prst="rect">
@@ -5748,7 +5873,7 @@
         </p:nvSpPr>
         <p:spPr>
           <a:xfrm rot="16200000">
-            <a:off x="2834970" y="2448056"/>
+            <a:off x="4160186" y="2448056"/>
             <a:ext cx="225287" cy="185531"/>
           </a:xfrm>
           <a:prstGeom prst="triangle">
@@ -5797,7 +5922,7 @@
         </p:nvSpPr>
         <p:spPr>
           <a:xfrm rot="19059945">
-            <a:off x="2755456" y="3610546"/>
+            <a:off x="4080672" y="3610546"/>
             <a:ext cx="225287" cy="185531"/>
           </a:xfrm>
           <a:prstGeom prst="triangle">
@@ -5846,7 +5971,7 @@
         </p:nvSpPr>
         <p:spPr>
           <a:xfrm rot="16200000">
-            <a:off x="5722079" y="4629088"/>
+            <a:off x="7047295" y="4629088"/>
             <a:ext cx="225287" cy="185531"/>
           </a:xfrm>
           <a:prstGeom prst="triangle">
@@ -5913,10 +6038,10 @@
       </p:grpSpPr>
       <p:graphicFrame>
         <p:nvGraphicFramePr>
-          <p:cNvPr id="28" name="Table 27">
-            <a:extLst>
-              <a:ext uri="{FF2B5EF4-FFF2-40B4-BE49-F238E27FC236}">
-                <a16:creationId xmlns:a16="http://schemas.microsoft.com/office/drawing/2014/main" id="{FCEA68AE-8C74-0816-62B4-4F89956168B9}"/>
+          <p:cNvPr id="4" name="Table 3">
+            <a:extLst>
+              <a:ext uri="{FF2B5EF4-FFF2-40B4-BE49-F238E27FC236}">
+                <a16:creationId xmlns:a16="http://schemas.microsoft.com/office/drawing/2014/main" id="{4B3C905C-688D-F52C-5B97-4905CFA4BA6D}"/>
               </a:ext>
             </a:extLst>
           </p:cNvPr>
@@ -5926,14 +6051,14 @@
           <p:nvPr>
             <p:extLst>
               <p:ext uri="{D42A27DB-BD31-4B8C-83A1-F6EECF244321}">
-                <p14:modId xmlns:p14="http://schemas.microsoft.com/office/powerpoint/2010/main" val="1066072252"/>
+                <p14:modId xmlns:p14="http://schemas.microsoft.com/office/powerpoint/2010/main" val="2082993816"/>
               </p:ext>
             </p:extLst>
           </p:nvPr>
         </p:nvGraphicFramePr>
         <p:xfrm>
-          <a:off x="3762005" y="118500"/>
-          <a:ext cx="2606964" cy="1017821"/>
+          <a:off x="5060718" y="251021"/>
+          <a:ext cx="2678551" cy="983868"/>
         </p:xfrm>
         <a:graphic>
           <a:graphicData uri="http://schemas.openxmlformats.org/drawingml/2006/table">
@@ -5942,7 +6067,7 @@
                 <a:tableStyleId>{5C22544A-7EE6-4342-B048-85BDC9FD1C3A}</a:tableStyleId>
               </a:tblPr>
               <a:tblGrid>
-                <a:gridCol w="2606964">
+                <a:gridCol w="2678551">
                   <a:extLst>
                     <a:ext uri="{9D8B030D-6E8A-4147-A177-3AD203B41FA5}">
                       <a16:colId xmlns:a16="http://schemas.microsoft.com/office/drawing/2014/main" val="1419940822"/>
@@ -5950,7 +6075,7 @@
                   </a:extLst>
                 </a:gridCol>
               </a:tblGrid>
-              <a:tr h="303759">
+              <a:tr h="393803">
                 <a:tc>
                   <a:txBody>
                     <a:bodyPr/>
@@ -5959,7 +6084,7 @@
                       <a:pPr algn="ctr"/>
                       <a:r>
                         <a:rPr lang="en-US" sz="2000" b="0" dirty="0" err="1"/>
-                        <a:t>CategoryManagement</a:t>
+                        <a:t>StockManagement</a:t>
                       </a:r>
                       <a:endParaRPr lang="en-US" sz="2000" b="0" dirty="0"/>
                     </a:p>
@@ -5972,7 +6097,7 @@
                   </a:ext>
                 </a:extLst>
               </a:tr>
-              <a:tr h="621581">
+              <a:tr h="587628">
                 <a:tc>
                   <a:txBody>
                     <a:bodyPr/>
@@ -5995,10 +6120,10 @@
       </p:graphicFrame>
       <p:graphicFrame>
         <p:nvGraphicFramePr>
-          <p:cNvPr id="12" name="Table 11">
-            <a:extLst>
-              <a:ext uri="{FF2B5EF4-FFF2-40B4-BE49-F238E27FC236}">
-                <a16:creationId xmlns:a16="http://schemas.microsoft.com/office/drawing/2014/main" id="{A384142F-6521-54F4-3CC2-58BA5744581C}"/>
+          <p:cNvPr id="5" name="Table 4">
+            <a:extLst>
+              <a:ext uri="{FF2B5EF4-FFF2-40B4-BE49-F238E27FC236}">
+                <a16:creationId xmlns:a16="http://schemas.microsoft.com/office/drawing/2014/main" id="{D602D30E-FA70-4AF4-138E-82120B53C599}"/>
               </a:ext>
             </a:extLst>
           </p:cNvPr>
@@ -6008,14 +6133,14 @@
           <p:nvPr>
             <p:extLst>
               <p:ext uri="{D42A27DB-BD31-4B8C-83A1-F6EECF244321}">
-                <p14:modId xmlns:p14="http://schemas.microsoft.com/office/powerpoint/2010/main" val="2380834050"/>
+                <p14:modId xmlns:p14="http://schemas.microsoft.com/office/powerpoint/2010/main" val="906783243"/>
               </p:ext>
             </p:extLst>
           </p:nvPr>
         </p:nvGraphicFramePr>
         <p:xfrm>
-          <a:off x="407555" y="256896"/>
-          <a:ext cx="2223653" cy="1280958"/>
+          <a:off x="8616513" y="2775761"/>
+          <a:ext cx="2552656" cy="901711"/>
         </p:xfrm>
         <a:graphic>
           <a:graphicData uri="http://schemas.openxmlformats.org/drawingml/2006/table">
@@ -6024,7 +6149,7 @@
                 <a:tableStyleId>{5C22544A-7EE6-4342-B048-85BDC9FD1C3A}</a:tableStyleId>
               </a:tblPr>
               <a:tblGrid>
-                <a:gridCol w="2223653">
+                <a:gridCol w="2552656">
                   <a:extLst>
                     <a:ext uri="{9D8B030D-6E8A-4147-A177-3AD203B41FA5}">
                       <a16:colId xmlns:a16="http://schemas.microsoft.com/office/drawing/2014/main" val="1419940822"/>
@@ -6032,7 +6157,7 @@
                   </a:extLst>
                 </a:gridCol>
               </a:tblGrid>
-              <a:tr h="509465">
+              <a:tr h="383551">
                 <a:tc>
                   <a:txBody>
                     <a:bodyPr/>
@@ -6040,26 +6165,9 @@
                     <a:p>
                       <a:pPr algn="ctr"/>
                       <a:r>
-                        <a:rPr lang="en-US" sz="1400" b="0" dirty="0"/>
-                        <a:t>&lt;</a:t>
-                      </a:r>
-                      <a:r>
-                        <a:rPr lang="en-US" sz="1400" b="0" dirty="0" err="1"/>
-                        <a:t>enum</a:t>
-                      </a:r>
-                      <a:r>
-                        <a:rPr lang="en-US" sz="1400" b="0" dirty="0"/>
-                        <a:t>&gt;</a:t>
-                      </a:r>
-                      <a:endParaRPr lang="en-US" sz="1800" b="0" dirty="0"/>
-                    </a:p>
-                    <a:p>
-                      <a:pPr algn="ctr"/>
-                      <a:r>
-                        <a:rPr lang="en-US" sz="1800" b="0" dirty="0" err="1"/>
-                        <a:t>MenuCategory</a:t>
-                      </a:r>
-                      <a:endParaRPr lang="km-KH" sz="1400" b="0" dirty="0"/>
+                        <a:rPr lang="en-US" sz="1600" b="0" dirty="0"/>
+                        <a:t>Foods</a:t>
+                      </a:r>
                     </a:p>
                   </a:txBody>
                   <a:tcPr/>
@@ -6070,220 +6178,34 @@
                   </a:ext>
                 </a:extLst>
               </a:tr>
-              <a:tr h="701838">
+              <a:tr h="463474">
                 <a:tc>
                   <a:txBody>
                     <a:bodyPr/>
                     <a:lstStyle/>
                     <a:p>
-                      <a:pPr marL="0" indent="0">
+                      <a:pPr marL="285750" indent="-285750">
                         <a:buFontTx/>
-                        <a:buNone/>
+                        <a:buChar char="-"/>
                       </a:pPr>
                       <a:r>
-                        <a:rPr lang="en-US" sz="1200" dirty="0"/>
-                        <a:t>MEAL, </a:t>
-                      </a:r>
-                    </a:p>
-                    <a:p>
-                      <a:pPr marL="0" indent="0">
+                        <a:rPr lang="en-US" sz="1400" dirty="0"/>
+                        <a:t>quantity: number</a:t>
+                      </a:r>
+                    </a:p>
+                    <a:p>
+                      <a:pPr marL="285750" indent="-285750">
                         <a:buFontTx/>
-                        <a:buNone/>
+                        <a:buChar char="-"/>
                       </a:pPr>
                       <a:r>
-                        <a:rPr lang="en-US" sz="1200" dirty="0"/>
-                        <a:t>BEVERAGES</a:t>
-                      </a:r>
-                    </a:p>
-                  </a:txBody>
-                  <a:tcPr/>
-                </a:tc>
-                <a:extLst>
-                  <a:ext uri="{0D108BD9-81ED-4DB2-BD59-A6C34878D82A}">
-                    <a16:rowId xmlns:a16="http://schemas.microsoft.com/office/drawing/2014/main" val="1648744592"/>
-                  </a:ext>
-                </a:extLst>
-              </a:tr>
-            </a:tbl>
-          </a:graphicData>
-        </a:graphic>
-      </p:graphicFrame>
-      <p:sp>
-        <p:nvSpPr>
-          <p:cNvPr id="17" name="TextBox 16">
-            <a:extLst>
-              <a:ext uri="{FF2B5EF4-FFF2-40B4-BE49-F238E27FC236}">
-                <a16:creationId xmlns:a16="http://schemas.microsoft.com/office/drawing/2014/main" id="{AD7A7E63-7639-FD78-89F0-BC2742D50BE9}"/>
-              </a:ext>
-            </a:extLst>
-          </p:cNvPr>
-          <p:cNvSpPr txBox="1"/>
-          <p:nvPr/>
-        </p:nvSpPr>
-        <p:spPr>
-          <a:xfrm flipH="1">
-            <a:off x="1577535" y="1461912"/>
-            <a:ext cx="409164" cy="369332"/>
-          </a:xfrm>
-          <a:prstGeom prst="rect">
-            <a:avLst/>
-          </a:prstGeom>
-          <a:noFill/>
-        </p:spPr>
-        <p:txBody>
-          <a:bodyPr wrap="square" rtlCol="0">
-            <a:spAutoFit/>
-          </a:bodyPr>
-          <a:lstStyle/>
-          <a:p>
-            <a:r>
-              <a:rPr lang="en-US" dirty="0"/>
-              <a:t>1</a:t>
-            </a:r>
-          </a:p>
-        </p:txBody>
-      </p:sp>
-      <p:sp>
-        <p:nvSpPr>
-          <p:cNvPr id="35" name="TextBox 34">
-            <a:extLst>
-              <a:ext uri="{FF2B5EF4-FFF2-40B4-BE49-F238E27FC236}">
-                <a16:creationId xmlns:a16="http://schemas.microsoft.com/office/drawing/2014/main" id="{5D072A7D-467F-32ED-353B-CD62211D68F2}"/>
-              </a:ext>
-            </a:extLst>
-          </p:cNvPr>
-          <p:cNvSpPr txBox="1"/>
-          <p:nvPr/>
-        </p:nvSpPr>
-        <p:spPr>
-          <a:xfrm flipH="1">
-            <a:off x="1803255" y="1492690"/>
-            <a:ext cx="951579" cy="307777"/>
-          </a:xfrm>
-          <a:prstGeom prst="rect">
-            <a:avLst/>
-          </a:prstGeom>
-          <a:noFill/>
-        </p:spPr>
-        <p:txBody>
-          <a:bodyPr wrap="square" rtlCol="0">
-            <a:spAutoFit/>
-          </a:bodyPr>
-          <a:lstStyle/>
-          <a:p>
-            <a:r>
-              <a:rPr lang="en-US" sz="1400" dirty="0"/>
-              <a:t>Menu</a:t>
-            </a:r>
-          </a:p>
-        </p:txBody>
-      </p:sp>
-      <p:graphicFrame>
-        <p:nvGraphicFramePr>
-          <p:cNvPr id="37" name="Table 36">
-            <a:extLst>
-              <a:ext uri="{FF2B5EF4-FFF2-40B4-BE49-F238E27FC236}">
-                <a16:creationId xmlns:a16="http://schemas.microsoft.com/office/drawing/2014/main" id="{F06D399F-9FC5-0730-029C-DE76B958724B}"/>
-              </a:ext>
-            </a:extLst>
-          </p:cNvPr>
-          <p:cNvGraphicFramePr>
-            <a:graphicFrameLocks noGrp="1"/>
-          </p:cNvGraphicFramePr>
-          <p:nvPr>
-            <p:extLst>
-              <p:ext uri="{D42A27DB-BD31-4B8C-83A1-F6EECF244321}">
-                <p14:modId xmlns:p14="http://schemas.microsoft.com/office/powerpoint/2010/main" val="4212413967"/>
-              </p:ext>
-            </p:extLst>
-          </p:nvPr>
-        </p:nvGraphicFramePr>
-        <p:xfrm>
-          <a:off x="407555" y="2295243"/>
-          <a:ext cx="2640445" cy="1032651"/>
-        </p:xfrm>
-        <a:graphic>
-          <a:graphicData uri="http://schemas.openxmlformats.org/drawingml/2006/table">
-            <a:tbl>
-              <a:tblPr firstRow="1" bandRow="1">
-                <a:tableStyleId>{5C22544A-7EE6-4342-B048-85BDC9FD1C3A}</a:tableStyleId>
-              </a:tblPr>
-              <a:tblGrid>
-                <a:gridCol w="2640445">
-                  <a:extLst>
-                    <a:ext uri="{9D8B030D-6E8A-4147-A177-3AD203B41FA5}">
-                      <a16:colId xmlns:a16="http://schemas.microsoft.com/office/drawing/2014/main" val="1419940822"/>
-                    </a:ext>
-                  </a:extLst>
-                </a:gridCol>
-              </a:tblGrid>
-              <a:tr h="344012">
-                <a:tc>
-                  <a:txBody>
-                    <a:bodyPr/>
-                    <a:lstStyle/>
-                    <a:p>
-                      <a:pPr algn="ctr"/>
-                      <a:r>
-                        <a:rPr lang="en-US" sz="1800" b="0" dirty="0"/>
-                        <a:t>Menu</a:t>
-                      </a:r>
-                      <a:endParaRPr lang="en-US" sz="2400" b="0" dirty="0"/>
-                    </a:p>
-                  </a:txBody>
-                  <a:tcPr/>
-                </a:tc>
-                <a:extLst>
-                  <a:ext uri="{0D108BD9-81ED-4DB2-BD59-A6C34878D82A}">
-                    <a16:rowId xmlns:a16="http://schemas.microsoft.com/office/drawing/2014/main" val="1122576610"/>
-                  </a:ext>
-                </a:extLst>
-              </a:tr>
-              <a:tr h="666891">
-                <a:tc>
-                  <a:txBody>
-                    <a:bodyPr/>
-                    <a:lstStyle/>
-                    <a:p>
-                      <a:pPr marL="0" indent="0">
-                        <a:buFontTx/>
-                        <a:buNone/>
-                      </a:pPr>
-                      <a:r>
-                        <a:rPr lang="en-US" sz="1600" dirty="0"/>
-                        <a:t>+ </a:t>
-                      </a:r>
-                      <a:r>
-                        <a:rPr lang="en-US" sz="1600" dirty="0" err="1"/>
-                        <a:t>menuId</a:t>
-                      </a:r>
-                      <a:r>
-                        <a:rPr lang="en-US" sz="1600" dirty="0"/>
-                        <a:t>: number</a:t>
-                      </a:r>
-                    </a:p>
-                    <a:p>
-                      <a:pPr marL="0" indent="0">
-                        <a:buFontTx/>
-                        <a:buNone/>
-                      </a:pPr>
-                      <a:r>
-                        <a:rPr lang="en-US" sz="1600" dirty="0"/>
-                        <a:t>+ </a:t>
-                      </a:r>
-                      <a:r>
-                        <a:rPr lang="en-US" sz="1600" dirty="0" err="1"/>
-                        <a:t>itemName</a:t>
-                      </a:r>
-                      <a:r>
-                        <a:rPr lang="en-US" sz="1600" dirty="0"/>
-                        <a:t>: </a:t>
-                      </a:r>
-                      <a:r>
-                        <a:rPr lang="en-US" sz="1600" dirty="0" err="1"/>
-                        <a:t>MenuCategory</a:t>
-                      </a:r>
-                      <a:endParaRPr lang="en-US" sz="1600" dirty="0"/>
+                        <a:rPr lang="en-US" sz="1400" dirty="0" err="1"/>
+                        <a:t>categoryName</a:t>
+                      </a:r>
+                      <a:r>
+                        <a:rPr lang="en-US" sz="1400" dirty="0"/>
+                        <a:t>: string</a:t>
+                      </a:r>
                     </a:p>
                   </a:txBody>
                   <a:tcPr/>
@@ -6300,10 +6222,10 @@
       </p:graphicFrame>
       <p:graphicFrame>
         <p:nvGraphicFramePr>
-          <p:cNvPr id="40" name="Table 39">
-            <a:extLst>
-              <a:ext uri="{FF2B5EF4-FFF2-40B4-BE49-F238E27FC236}">
-                <a16:creationId xmlns:a16="http://schemas.microsoft.com/office/drawing/2014/main" id="{F3F0845B-14B0-8FAC-79D9-51E1B6C0DE20}"/>
+          <p:cNvPr id="6" name="Table 5">
+            <a:extLst>
+              <a:ext uri="{FF2B5EF4-FFF2-40B4-BE49-F238E27FC236}">
+                <a16:creationId xmlns:a16="http://schemas.microsoft.com/office/drawing/2014/main" id="{EED46FB6-6778-E357-CE40-F343D5EA15AC}"/>
               </a:ext>
             </a:extLst>
           </p:cNvPr>
@@ -6313,14 +6235,14 @@
           <p:nvPr>
             <p:extLst>
               <p:ext uri="{D42A27DB-BD31-4B8C-83A1-F6EECF244321}">
-                <p14:modId xmlns:p14="http://schemas.microsoft.com/office/powerpoint/2010/main" val="1951260821"/>
+                <p14:modId xmlns:p14="http://schemas.microsoft.com/office/powerpoint/2010/main" val="3161927108"/>
               </p:ext>
             </p:extLst>
           </p:nvPr>
         </p:nvGraphicFramePr>
         <p:xfrm>
-          <a:off x="407555" y="3889304"/>
-          <a:ext cx="2606963" cy="1767840"/>
+          <a:off x="2348147" y="2652273"/>
+          <a:ext cx="1932305" cy="1025199"/>
         </p:xfrm>
         <a:graphic>
           <a:graphicData uri="http://schemas.openxmlformats.org/drawingml/2006/table">
@@ -6329,7 +6251,7 @@
                 <a:tableStyleId>{5C22544A-7EE6-4342-B048-85BDC9FD1C3A}</a:tableStyleId>
               </a:tblPr>
               <a:tblGrid>
-                <a:gridCol w="2606963">
+                <a:gridCol w="1932305">
                   <a:extLst>
                     <a:ext uri="{9D8B030D-6E8A-4147-A177-3AD203B41FA5}">
                       <a16:colId xmlns:a16="http://schemas.microsoft.com/office/drawing/2014/main" val="1419940822"/>
@@ -6337,7 +6259,7 @@
                   </a:extLst>
                 </a:gridCol>
               </a:tblGrid>
-              <a:tr h="272248">
+              <a:tr h="511074">
                 <a:tc>
                   <a:txBody>
                     <a:bodyPr/>
@@ -6345,10 +6267,9 @@
                     <a:p>
                       <a:pPr algn="ctr"/>
                       <a:r>
-                        <a:rPr lang="en-US" sz="1800" b="0" dirty="0" err="1"/>
-                        <a:t>MenuItem</a:t>
-                      </a:r>
-                      <a:endParaRPr lang="en-US" sz="2400" b="0" dirty="0"/>
+                        <a:rPr lang="en-US" sz="1600" b="0" dirty="0"/>
+                        <a:t>Beverage</a:t>
+                      </a:r>
                     </a:p>
                   </a:txBody>
                   <a:tcPr/>
@@ -6359,67 +6280,13 @@
                   </a:ext>
                 </a:extLst>
               </a:tr>
-              <a:tr h="612558">
+              <a:tr h="514125">
                 <a:tc>
                   <a:txBody>
                     <a:bodyPr/>
                     <a:lstStyle/>
                     <a:p>
-                      <a:pPr marL="0" indent="0">
-                        <a:buFontTx/>
-                        <a:buNone/>
-                      </a:pPr>
-                      <a:r>
-                        <a:rPr lang="en-US" sz="1600" dirty="0"/>
-                        <a:t>+  </a:t>
-                      </a:r>
-                      <a:r>
-                        <a:rPr lang="en-US" sz="1600" dirty="0" err="1"/>
-                        <a:t>menuItemId</a:t>
-                      </a:r>
-                      <a:r>
-                        <a:rPr lang="en-US" sz="1600" dirty="0"/>
-                        <a:t>: number</a:t>
-                      </a:r>
-                    </a:p>
-                    <a:p>
-                      <a:pPr marL="0" indent="0">
-                        <a:buFontTx/>
-                        <a:buNone/>
-                      </a:pPr>
-                      <a:r>
-                        <a:rPr lang="en-US" sz="1600" dirty="0"/>
-                        <a:t>+  </a:t>
-                      </a:r>
-                      <a:r>
-                        <a:rPr lang="en-US" sz="1600" dirty="0" err="1"/>
-                        <a:t>itemName</a:t>
-                      </a:r>
-                      <a:r>
-                        <a:rPr lang="en-US" sz="1600" dirty="0"/>
-                        <a:t>: string</a:t>
-                      </a:r>
-                      <a:endParaRPr lang="km-KH" sz="1600" dirty="0"/>
-                    </a:p>
-                    <a:p>
-                      <a:pPr marL="0" indent="0">
-                        <a:buFontTx/>
-                        <a:buNone/>
-                      </a:pPr>
-                      <a:r>
-                        <a:rPr lang="en-US" sz="1600" dirty="0"/>
-                        <a:t>+  drinks?: Drink</a:t>
-                      </a:r>
-                    </a:p>
-                    <a:p>
-                      <a:pPr marL="0" indent="0">
-                        <a:buFontTx/>
-                        <a:buNone/>
-                      </a:pPr>
-                      <a:r>
-                        <a:rPr lang="en-US" sz="1600" dirty="0"/>
-                        <a:t>+  price: number</a:t>
-                      </a:r>
+                      <a:endParaRPr lang="en-US" sz="1400" dirty="0"/>
                     </a:p>
                   </a:txBody>
                   <a:tcPr/>
@@ -6430,49 +6297,26 @@
                   </a:ext>
                 </a:extLst>
               </a:tr>
-              <a:tr h="261401">
-                <a:tc>
-                  <a:txBody>
-                    <a:bodyPr/>
-                    <a:lstStyle/>
-                    <a:p>
-                      <a:pPr marL="0" indent="0">
-                        <a:buFontTx/>
-                        <a:buNone/>
-                      </a:pPr>
-                      <a:endParaRPr lang="en-US" sz="1600" dirty="0"/>
-                    </a:p>
-                  </a:txBody>
-                  <a:tcPr/>
-                </a:tc>
-                <a:extLst>
-                  <a:ext uri="{0D108BD9-81ED-4DB2-BD59-A6C34878D82A}">
-                    <a16:rowId xmlns:a16="http://schemas.microsoft.com/office/drawing/2014/main" val="4237581561"/>
-                  </a:ext>
-                </a:extLst>
-              </a:tr>
             </a:tbl>
           </a:graphicData>
         </a:graphic>
       </p:graphicFrame>
       <p:cxnSp>
         <p:nvCxnSpPr>
-          <p:cNvPr id="46" name="Straight Connector 45">
-            <a:extLst>
-              <a:ext uri="{FF2B5EF4-FFF2-40B4-BE49-F238E27FC236}">
-                <a16:creationId xmlns:a16="http://schemas.microsoft.com/office/drawing/2014/main" id="{42987081-CC9F-2506-7C20-1F204ECB42B4}"/>
-              </a:ext>
-            </a:extLst>
-          </p:cNvPr>
-          <p:cNvCxnSpPr>
-            <a:cxnSpLocks/>
-          </p:cNvCxnSpPr>
+          <p:cNvPr id="8" name="Straight Connector 7">
+            <a:extLst>
+              <a:ext uri="{FF2B5EF4-FFF2-40B4-BE49-F238E27FC236}">
+                <a16:creationId xmlns:a16="http://schemas.microsoft.com/office/drawing/2014/main" id="{3B0535F5-FE10-F8CE-5F17-98C4DF249CD4}"/>
+              </a:ext>
+            </a:extLst>
+          </p:cNvPr>
+          <p:cNvCxnSpPr/>
           <p:nvPr/>
         </p:nvCxnSpPr>
         <p:spPr>
           <a:xfrm>
-            <a:off x="1802588" y="1500222"/>
-            <a:ext cx="0" cy="795021"/>
+            <a:off x="7739269" y="2398643"/>
+            <a:ext cx="2305879" cy="0"/>
           </a:xfrm>
           <a:prstGeom prst="line">
             <a:avLst/>
@@ -6495,23 +6339,622 @@
       </p:cxnSp>
       <p:cxnSp>
         <p:nvCxnSpPr>
-          <p:cNvPr id="48" name="Straight Connector 47">
-            <a:extLst>
-              <a:ext uri="{FF2B5EF4-FFF2-40B4-BE49-F238E27FC236}">
-                <a16:creationId xmlns:a16="http://schemas.microsoft.com/office/drawing/2014/main" id="{A7AD23A9-23B8-FA87-4507-F095BCDD37A1}"/>
+          <p:cNvPr id="9" name="Straight Connector 8">
+            <a:extLst>
+              <a:ext uri="{FF2B5EF4-FFF2-40B4-BE49-F238E27FC236}">
+                <a16:creationId xmlns:a16="http://schemas.microsoft.com/office/drawing/2014/main" id="{4CDA9110-B771-0380-E2EF-DD1D1E923C30}"/>
               </a:ext>
             </a:extLst>
           </p:cNvPr>
           <p:cNvCxnSpPr>
             <a:cxnSpLocks/>
-            <a:endCxn id="40" idx="0"/>
           </p:cNvCxnSpPr>
           <p:nvPr/>
         </p:nvCxnSpPr>
         <p:spPr>
           <a:xfrm>
-            <a:off x="1711036" y="3327894"/>
-            <a:ext cx="0" cy="561410"/>
+            <a:off x="10045148" y="2398643"/>
+            <a:ext cx="0" cy="734728"/>
+          </a:xfrm>
+          <a:prstGeom prst="line">
+            <a:avLst/>
+          </a:prstGeom>
+        </p:spPr>
+        <p:style>
+          <a:lnRef idx="1">
+            <a:schemeClr val="accent1"/>
+          </a:lnRef>
+          <a:fillRef idx="0">
+            <a:schemeClr val="accent1"/>
+          </a:fillRef>
+          <a:effectRef idx="0">
+            <a:schemeClr val="accent1"/>
+          </a:effectRef>
+          <a:fontRef idx="minor">
+            <a:schemeClr val="tx1"/>
+          </a:fontRef>
+        </p:style>
+      </p:cxnSp>
+      <p:grpSp>
+        <p:nvGrpSpPr>
+          <p:cNvPr id="14" name="Group 13">
+            <a:extLst>
+              <a:ext uri="{FF2B5EF4-FFF2-40B4-BE49-F238E27FC236}">
+                <a16:creationId xmlns:a16="http://schemas.microsoft.com/office/drawing/2014/main" id="{10CC1B5E-4834-651F-5500-84B4F3EAFD94}"/>
+              </a:ext>
+            </a:extLst>
+          </p:cNvPr>
+          <p:cNvGrpSpPr/>
+          <p:nvPr/>
+        </p:nvGrpSpPr>
+        <p:grpSpPr>
+          <a:xfrm flipH="1">
+            <a:off x="3403398" y="2398644"/>
+            <a:ext cx="1657317" cy="316842"/>
+            <a:chOff x="430695" y="874546"/>
+            <a:chExt cx="2305879" cy="734728"/>
+          </a:xfrm>
+        </p:grpSpPr>
+        <p:cxnSp>
+          <p:nvCxnSpPr>
+            <p:cNvPr id="12" name="Straight Connector 11">
+              <a:extLst>
+                <a:ext uri="{FF2B5EF4-FFF2-40B4-BE49-F238E27FC236}">
+                  <a16:creationId xmlns:a16="http://schemas.microsoft.com/office/drawing/2014/main" id="{933B7C59-3420-7273-C4F6-3887AB615D03}"/>
+                </a:ext>
+              </a:extLst>
+            </p:cNvPr>
+            <p:cNvCxnSpPr/>
+            <p:nvPr/>
+          </p:nvCxnSpPr>
+          <p:spPr>
+            <a:xfrm>
+              <a:off x="430695" y="874546"/>
+              <a:ext cx="2305879" cy="0"/>
+            </a:xfrm>
+            <a:prstGeom prst="line">
+              <a:avLst/>
+            </a:prstGeom>
+          </p:spPr>
+          <p:style>
+            <a:lnRef idx="1">
+              <a:schemeClr val="accent1"/>
+            </a:lnRef>
+            <a:fillRef idx="0">
+              <a:schemeClr val="accent1"/>
+            </a:fillRef>
+            <a:effectRef idx="0">
+              <a:schemeClr val="accent1"/>
+            </a:effectRef>
+            <a:fontRef idx="minor">
+              <a:schemeClr val="tx1"/>
+            </a:fontRef>
+          </p:style>
+        </p:cxnSp>
+        <p:cxnSp>
+          <p:nvCxnSpPr>
+            <p:cNvPr id="13" name="Straight Connector 12">
+              <a:extLst>
+                <a:ext uri="{FF2B5EF4-FFF2-40B4-BE49-F238E27FC236}">
+                  <a16:creationId xmlns:a16="http://schemas.microsoft.com/office/drawing/2014/main" id="{E0F89F5A-EB29-41A0-E26B-A90AA40C3421}"/>
+                </a:ext>
+              </a:extLst>
+            </p:cNvPr>
+            <p:cNvCxnSpPr>
+              <a:cxnSpLocks/>
+            </p:cNvCxnSpPr>
+            <p:nvPr/>
+          </p:nvCxnSpPr>
+          <p:spPr>
+            <a:xfrm>
+              <a:off x="2736574" y="874546"/>
+              <a:ext cx="0" cy="734728"/>
+            </a:xfrm>
+            <a:prstGeom prst="line">
+              <a:avLst/>
+            </a:prstGeom>
+          </p:spPr>
+          <p:style>
+            <a:lnRef idx="1">
+              <a:schemeClr val="accent1"/>
+            </a:lnRef>
+            <a:fillRef idx="0">
+              <a:schemeClr val="accent1"/>
+            </a:fillRef>
+            <a:effectRef idx="0">
+              <a:schemeClr val="accent1"/>
+            </a:effectRef>
+            <a:fontRef idx="minor">
+              <a:schemeClr val="tx1"/>
+            </a:fontRef>
+          </p:style>
+        </p:cxnSp>
+      </p:grpSp>
+      <p:sp>
+        <p:nvSpPr>
+          <p:cNvPr id="15" name="TextBox 14">
+            <a:extLst>
+              <a:ext uri="{FF2B5EF4-FFF2-40B4-BE49-F238E27FC236}">
+                <a16:creationId xmlns:a16="http://schemas.microsoft.com/office/drawing/2014/main" id="{117DA0C2-2CC1-91A8-BDD7-4EF88AA05135}"/>
+              </a:ext>
+            </a:extLst>
+          </p:cNvPr>
+          <p:cNvSpPr txBox="1"/>
+          <p:nvPr/>
+        </p:nvSpPr>
+        <p:spPr>
+          <a:xfrm>
+            <a:off x="3419274" y="2408641"/>
+            <a:ext cx="498761" cy="369332"/>
+          </a:xfrm>
+          <a:prstGeom prst="rect">
+            <a:avLst/>
+          </a:prstGeom>
+          <a:noFill/>
+        </p:spPr>
+        <p:txBody>
+          <a:bodyPr wrap="square" rtlCol="0">
+            <a:spAutoFit/>
+          </a:bodyPr>
+          <a:lstStyle/>
+          <a:p>
+            <a:r>
+              <a:rPr lang="en-US" dirty="0"/>
+              <a:t>*</a:t>
+            </a:r>
+          </a:p>
+        </p:txBody>
+      </p:sp>
+      <p:graphicFrame>
+        <p:nvGraphicFramePr>
+          <p:cNvPr id="16" name="Table 15">
+            <a:extLst>
+              <a:ext uri="{FF2B5EF4-FFF2-40B4-BE49-F238E27FC236}">
+                <a16:creationId xmlns:a16="http://schemas.microsoft.com/office/drawing/2014/main" id="{EEE22C99-F4E9-B6F9-F460-D2E8475E40F2}"/>
+              </a:ext>
+            </a:extLst>
+          </p:cNvPr>
+          <p:cNvGraphicFramePr>
+            <a:graphicFrameLocks noGrp="1"/>
+          </p:cNvGraphicFramePr>
+          <p:nvPr>
+            <p:extLst>
+              <p:ext uri="{D42A27DB-BD31-4B8C-83A1-F6EECF244321}">
+                <p14:modId xmlns:p14="http://schemas.microsoft.com/office/powerpoint/2010/main" val="1323642102"/>
+              </p:ext>
+            </p:extLst>
+          </p:nvPr>
+        </p:nvGraphicFramePr>
+        <p:xfrm>
+          <a:off x="5106293" y="1685683"/>
+          <a:ext cx="2831947" cy="1100811"/>
+        </p:xfrm>
+        <a:graphic>
+          <a:graphicData uri="http://schemas.openxmlformats.org/drawingml/2006/table">
+            <a:tbl>
+              <a:tblPr firstRow="1" bandRow="1">
+                <a:tableStyleId>{5C22544A-7EE6-4342-B048-85BDC9FD1C3A}</a:tableStyleId>
+              </a:tblPr>
+              <a:tblGrid>
+                <a:gridCol w="2831947">
+                  <a:extLst>
+                    <a:ext uri="{9D8B030D-6E8A-4147-A177-3AD203B41FA5}">
+                      <a16:colId xmlns:a16="http://schemas.microsoft.com/office/drawing/2014/main" val="1419940822"/>
+                    </a:ext>
+                  </a:extLst>
+                </a:gridCol>
+              </a:tblGrid>
+              <a:tr h="369291">
+                <a:tc>
+                  <a:txBody>
+                    <a:bodyPr/>
+                    <a:lstStyle/>
+                    <a:p>
+                      <a:pPr algn="ctr"/>
+                      <a:r>
+                        <a:rPr lang="en-US" sz="1600" b="0" dirty="0" err="1"/>
+                        <a:t>MenuCategory</a:t>
+                      </a:r>
+                      <a:endParaRPr lang="en-US" sz="1600" b="0" dirty="0"/>
+                    </a:p>
+                  </a:txBody>
+                  <a:tcPr/>
+                </a:tc>
+                <a:extLst>
+                  <a:ext uri="{0D108BD9-81ED-4DB2-BD59-A6C34878D82A}">
+                    <a16:rowId xmlns:a16="http://schemas.microsoft.com/office/drawing/2014/main" val="1122576610"/>
+                  </a:ext>
+                </a:extLst>
+              </a:tr>
+              <a:tr h="499593">
+                <a:tc>
+                  <a:txBody>
+                    <a:bodyPr/>
+                    <a:lstStyle/>
+                    <a:p>
+                      <a:pPr marL="285750" indent="-285750">
+                        <a:buFontTx/>
+                        <a:buChar char="-"/>
+                      </a:pPr>
+                      <a:r>
+                        <a:rPr lang="en-US" sz="1400" dirty="0"/>
+                        <a:t>foods</a:t>
+                      </a:r>
+                    </a:p>
+                    <a:p>
+                      <a:pPr marL="285750" indent="-285750">
+                        <a:buFontTx/>
+                        <a:buChar char="-"/>
+                      </a:pPr>
+                      <a:r>
+                        <a:rPr lang="en-US" sz="1400" dirty="0"/>
+                        <a:t>Beverages</a:t>
+                      </a:r>
+                    </a:p>
+                    <a:p>
+                      <a:pPr marL="285750" indent="-285750">
+                        <a:buFontTx/>
+                        <a:buChar char="-"/>
+                      </a:pPr>
+                      <a:r>
+                        <a:rPr lang="en-US" sz="1400" dirty="0"/>
+                        <a:t>dessert</a:t>
+                      </a:r>
+                    </a:p>
+                  </a:txBody>
+                  <a:tcPr/>
+                </a:tc>
+                <a:extLst>
+                  <a:ext uri="{0D108BD9-81ED-4DB2-BD59-A6C34878D82A}">
+                    <a16:rowId xmlns:a16="http://schemas.microsoft.com/office/drawing/2014/main" val="1648744592"/>
+                  </a:ext>
+                </a:extLst>
+              </a:tr>
+            </a:tbl>
+          </a:graphicData>
+        </a:graphic>
+      </p:graphicFrame>
+      <p:sp>
+        <p:nvSpPr>
+          <p:cNvPr id="17" name="TextBox 16">
+            <a:extLst>
+              <a:ext uri="{FF2B5EF4-FFF2-40B4-BE49-F238E27FC236}">
+                <a16:creationId xmlns:a16="http://schemas.microsoft.com/office/drawing/2014/main" id="{F36CB412-0063-5282-88E5-7C26AFE1D0A0}"/>
+              </a:ext>
+            </a:extLst>
+          </p:cNvPr>
+          <p:cNvSpPr txBox="1"/>
+          <p:nvPr/>
+        </p:nvSpPr>
+        <p:spPr>
+          <a:xfrm>
+            <a:off x="9641134" y="2552869"/>
+            <a:ext cx="498761" cy="369332"/>
+          </a:xfrm>
+          <a:prstGeom prst="rect">
+            <a:avLst/>
+          </a:prstGeom>
+          <a:noFill/>
+        </p:spPr>
+        <p:txBody>
+          <a:bodyPr wrap="square" rtlCol="0">
+            <a:spAutoFit/>
+          </a:bodyPr>
+          <a:lstStyle/>
+          <a:p>
+            <a:r>
+              <a:rPr lang="en-US" dirty="0"/>
+              <a:t>*</a:t>
+            </a:r>
+          </a:p>
+        </p:txBody>
+      </p:sp>
+      <p:cxnSp>
+        <p:nvCxnSpPr>
+          <p:cNvPr id="19" name="Straight Connector 18">
+            <a:extLst>
+              <a:ext uri="{FF2B5EF4-FFF2-40B4-BE49-F238E27FC236}">
+                <a16:creationId xmlns:a16="http://schemas.microsoft.com/office/drawing/2014/main" id="{DFA1DC84-D8B2-09DC-45CF-3F43899CB6C9}"/>
+              </a:ext>
+            </a:extLst>
+          </p:cNvPr>
+          <p:cNvCxnSpPr>
+            <a:cxnSpLocks/>
+            <a:stCxn id="4" idx="2"/>
+          </p:cNvCxnSpPr>
+          <p:nvPr/>
+        </p:nvCxnSpPr>
+        <p:spPr>
+          <a:xfrm>
+            <a:off x="6399993" y="1234889"/>
+            <a:ext cx="0" cy="450794"/>
+          </a:xfrm>
+          <a:prstGeom prst="line">
+            <a:avLst/>
+          </a:prstGeom>
+        </p:spPr>
+        <p:style>
+          <a:lnRef idx="1">
+            <a:schemeClr val="accent1"/>
+          </a:lnRef>
+          <a:fillRef idx="0">
+            <a:schemeClr val="accent1"/>
+          </a:fillRef>
+          <a:effectRef idx="0">
+            <a:schemeClr val="accent1"/>
+          </a:effectRef>
+          <a:fontRef idx="minor">
+            <a:schemeClr val="tx1"/>
+          </a:fontRef>
+        </p:style>
+      </p:cxnSp>
+      <p:sp>
+        <p:nvSpPr>
+          <p:cNvPr id="20" name="TextBox 19">
+            <a:extLst>
+              <a:ext uri="{FF2B5EF4-FFF2-40B4-BE49-F238E27FC236}">
+                <a16:creationId xmlns:a16="http://schemas.microsoft.com/office/drawing/2014/main" id="{62B8B628-0813-3211-24FA-9086AF0EC7FB}"/>
+              </a:ext>
+            </a:extLst>
+          </p:cNvPr>
+          <p:cNvSpPr txBox="1"/>
+          <p:nvPr/>
+        </p:nvSpPr>
+        <p:spPr>
+          <a:xfrm>
+            <a:off x="6426496" y="2929761"/>
+            <a:ext cx="498761" cy="369332"/>
+          </a:xfrm>
+          <a:prstGeom prst="rect">
+            <a:avLst/>
+          </a:prstGeom>
+          <a:noFill/>
+        </p:spPr>
+        <p:txBody>
+          <a:bodyPr wrap="square" rtlCol="0">
+            <a:spAutoFit/>
+          </a:bodyPr>
+          <a:lstStyle/>
+          <a:p>
+            <a:r>
+              <a:rPr lang="en-US" dirty="0"/>
+              <a:t>*</a:t>
+            </a:r>
+          </a:p>
+        </p:txBody>
+      </p:sp>
+      <p:graphicFrame>
+        <p:nvGraphicFramePr>
+          <p:cNvPr id="22" name="Table 21">
+            <a:extLst>
+              <a:ext uri="{FF2B5EF4-FFF2-40B4-BE49-F238E27FC236}">
+                <a16:creationId xmlns:a16="http://schemas.microsoft.com/office/drawing/2014/main" id="{F306CAAD-E9CB-465A-232A-6E1DC8C57D64}"/>
+              </a:ext>
+            </a:extLst>
+          </p:cNvPr>
+          <p:cNvGraphicFramePr>
+            <a:graphicFrameLocks noGrp="1"/>
+          </p:cNvGraphicFramePr>
+          <p:nvPr>
+            <p:extLst>
+              <p:ext uri="{D42A27DB-BD31-4B8C-83A1-F6EECF244321}">
+                <p14:modId xmlns:p14="http://schemas.microsoft.com/office/powerpoint/2010/main" val="2642440369"/>
+              </p:ext>
+            </p:extLst>
+          </p:nvPr>
+        </p:nvGraphicFramePr>
+        <p:xfrm>
+          <a:off x="5208688" y="4697553"/>
+          <a:ext cx="2627155" cy="1158240"/>
+        </p:xfrm>
+        <a:graphic>
+          <a:graphicData uri="http://schemas.openxmlformats.org/drawingml/2006/table">
+            <a:tbl>
+              <a:tblPr firstRow="1" bandRow="1">
+                <a:tableStyleId>{5C22544A-7EE6-4342-B048-85BDC9FD1C3A}</a:tableStyleId>
+              </a:tblPr>
+              <a:tblGrid>
+                <a:gridCol w="2627155">
+                  <a:extLst>
+                    <a:ext uri="{9D8B030D-6E8A-4147-A177-3AD203B41FA5}">
+                      <a16:colId xmlns:a16="http://schemas.microsoft.com/office/drawing/2014/main" val="1419940822"/>
+                    </a:ext>
+                  </a:extLst>
+                </a:gridCol>
+              </a:tblGrid>
+              <a:tr h="369291">
+                <a:tc>
+                  <a:txBody>
+                    <a:bodyPr/>
+                    <a:lstStyle/>
+                    <a:p>
+                      <a:pPr algn="ctr"/>
+                      <a:r>
+                        <a:rPr lang="en-US" sz="1400" b="0" dirty="0"/>
+                        <a:t>Abstract</a:t>
+                      </a:r>
+                    </a:p>
+                    <a:p>
+                      <a:pPr algn="ctr"/>
+                      <a:r>
+                        <a:rPr lang="en-US" sz="1400" b="0" dirty="0"/>
+                        <a:t>Item</a:t>
+                      </a:r>
+                    </a:p>
+                  </a:txBody>
+                  <a:tcPr/>
+                </a:tc>
+                <a:extLst>
+                  <a:ext uri="{0D108BD9-81ED-4DB2-BD59-A6C34878D82A}">
+                    <a16:rowId xmlns:a16="http://schemas.microsoft.com/office/drawing/2014/main" val="1122576610"/>
+                  </a:ext>
+                </a:extLst>
+              </a:tr>
+              <a:tr h="499593">
+                <a:tc>
+                  <a:txBody>
+                    <a:bodyPr/>
+                    <a:lstStyle/>
+                    <a:p>
+                      <a:r>
+                        <a:rPr lang="en-US" sz="1200" dirty="0"/>
+                        <a:t># name: string</a:t>
+                      </a:r>
+                    </a:p>
+                    <a:p>
+                      <a:r>
+                        <a:rPr lang="en-US" sz="1200" dirty="0"/>
+                        <a:t># price: number</a:t>
+                      </a:r>
+                    </a:p>
+                    <a:p>
+                      <a:r>
+                        <a:rPr lang="en-US" sz="1200" dirty="0"/>
+                        <a:t># quantity: number</a:t>
+                      </a:r>
+                    </a:p>
+                  </a:txBody>
+                  <a:tcPr/>
+                </a:tc>
+                <a:extLst>
+                  <a:ext uri="{0D108BD9-81ED-4DB2-BD59-A6C34878D82A}">
+                    <a16:rowId xmlns:a16="http://schemas.microsoft.com/office/drawing/2014/main" val="1648744592"/>
+                  </a:ext>
+                </a:extLst>
+              </a:tr>
+            </a:tbl>
+          </a:graphicData>
+        </a:graphic>
+      </p:graphicFrame>
+      <p:grpSp>
+        <p:nvGrpSpPr>
+          <p:cNvPr id="23" name="Group 22">
+            <a:extLst>
+              <a:ext uri="{FF2B5EF4-FFF2-40B4-BE49-F238E27FC236}">
+                <a16:creationId xmlns:a16="http://schemas.microsoft.com/office/drawing/2014/main" id="{0DC84C8B-4448-578A-3B84-E65F5469EFE9}"/>
+              </a:ext>
+            </a:extLst>
+          </p:cNvPr>
+          <p:cNvGrpSpPr/>
+          <p:nvPr/>
+        </p:nvGrpSpPr>
+        <p:grpSpPr>
+          <a:xfrm>
+            <a:off x="7796090" y="5230295"/>
+            <a:ext cx="910588" cy="152399"/>
+            <a:chOff x="3007249" y="2641125"/>
+            <a:chExt cx="653646" cy="116044"/>
+          </a:xfrm>
+        </p:grpSpPr>
+        <p:cxnSp>
+          <p:nvCxnSpPr>
+            <p:cNvPr id="24" name="Straight Arrow Connector 23">
+              <a:extLst>
+                <a:ext uri="{FF2B5EF4-FFF2-40B4-BE49-F238E27FC236}">
+                  <a16:creationId xmlns:a16="http://schemas.microsoft.com/office/drawing/2014/main" id="{48A17301-0818-26D1-82BA-6BFEB2E61B0C}"/>
+                </a:ext>
+              </a:extLst>
+            </p:cNvPr>
+            <p:cNvCxnSpPr>
+              <a:cxnSpLocks/>
+            </p:cNvCxnSpPr>
+            <p:nvPr/>
+          </p:nvCxnSpPr>
+          <p:spPr>
+            <a:xfrm flipH="1">
+              <a:off x="3038759" y="2696622"/>
+              <a:ext cx="622136" cy="0"/>
+            </a:xfrm>
+            <a:prstGeom prst="straightConnector1">
+              <a:avLst/>
+            </a:prstGeom>
+            <a:ln>
+              <a:tailEnd type="triangle"/>
+            </a:ln>
+          </p:spPr>
+          <p:style>
+            <a:lnRef idx="1">
+              <a:schemeClr val="accent1"/>
+            </a:lnRef>
+            <a:fillRef idx="0">
+              <a:schemeClr val="accent1"/>
+            </a:fillRef>
+            <a:effectRef idx="0">
+              <a:schemeClr val="accent1"/>
+            </a:effectRef>
+            <a:fontRef idx="minor">
+              <a:schemeClr val="tx1"/>
+            </a:fontRef>
+          </p:style>
+        </p:cxnSp>
+        <p:sp>
+          <p:nvSpPr>
+            <p:cNvPr id="25" name="Isosceles Triangle 24">
+              <a:extLst>
+                <a:ext uri="{FF2B5EF4-FFF2-40B4-BE49-F238E27FC236}">
+                  <a16:creationId xmlns:a16="http://schemas.microsoft.com/office/drawing/2014/main" id="{84E8D9D8-CD5B-8644-D214-DF052D321AC0}"/>
+                </a:ext>
+              </a:extLst>
+            </p:cNvPr>
+            <p:cNvSpPr/>
+            <p:nvPr/>
+          </p:nvSpPr>
+          <p:spPr>
+            <a:xfrm rot="16200000">
+              <a:off x="2995425" y="2652949"/>
+              <a:ext cx="116044" cy="92395"/>
+            </a:xfrm>
+            <a:prstGeom prst="triangle">
+              <a:avLst/>
+            </a:prstGeom>
+            <a:solidFill>
+              <a:schemeClr val="bg1"/>
+            </a:solidFill>
+          </p:spPr>
+          <p:style>
+            <a:lnRef idx="2">
+              <a:schemeClr val="accent1">
+                <a:shade val="50000"/>
+              </a:schemeClr>
+            </a:lnRef>
+            <a:fillRef idx="1">
+              <a:schemeClr val="accent1"/>
+            </a:fillRef>
+            <a:effectRef idx="0">
+              <a:schemeClr val="accent1"/>
+            </a:effectRef>
+            <a:fontRef idx="minor">
+              <a:schemeClr val="lt1"/>
+            </a:fontRef>
+          </p:style>
+          <p:txBody>
+            <a:bodyPr rtlCol="0" anchor="ctr"/>
+            <a:lstStyle/>
+            <a:p>
+              <a:pPr algn="ctr"/>
+              <a:endParaRPr lang="en-US" dirty="0"/>
+            </a:p>
+          </p:txBody>
+        </p:sp>
+      </p:grpSp>
+      <p:cxnSp>
+        <p:nvCxnSpPr>
+          <p:cNvPr id="32" name="Straight Connector 31">
+            <a:extLst>
+              <a:ext uri="{FF2B5EF4-FFF2-40B4-BE49-F238E27FC236}">
+                <a16:creationId xmlns:a16="http://schemas.microsoft.com/office/drawing/2014/main" id="{065C9C74-CA23-9800-9563-D48479C19420}"/>
+              </a:ext>
+            </a:extLst>
+          </p:cNvPr>
+          <p:cNvCxnSpPr>
+            <a:cxnSpLocks/>
+          </p:cNvCxnSpPr>
+          <p:nvPr/>
+        </p:nvCxnSpPr>
+        <p:spPr>
+          <a:xfrm>
+            <a:off x="8706674" y="3651843"/>
+            <a:ext cx="0" cy="1651334"/>
           </a:xfrm>
           <a:prstGeom prst="line">
             <a:avLst/>
@@ -6534,10 +6977,10 @@
       </p:cxnSp>
       <p:graphicFrame>
         <p:nvGraphicFramePr>
-          <p:cNvPr id="50" name="Table 49">
-            <a:extLst>
-              <a:ext uri="{FF2B5EF4-FFF2-40B4-BE49-F238E27FC236}">
-                <a16:creationId xmlns:a16="http://schemas.microsoft.com/office/drawing/2014/main" id="{CF23E0C8-FC17-F4B2-BBDB-5CC70EB07845}"/>
+          <p:cNvPr id="35" name="Table 34">
+            <a:extLst>
+              <a:ext uri="{FF2B5EF4-FFF2-40B4-BE49-F238E27FC236}">
+                <a16:creationId xmlns:a16="http://schemas.microsoft.com/office/drawing/2014/main" id="{2936CB7C-F45F-1844-4E6A-29AB1FA9043A}"/>
               </a:ext>
             </a:extLst>
           </p:cNvPr>
@@ -6547,13 +6990,1123 @@
           <p:nvPr>
             <p:extLst>
               <p:ext uri="{D42A27DB-BD31-4B8C-83A1-F6EECF244321}">
-                <p14:modId xmlns:p14="http://schemas.microsoft.com/office/powerpoint/2010/main" val="2053109043"/>
+                <p14:modId xmlns:p14="http://schemas.microsoft.com/office/powerpoint/2010/main" val="2374029796"/>
               </p:ext>
             </p:extLst>
           </p:nvPr>
         </p:nvGraphicFramePr>
         <p:xfrm>
-          <a:off x="7214411" y="1646578"/>
+          <a:off x="1077317" y="107129"/>
+          <a:ext cx="2153398" cy="1889760"/>
+        </p:xfrm>
+        <a:graphic>
+          <a:graphicData uri="http://schemas.openxmlformats.org/drawingml/2006/table">
+            <a:tbl>
+              <a:tblPr firstRow="1" bandRow="1">
+                <a:tableStyleId>{5C22544A-7EE6-4342-B048-85BDC9FD1C3A}</a:tableStyleId>
+              </a:tblPr>
+              <a:tblGrid>
+                <a:gridCol w="2153398">
+                  <a:extLst>
+                    <a:ext uri="{9D8B030D-6E8A-4147-A177-3AD203B41FA5}">
+                      <a16:colId xmlns:a16="http://schemas.microsoft.com/office/drawing/2014/main" val="1419940822"/>
+                    </a:ext>
+                  </a:extLst>
+                </a:gridCol>
+              </a:tblGrid>
+              <a:tr h="419489">
+                <a:tc>
+                  <a:txBody>
+                    <a:bodyPr/>
+                    <a:lstStyle/>
+                    <a:p>
+                      <a:pPr algn="ctr"/>
+                      <a:r>
+                        <a:rPr lang="en-US" sz="1400" b="0" dirty="0"/>
+                        <a:t>&lt;</a:t>
+                      </a:r>
+                      <a:r>
+                        <a:rPr lang="en-US" sz="1400" b="0" dirty="0" err="1"/>
+                        <a:t>enum</a:t>
+                      </a:r>
+                      <a:r>
+                        <a:rPr lang="en-US" sz="1400" b="0" dirty="0"/>
+                        <a:t>&gt;</a:t>
+                      </a:r>
+                    </a:p>
+                    <a:p>
+                      <a:pPr algn="ctr"/>
+                      <a:r>
+                        <a:rPr lang="en-US" sz="1400" b="0" dirty="0" err="1"/>
+                        <a:t>DrinksCategory</a:t>
+                      </a:r>
+                      <a:endParaRPr lang="en-US" sz="1400" b="0" dirty="0"/>
+                    </a:p>
+                  </a:txBody>
+                  <a:tcPr/>
+                </a:tc>
+                <a:extLst>
+                  <a:ext uri="{0D108BD9-81ED-4DB2-BD59-A6C34878D82A}">
+                    <a16:rowId xmlns:a16="http://schemas.microsoft.com/office/drawing/2014/main" val="1122576610"/>
+                  </a:ext>
+                </a:extLst>
+              </a:tr>
+              <a:tr h="528906">
+                <a:tc>
+                  <a:txBody>
+                    <a:bodyPr/>
+                    <a:lstStyle/>
+                    <a:p>
+                      <a:r>
+                        <a:rPr lang="en-US" sz="1200" dirty="0"/>
+                        <a:t>COCA-COLA,</a:t>
+                      </a:r>
+                    </a:p>
+                    <a:p>
+                      <a:r>
+                        <a:rPr lang="en-US" sz="1200" dirty="0"/>
+                        <a:t>PEPSI,</a:t>
+                      </a:r>
+                    </a:p>
+                    <a:p>
+                      <a:r>
+                        <a:rPr lang="en-US" sz="1200" dirty="0"/>
+                        <a:t>BACHUS,</a:t>
+                      </a:r>
+                    </a:p>
+                    <a:p>
+                      <a:r>
+                        <a:rPr lang="en-US" sz="1200" dirty="0"/>
+                        <a:t>OISHI</a:t>
+                      </a:r>
+                    </a:p>
+                    <a:p>
+                      <a:r>
+                        <a:rPr lang="en-US" sz="1200" dirty="0"/>
+                        <a:t>STING,</a:t>
+                      </a:r>
+                    </a:p>
+                    <a:p>
+                      <a:r>
+                        <a:rPr lang="en-US" sz="1200" dirty="0"/>
+                        <a:t>CAFÉ MEAL</a:t>
+                      </a:r>
+                    </a:p>
+                    <a:p>
+                      <a:endParaRPr lang="en-US" sz="1200" dirty="0"/>
+                    </a:p>
+                  </a:txBody>
+                  <a:tcPr/>
+                </a:tc>
+                <a:extLst>
+                  <a:ext uri="{0D108BD9-81ED-4DB2-BD59-A6C34878D82A}">
+                    <a16:rowId xmlns:a16="http://schemas.microsoft.com/office/drawing/2014/main" val="1648744592"/>
+                  </a:ext>
+                </a:extLst>
+              </a:tr>
+            </a:tbl>
+          </a:graphicData>
+        </a:graphic>
+      </p:graphicFrame>
+      <p:graphicFrame>
+        <p:nvGraphicFramePr>
+          <p:cNvPr id="37" name="Table 36">
+            <a:extLst>
+              <a:ext uri="{FF2B5EF4-FFF2-40B4-BE49-F238E27FC236}">
+                <a16:creationId xmlns:a16="http://schemas.microsoft.com/office/drawing/2014/main" id="{AA5C8D79-B784-4E66-4DB3-F39AAFF8EF1F}"/>
+              </a:ext>
+            </a:extLst>
+          </p:cNvPr>
+          <p:cNvGraphicFramePr>
+            <a:graphicFrameLocks noGrp="1"/>
+          </p:cNvGraphicFramePr>
+          <p:nvPr>
+            <p:extLst>
+              <p:ext uri="{D42A27DB-BD31-4B8C-83A1-F6EECF244321}">
+                <p14:modId xmlns:p14="http://schemas.microsoft.com/office/powerpoint/2010/main" val="1512248214"/>
+              </p:ext>
+            </p:extLst>
+          </p:nvPr>
+        </p:nvGraphicFramePr>
+        <p:xfrm>
+          <a:off x="862706" y="2620968"/>
+          <a:ext cx="1032138" cy="921891"/>
+        </p:xfrm>
+        <a:graphic>
+          <a:graphicData uri="http://schemas.openxmlformats.org/drawingml/2006/table">
+            <a:tbl>
+              <a:tblPr firstRow="1" bandRow="1">
+                <a:tableStyleId>{5C22544A-7EE6-4342-B048-85BDC9FD1C3A}</a:tableStyleId>
+              </a:tblPr>
+              <a:tblGrid>
+                <a:gridCol w="1032138">
+                  <a:extLst>
+                    <a:ext uri="{9D8B030D-6E8A-4147-A177-3AD203B41FA5}">
+                      <a16:colId xmlns:a16="http://schemas.microsoft.com/office/drawing/2014/main" val="1419940822"/>
+                    </a:ext>
+                  </a:extLst>
+                </a:gridCol>
+              </a:tblGrid>
+              <a:tr h="407766">
+                <a:tc>
+                  <a:txBody>
+                    <a:bodyPr/>
+                    <a:lstStyle/>
+                    <a:p>
+                      <a:pPr algn="ctr"/>
+                      <a:r>
+                        <a:rPr lang="en-US" sz="1600" b="0" dirty="0"/>
+                        <a:t>Drinks</a:t>
+                      </a:r>
+                    </a:p>
+                  </a:txBody>
+                  <a:tcPr/>
+                </a:tc>
+                <a:extLst>
+                  <a:ext uri="{0D108BD9-81ED-4DB2-BD59-A6C34878D82A}">
+                    <a16:rowId xmlns:a16="http://schemas.microsoft.com/office/drawing/2014/main" val="1122576610"/>
+                  </a:ext>
+                </a:extLst>
+              </a:tr>
+              <a:tr h="514125">
+                <a:tc>
+                  <a:txBody>
+                    <a:bodyPr/>
+                    <a:lstStyle/>
+                    <a:p>
+                      <a:endParaRPr lang="en-US" sz="1400" dirty="0"/>
+                    </a:p>
+                  </a:txBody>
+                  <a:tcPr/>
+                </a:tc>
+                <a:extLst>
+                  <a:ext uri="{0D108BD9-81ED-4DB2-BD59-A6C34878D82A}">
+                    <a16:rowId xmlns:a16="http://schemas.microsoft.com/office/drawing/2014/main" val="1648744592"/>
+                  </a:ext>
+                </a:extLst>
+              </a:tr>
+            </a:tbl>
+          </a:graphicData>
+        </a:graphic>
+      </p:graphicFrame>
+      <p:graphicFrame>
+        <p:nvGraphicFramePr>
+          <p:cNvPr id="38" name="Table 37">
+            <a:extLst>
+              <a:ext uri="{FF2B5EF4-FFF2-40B4-BE49-F238E27FC236}">
+                <a16:creationId xmlns:a16="http://schemas.microsoft.com/office/drawing/2014/main" id="{9DCEDD0C-1A1E-DA3D-2943-8F9D0513E0EF}"/>
+              </a:ext>
+            </a:extLst>
+          </p:cNvPr>
+          <p:cNvGraphicFramePr>
+            <a:graphicFrameLocks noGrp="1"/>
+          </p:cNvGraphicFramePr>
+          <p:nvPr>
+            <p:extLst>
+              <p:ext uri="{D42A27DB-BD31-4B8C-83A1-F6EECF244321}">
+                <p14:modId xmlns:p14="http://schemas.microsoft.com/office/powerpoint/2010/main" val="204017347"/>
+              </p:ext>
+            </p:extLst>
+          </p:nvPr>
+        </p:nvGraphicFramePr>
+        <p:xfrm>
+          <a:off x="862706" y="4125928"/>
+          <a:ext cx="1006289" cy="1023051"/>
+        </p:xfrm>
+        <a:graphic>
+          <a:graphicData uri="http://schemas.openxmlformats.org/drawingml/2006/table">
+            <a:tbl>
+              <a:tblPr firstRow="1" bandRow="1">
+                <a:tableStyleId>{5C22544A-7EE6-4342-B048-85BDC9FD1C3A}</a:tableStyleId>
+              </a:tblPr>
+              <a:tblGrid>
+                <a:gridCol w="1006289">
+                  <a:extLst>
+                    <a:ext uri="{9D8B030D-6E8A-4147-A177-3AD203B41FA5}">
+                      <a16:colId xmlns:a16="http://schemas.microsoft.com/office/drawing/2014/main" val="1419940822"/>
+                    </a:ext>
+                  </a:extLst>
+                </a:gridCol>
+              </a:tblGrid>
+              <a:tr h="452510">
+                <a:tc>
+                  <a:txBody>
+                    <a:bodyPr/>
+                    <a:lstStyle/>
+                    <a:p>
+                      <a:pPr algn="ctr"/>
+                      <a:r>
+                        <a:rPr lang="en-US" sz="1600" b="0" dirty="0"/>
+                        <a:t>Wine</a:t>
+                      </a:r>
+                    </a:p>
+                  </a:txBody>
+                  <a:tcPr/>
+                </a:tc>
+                <a:extLst>
+                  <a:ext uri="{0D108BD9-81ED-4DB2-BD59-A6C34878D82A}">
+                    <a16:rowId xmlns:a16="http://schemas.microsoft.com/office/drawing/2014/main" val="1122576610"/>
+                  </a:ext>
+                </a:extLst>
+              </a:tr>
+              <a:tr h="570541">
+                <a:tc>
+                  <a:txBody>
+                    <a:bodyPr/>
+                    <a:lstStyle/>
+                    <a:p>
+                      <a:endParaRPr lang="en-US" sz="1400" dirty="0"/>
+                    </a:p>
+                  </a:txBody>
+                  <a:tcPr/>
+                </a:tc>
+                <a:extLst>
+                  <a:ext uri="{0D108BD9-81ED-4DB2-BD59-A6C34878D82A}">
+                    <a16:rowId xmlns:a16="http://schemas.microsoft.com/office/drawing/2014/main" val="1648744592"/>
+                  </a:ext>
+                </a:extLst>
+              </a:tr>
+            </a:tbl>
+          </a:graphicData>
+        </a:graphic>
+      </p:graphicFrame>
+      <p:grpSp>
+        <p:nvGrpSpPr>
+          <p:cNvPr id="40" name="Group 39">
+            <a:extLst>
+              <a:ext uri="{FF2B5EF4-FFF2-40B4-BE49-F238E27FC236}">
+                <a16:creationId xmlns:a16="http://schemas.microsoft.com/office/drawing/2014/main" id="{BB90D6F7-6F4F-8488-DFEE-2615C0A7425E}"/>
+              </a:ext>
+            </a:extLst>
+          </p:cNvPr>
+          <p:cNvGrpSpPr/>
+          <p:nvPr/>
+        </p:nvGrpSpPr>
+        <p:grpSpPr>
+          <a:xfrm flipH="1">
+            <a:off x="1855650" y="3120572"/>
+            <a:ext cx="419570" cy="152020"/>
+            <a:chOff x="2946069" y="2644762"/>
+            <a:chExt cx="968395" cy="137185"/>
+          </a:xfrm>
+        </p:grpSpPr>
+        <p:cxnSp>
+          <p:nvCxnSpPr>
+            <p:cNvPr id="41" name="Straight Arrow Connector 40">
+              <a:extLst>
+                <a:ext uri="{FF2B5EF4-FFF2-40B4-BE49-F238E27FC236}">
+                  <a16:creationId xmlns:a16="http://schemas.microsoft.com/office/drawing/2014/main" id="{E864C9F5-30BC-800B-66F7-5A3334363865}"/>
+                </a:ext>
+              </a:extLst>
+            </p:cNvPr>
+            <p:cNvCxnSpPr>
+              <a:cxnSpLocks/>
+            </p:cNvCxnSpPr>
+            <p:nvPr/>
+          </p:nvCxnSpPr>
+          <p:spPr>
+            <a:xfrm flipH="1">
+              <a:off x="3038762" y="2693221"/>
+              <a:ext cx="875702" cy="0"/>
+            </a:xfrm>
+            <a:prstGeom prst="straightConnector1">
+              <a:avLst/>
+            </a:prstGeom>
+            <a:ln>
+              <a:tailEnd type="triangle"/>
+            </a:ln>
+          </p:spPr>
+          <p:style>
+            <a:lnRef idx="1">
+              <a:schemeClr val="accent1"/>
+            </a:lnRef>
+            <a:fillRef idx="0">
+              <a:schemeClr val="accent1"/>
+            </a:fillRef>
+            <a:effectRef idx="0">
+              <a:schemeClr val="accent1"/>
+            </a:effectRef>
+            <a:fontRef idx="minor">
+              <a:schemeClr val="tx1"/>
+            </a:fontRef>
+          </p:style>
+        </p:cxnSp>
+        <p:sp>
+          <p:nvSpPr>
+            <p:cNvPr id="42" name="Isosceles Triangle 41">
+              <a:extLst>
+                <a:ext uri="{FF2B5EF4-FFF2-40B4-BE49-F238E27FC236}">
+                  <a16:creationId xmlns:a16="http://schemas.microsoft.com/office/drawing/2014/main" id="{81F1F988-EA2B-E443-A592-F3EED5163678}"/>
+                </a:ext>
+              </a:extLst>
+            </p:cNvPr>
+            <p:cNvSpPr/>
+            <p:nvPr/>
+          </p:nvSpPr>
+          <p:spPr>
+            <a:xfrm rot="16200000">
+              <a:off x="3047841" y="2542990"/>
+              <a:ext cx="137185" cy="340729"/>
+            </a:xfrm>
+            <a:prstGeom prst="triangle">
+              <a:avLst/>
+            </a:prstGeom>
+            <a:solidFill>
+              <a:schemeClr val="bg1"/>
+            </a:solidFill>
+          </p:spPr>
+          <p:style>
+            <a:lnRef idx="2">
+              <a:schemeClr val="accent1">
+                <a:shade val="50000"/>
+              </a:schemeClr>
+            </a:lnRef>
+            <a:fillRef idx="1">
+              <a:schemeClr val="accent1"/>
+            </a:fillRef>
+            <a:effectRef idx="0">
+              <a:schemeClr val="accent1"/>
+            </a:effectRef>
+            <a:fontRef idx="minor">
+              <a:schemeClr val="lt1"/>
+            </a:fontRef>
+          </p:style>
+          <p:txBody>
+            <a:bodyPr rtlCol="0" anchor="ctr"/>
+            <a:lstStyle/>
+            <a:p>
+              <a:pPr algn="ctr"/>
+              <a:endParaRPr lang="en-US" dirty="0"/>
+            </a:p>
+          </p:txBody>
+        </p:sp>
+      </p:grpSp>
+      <p:grpSp>
+        <p:nvGrpSpPr>
+          <p:cNvPr id="43" name="Group 42">
+            <a:extLst>
+              <a:ext uri="{FF2B5EF4-FFF2-40B4-BE49-F238E27FC236}">
+                <a16:creationId xmlns:a16="http://schemas.microsoft.com/office/drawing/2014/main" id="{30B3A7AD-03D8-9AD6-875E-D6B3D620B0BD}"/>
+              </a:ext>
+            </a:extLst>
+          </p:cNvPr>
+          <p:cNvGrpSpPr/>
+          <p:nvPr/>
+        </p:nvGrpSpPr>
+        <p:grpSpPr>
+          <a:xfrm rot="16200000" flipH="1">
+            <a:off x="2228424" y="3903278"/>
+            <a:ext cx="691816" cy="219883"/>
+            <a:chOff x="3007248" y="2580578"/>
+            <a:chExt cx="907216" cy="225287"/>
+          </a:xfrm>
+        </p:grpSpPr>
+        <p:cxnSp>
+          <p:nvCxnSpPr>
+            <p:cNvPr id="44" name="Straight Arrow Connector 43">
+              <a:extLst>
+                <a:ext uri="{FF2B5EF4-FFF2-40B4-BE49-F238E27FC236}">
+                  <a16:creationId xmlns:a16="http://schemas.microsoft.com/office/drawing/2014/main" id="{002B93BB-7737-7B86-41E4-461A2310A713}"/>
+                </a:ext>
+              </a:extLst>
+            </p:cNvPr>
+            <p:cNvCxnSpPr>
+              <a:cxnSpLocks/>
+            </p:cNvCxnSpPr>
+            <p:nvPr/>
+          </p:nvCxnSpPr>
+          <p:spPr>
+            <a:xfrm flipH="1">
+              <a:off x="3038762" y="2693221"/>
+              <a:ext cx="875702" cy="0"/>
+            </a:xfrm>
+            <a:prstGeom prst="straightConnector1">
+              <a:avLst/>
+            </a:prstGeom>
+            <a:ln>
+              <a:tailEnd type="triangle"/>
+            </a:ln>
+          </p:spPr>
+          <p:style>
+            <a:lnRef idx="1">
+              <a:schemeClr val="accent1"/>
+            </a:lnRef>
+            <a:fillRef idx="0">
+              <a:schemeClr val="accent1"/>
+            </a:fillRef>
+            <a:effectRef idx="0">
+              <a:schemeClr val="accent1"/>
+            </a:effectRef>
+            <a:fontRef idx="minor">
+              <a:schemeClr val="tx1"/>
+            </a:fontRef>
+          </p:style>
+        </p:cxnSp>
+        <p:sp>
+          <p:nvSpPr>
+            <p:cNvPr id="45" name="Isosceles Triangle 44">
+              <a:extLst>
+                <a:ext uri="{FF2B5EF4-FFF2-40B4-BE49-F238E27FC236}">
+                  <a16:creationId xmlns:a16="http://schemas.microsoft.com/office/drawing/2014/main" id="{7416385F-E87A-6AE7-9973-1671D5F263B2}"/>
+                </a:ext>
+              </a:extLst>
+            </p:cNvPr>
+            <p:cNvSpPr/>
+            <p:nvPr/>
+          </p:nvSpPr>
+          <p:spPr>
+            <a:xfrm rot="16200000">
+              <a:off x="2987370" y="2600456"/>
+              <a:ext cx="225287" cy="185531"/>
+            </a:xfrm>
+            <a:prstGeom prst="triangle">
+              <a:avLst/>
+            </a:prstGeom>
+            <a:solidFill>
+              <a:schemeClr val="bg1"/>
+            </a:solidFill>
+          </p:spPr>
+          <p:style>
+            <a:lnRef idx="2">
+              <a:schemeClr val="accent1">
+                <a:shade val="50000"/>
+              </a:schemeClr>
+            </a:lnRef>
+            <a:fillRef idx="1">
+              <a:schemeClr val="accent1"/>
+            </a:fillRef>
+            <a:effectRef idx="0">
+              <a:schemeClr val="accent1"/>
+            </a:effectRef>
+            <a:fontRef idx="minor">
+              <a:schemeClr val="lt1"/>
+            </a:fontRef>
+          </p:style>
+          <p:txBody>
+            <a:bodyPr rtlCol="0" anchor="ctr"/>
+            <a:lstStyle/>
+            <a:p>
+              <a:pPr algn="ctr"/>
+              <a:endParaRPr lang="en-US" dirty="0"/>
+            </a:p>
+          </p:txBody>
+        </p:sp>
+      </p:grpSp>
+      <p:graphicFrame>
+        <p:nvGraphicFramePr>
+          <p:cNvPr id="46" name="Table 45">
+            <a:extLst>
+              <a:ext uri="{FF2B5EF4-FFF2-40B4-BE49-F238E27FC236}">
+                <a16:creationId xmlns:a16="http://schemas.microsoft.com/office/drawing/2014/main" id="{470C8E19-883B-64EC-81F7-52C67AF729B0}"/>
+              </a:ext>
+            </a:extLst>
+          </p:cNvPr>
+          <p:cNvGraphicFramePr>
+            <a:graphicFrameLocks noGrp="1"/>
+          </p:cNvGraphicFramePr>
+          <p:nvPr>
+            <p:extLst>
+              <p:ext uri="{D42A27DB-BD31-4B8C-83A1-F6EECF244321}">
+                <p14:modId xmlns:p14="http://schemas.microsoft.com/office/powerpoint/2010/main" val="1883588419"/>
+              </p:ext>
+            </p:extLst>
+          </p:nvPr>
+        </p:nvGraphicFramePr>
+        <p:xfrm>
+          <a:off x="5504316" y="3147074"/>
+          <a:ext cx="1932305" cy="1025199"/>
+        </p:xfrm>
+        <a:graphic>
+          <a:graphicData uri="http://schemas.openxmlformats.org/drawingml/2006/table">
+            <a:tbl>
+              <a:tblPr firstRow="1" bandRow="1">
+                <a:tableStyleId>{5C22544A-7EE6-4342-B048-85BDC9FD1C3A}</a:tableStyleId>
+              </a:tblPr>
+              <a:tblGrid>
+                <a:gridCol w="1932305">
+                  <a:extLst>
+                    <a:ext uri="{9D8B030D-6E8A-4147-A177-3AD203B41FA5}">
+                      <a16:colId xmlns:a16="http://schemas.microsoft.com/office/drawing/2014/main" val="1419940822"/>
+                    </a:ext>
+                  </a:extLst>
+                </a:gridCol>
+              </a:tblGrid>
+              <a:tr h="511074">
+                <a:tc>
+                  <a:txBody>
+                    <a:bodyPr/>
+                    <a:lstStyle/>
+                    <a:p>
+                      <a:pPr algn="ctr"/>
+                      <a:r>
+                        <a:rPr lang="en-US" sz="1600" b="0" dirty="0"/>
+                        <a:t>Dessert</a:t>
+                      </a:r>
+                    </a:p>
+                  </a:txBody>
+                  <a:tcPr/>
+                </a:tc>
+                <a:extLst>
+                  <a:ext uri="{0D108BD9-81ED-4DB2-BD59-A6C34878D82A}">
+                    <a16:rowId xmlns:a16="http://schemas.microsoft.com/office/drawing/2014/main" val="1122576610"/>
+                  </a:ext>
+                </a:extLst>
+              </a:tr>
+              <a:tr h="514125">
+                <a:tc>
+                  <a:txBody>
+                    <a:bodyPr/>
+                    <a:lstStyle/>
+                    <a:p>
+                      <a:endParaRPr lang="en-US" sz="1400" dirty="0"/>
+                    </a:p>
+                  </a:txBody>
+                  <a:tcPr/>
+                </a:tc>
+                <a:extLst>
+                  <a:ext uri="{0D108BD9-81ED-4DB2-BD59-A6C34878D82A}">
+                    <a16:rowId xmlns:a16="http://schemas.microsoft.com/office/drawing/2014/main" val="1648744592"/>
+                  </a:ext>
+                </a:extLst>
+              </a:tr>
+            </a:tbl>
+          </a:graphicData>
+        </a:graphic>
+      </p:graphicFrame>
+      <p:cxnSp>
+        <p:nvCxnSpPr>
+          <p:cNvPr id="48" name="Straight Connector 47">
+            <a:extLst>
+              <a:ext uri="{FF2B5EF4-FFF2-40B4-BE49-F238E27FC236}">
+                <a16:creationId xmlns:a16="http://schemas.microsoft.com/office/drawing/2014/main" id="{5063797F-810D-AFA5-69D1-2BC394B85CE0}"/>
+              </a:ext>
+            </a:extLst>
+          </p:cNvPr>
+          <p:cNvCxnSpPr>
+            <a:cxnSpLocks/>
+          </p:cNvCxnSpPr>
+          <p:nvPr/>
+        </p:nvCxnSpPr>
+        <p:spPr>
+          <a:xfrm>
+            <a:off x="1378775" y="1991284"/>
+            <a:ext cx="0" cy="687163"/>
+          </a:xfrm>
+          <a:prstGeom prst="line">
+            <a:avLst/>
+          </a:prstGeom>
+        </p:spPr>
+        <p:style>
+          <a:lnRef idx="1">
+            <a:schemeClr val="accent1"/>
+          </a:lnRef>
+          <a:fillRef idx="0">
+            <a:schemeClr val="accent1"/>
+          </a:fillRef>
+          <a:effectRef idx="0">
+            <a:schemeClr val="accent1"/>
+          </a:effectRef>
+          <a:fontRef idx="minor">
+            <a:schemeClr val="tx1"/>
+          </a:fontRef>
+        </p:style>
+      </p:cxnSp>
+      <p:sp>
+        <p:nvSpPr>
+          <p:cNvPr id="51" name="TextBox 50">
+            <a:extLst>
+              <a:ext uri="{FF2B5EF4-FFF2-40B4-BE49-F238E27FC236}">
+                <a16:creationId xmlns:a16="http://schemas.microsoft.com/office/drawing/2014/main" id="{F40D9376-455C-CA69-5BAF-58FA3CEF104F}"/>
+              </a:ext>
+            </a:extLst>
+          </p:cNvPr>
+          <p:cNvSpPr txBox="1"/>
+          <p:nvPr/>
+        </p:nvSpPr>
+        <p:spPr>
+          <a:xfrm>
+            <a:off x="6383359" y="1423186"/>
+            <a:ext cx="498761" cy="369332"/>
+          </a:xfrm>
+          <a:prstGeom prst="rect">
+            <a:avLst/>
+          </a:prstGeom>
+          <a:noFill/>
+        </p:spPr>
+        <p:txBody>
+          <a:bodyPr wrap="square" rtlCol="0">
+            <a:spAutoFit/>
+          </a:bodyPr>
+          <a:lstStyle/>
+          <a:p>
+            <a:r>
+              <a:rPr lang="en-US" dirty="0"/>
+              <a:t>*</a:t>
+            </a:r>
+          </a:p>
+        </p:txBody>
+      </p:sp>
+      <p:cxnSp>
+        <p:nvCxnSpPr>
+          <p:cNvPr id="52" name="Straight Connector 51">
+            <a:extLst>
+              <a:ext uri="{FF2B5EF4-FFF2-40B4-BE49-F238E27FC236}">
+                <a16:creationId xmlns:a16="http://schemas.microsoft.com/office/drawing/2014/main" id="{04055BDA-6338-0630-5128-3EA0BDB04779}"/>
+              </a:ext>
+            </a:extLst>
+          </p:cNvPr>
+          <p:cNvCxnSpPr>
+            <a:cxnSpLocks/>
+          </p:cNvCxnSpPr>
+          <p:nvPr/>
+        </p:nvCxnSpPr>
+        <p:spPr>
+          <a:xfrm>
+            <a:off x="6632740" y="2765220"/>
+            <a:ext cx="0" cy="413579"/>
+          </a:xfrm>
+          <a:prstGeom prst="line">
+            <a:avLst/>
+          </a:prstGeom>
+        </p:spPr>
+        <p:style>
+          <a:lnRef idx="1">
+            <a:schemeClr val="accent1"/>
+          </a:lnRef>
+          <a:fillRef idx="0">
+            <a:schemeClr val="accent1"/>
+          </a:fillRef>
+          <a:effectRef idx="0">
+            <a:schemeClr val="accent1"/>
+          </a:effectRef>
+          <a:fontRef idx="minor">
+            <a:schemeClr val="tx1"/>
+          </a:fontRef>
+        </p:style>
+      </p:cxnSp>
+      <p:grpSp>
+        <p:nvGrpSpPr>
+          <p:cNvPr id="74" name="Group 73">
+            <a:extLst>
+              <a:ext uri="{FF2B5EF4-FFF2-40B4-BE49-F238E27FC236}">
+                <a16:creationId xmlns:a16="http://schemas.microsoft.com/office/drawing/2014/main" id="{4B4FA46D-9DF7-E08F-4330-E32750F5028C}"/>
+              </a:ext>
+            </a:extLst>
+          </p:cNvPr>
+          <p:cNvGrpSpPr/>
+          <p:nvPr/>
+        </p:nvGrpSpPr>
+        <p:grpSpPr>
+          <a:xfrm rot="16200000" flipH="1">
+            <a:off x="3824787" y="3917552"/>
+            <a:ext cx="1649026" cy="1117614"/>
+            <a:chOff x="3476682" y="3301282"/>
+            <a:chExt cx="1049322" cy="1403760"/>
+          </a:xfrm>
+        </p:grpSpPr>
+        <p:cxnSp>
+          <p:nvCxnSpPr>
+            <p:cNvPr id="62" name="Straight Connector 61">
+              <a:extLst>
+                <a:ext uri="{FF2B5EF4-FFF2-40B4-BE49-F238E27FC236}">
+                  <a16:creationId xmlns:a16="http://schemas.microsoft.com/office/drawing/2014/main" id="{01073956-A243-3953-6CAD-D3712049BB63}"/>
+                </a:ext>
+              </a:extLst>
+            </p:cNvPr>
+            <p:cNvCxnSpPr/>
+            <p:nvPr/>
+          </p:nvCxnSpPr>
+          <p:spPr>
+            <a:xfrm>
+              <a:off x="3476682" y="3301282"/>
+              <a:ext cx="976632" cy="0"/>
+            </a:xfrm>
+            <a:prstGeom prst="line">
+              <a:avLst/>
+            </a:prstGeom>
+          </p:spPr>
+          <p:style>
+            <a:lnRef idx="1">
+              <a:schemeClr val="accent1"/>
+            </a:lnRef>
+            <a:fillRef idx="0">
+              <a:schemeClr val="accent1"/>
+            </a:fillRef>
+            <a:effectRef idx="0">
+              <a:schemeClr val="accent1"/>
+            </a:effectRef>
+            <a:fontRef idx="minor">
+              <a:schemeClr val="tx1"/>
+            </a:fontRef>
+          </p:style>
+        </p:cxnSp>
+        <p:cxnSp>
+          <p:nvCxnSpPr>
+            <p:cNvPr id="63" name="Straight Connector 62">
+              <a:extLst>
+                <a:ext uri="{FF2B5EF4-FFF2-40B4-BE49-F238E27FC236}">
+                  <a16:creationId xmlns:a16="http://schemas.microsoft.com/office/drawing/2014/main" id="{4D8AC050-8510-D51B-E71A-5515A60ED305}"/>
+                </a:ext>
+              </a:extLst>
+            </p:cNvPr>
+            <p:cNvCxnSpPr>
+              <a:cxnSpLocks/>
+            </p:cNvCxnSpPr>
+            <p:nvPr/>
+          </p:nvCxnSpPr>
+          <p:spPr>
+            <a:xfrm>
+              <a:off x="4453314" y="3301282"/>
+              <a:ext cx="0" cy="1256915"/>
+            </a:xfrm>
+            <a:prstGeom prst="line">
+              <a:avLst/>
+            </a:prstGeom>
+          </p:spPr>
+          <p:style>
+            <a:lnRef idx="1">
+              <a:schemeClr val="accent1"/>
+            </a:lnRef>
+            <a:fillRef idx="0">
+              <a:schemeClr val="accent1"/>
+            </a:fillRef>
+            <a:effectRef idx="0">
+              <a:schemeClr val="accent1"/>
+            </a:effectRef>
+            <a:fontRef idx="minor">
+              <a:schemeClr val="tx1"/>
+            </a:fontRef>
+          </p:style>
+        </p:cxnSp>
+        <p:sp>
+          <p:nvSpPr>
+            <p:cNvPr id="68" name="Isosceles Triangle 67">
+              <a:extLst>
+                <a:ext uri="{FF2B5EF4-FFF2-40B4-BE49-F238E27FC236}">
+                  <a16:creationId xmlns:a16="http://schemas.microsoft.com/office/drawing/2014/main" id="{78D4CF54-4022-3CEC-7859-01D7153CA7FA}"/>
+                </a:ext>
+              </a:extLst>
+            </p:cNvPr>
+            <p:cNvSpPr/>
+            <p:nvPr/>
+          </p:nvSpPr>
+          <p:spPr>
+            <a:xfrm rot="10800000">
+              <a:off x="4380180" y="4571882"/>
+              <a:ext cx="145824" cy="133160"/>
+            </a:xfrm>
+            <a:prstGeom prst="triangle">
+              <a:avLst/>
+            </a:prstGeom>
+            <a:noFill/>
+          </p:spPr>
+          <p:style>
+            <a:lnRef idx="2">
+              <a:schemeClr val="accent1">
+                <a:shade val="50000"/>
+              </a:schemeClr>
+            </a:lnRef>
+            <a:fillRef idx="1">
+              <a:schemeClr val="accent1"/>
+            </a:fillRef>
+            <a:effectRef idx="0">
+              <a:schemeClr val="accent1"/>
+            </a:effectRef>
+            <a:fontRef idx="minor">
+              <a:schemeClr val="lt1"/>
+            </a:fontRef>
+          </p:style>
+          <p:txBody>
+            <a:bodyPr rtlCol="0" anchor="ctr"/>
+            <a:lstStyle/>
+            <a:p>
+              <a:pPr algn="ctr"/>
+              <a:endParaRPr lang="en-US" dirty="0"/>
+            </a:p>
+          </p:txBody>
+        </p:sp>
+      </p:grpSp>
+      <p:grpSp>
+        <p:nvGrpSpPr>
+          <p:cNvPr id="69" name="Group 68">
+            <a:extLst>
+              <a:ext uri="{FF2B5EF4-FFF2-40B4-BE49-F238E27FC236}">
+                <a16:creationId xmlns:a16="http://schemas.microsoft.com/office/drawing/2014/main" id="{19949BB2-68B9-F5D4-55E4-02CF225E4E72}"/>
+              </a:ext>
+            </a:extLst>
+          </p:cNvPr>
+          <p:cNvGrpSpPr/>
+          <p:nvPr/>
+        </p:nvGrpSpPr>
+        <p:grpSpPr>
+          <a:xfrm rot="16200000">
+            <a:off x="6263019" y="4335748"/>
+            <a:ext cx="533197" cy="206244"/>
+            <a:chOff x="3007248" y="2580578"/>
+            <a:chExt cx="653650" cy="225287"/>
+          </a:xfrm>
+        </p:grpSpPr>
+        <p:cxnSp>
+          <p:nvCxnSpPr>
+            <p:cNvPr id="70" name="Straight Arrow Connector 69">
+              <a:extLst>
+                <a:ext uri="{FF2B5EF4-FFF2-40B4-BE49-F238E27FC236}">
+                  <a16:creationId xmlns:a16="http://schemas.microsoft.com/office/drawing/2014/main" id="{11776A29-9EF7-7550-B390-7F5F60487767}"/>
+                </a:ext>
+              </a:extLst>
+            </p:cNvPr>
+            <p:cNvCxnSpPr>
+              <a:cxnSpLocks/>
+            </p:cNvCxnSpPr>
+            <p:nvPr/>
+          </p:nvCxnSpPr>
+          <p:spPr>
+            <a:xfrm flipH="1">
+              <a:off x="3038762" y="2693221"/>
+              <a:ext cx="622136" cy="0"/>
+            </a:xfrm>
+            <a:prstGeom prst="straightConnector1">
+              <a:avLst/>
+            </a:prstGeom>
+            <a:ln>
+              <a:tailEnd type="triangle"/>
+            </a:ln>
+          </p:spPr>
+          <p:style>
+            <a:lnRef idx="1">
+              <a:schemeClr val="accent1"/>
+            </a:lnRef>
+            <a:fillRef idx="0">
+              <a:schemeClr val="accent1"/>
+            </a:fillRef>
+            <a:effectRef idx="0">
+              <a:schemeClr val="accent1"/>
+            </a:effectRef>
+            <a:fontRef idx="minor">
+              <a:schemeClr val="tx1"/>
+            </a:fontRef>
+          </p:style>
+        </p:cxnSp>
+        <p:sp>
+          <p:nvSpPr>
+            <p:cNvPr id="71" name="Isosceles Triangle 70">
+              <a:extLst>
+                <a:ext uri="{FF2B5EF4-FFF2-40B4-BE49-F238E27FC236}">
+                  <a16:creationId xmlns:a16="http://schemas.microsoft.com/office/drawing/2014/main" id="{9B772424-D969-0DD1-02EF-60E640EF1E36}"/>
+                </a:ext>
+              </a:extLst>
+            </p:cNvPr>
+            <p:cNvSpPr/>
+            <p:nvPr/>
+          </p:nvSpPr>
+          <p:spPr>
+            <a:xfrm rot="16200000">
+              <a:off x="2987370" y="2600456"/>
+              <a:ext cx="225287" cy="185531"/>
+            </a:xfrm>
+            <a:prstGeom prst="triangle">
+              <a:avLst/>
+            </a:prstGeom>
+            <a:solidFill>
+              <a:schemeClr val="bg1"/>
+            </a:solidFill>
+          </p:spPr>
+          <p:style>
+            <a:lnRef idx="2">
+              <a:schemeClr val="accent1">
+                <a:shade val="50000"/>
+              </a:schemeClr>
+            </a:lnRef>
+            <a:fillRef idx="1">
+              <a:schemeClr val="accent1"/>
+            </a:fillRef>
+            <a:effectRef idx="0">
+              <a:schemeClr val="accent1"/>
+            </a:effectRef>
+            <a:fontRef idx="minor">
+              <a:schemeClr val="lt1"/>
+            </a:fontRef>
+          </p:style>
+          <p:txBody>
+            <a:bodyPr rtlCol="0" anchor="ctr"/>
+            <a:lstStyle/>
+            <a:p>
+              <a:pPr algn="ctr"/>
+              <a:endParaRPr lang="en-US" dirty="0"/>
+            </a:p>
+          </p:txBody>
+        </p:sp>
+      </p:grpSp>
+      <p:cxnSp>
+        <p:nvCxnSpPr>
+          <p:cNvPr id="76" name="Straight Connector 75">
+            <a:extLst>
+              <a:ext uri="{FF2B5EF4-FFF2-40B4-BE49-F238E27FC236}">
+                <a16:creationId xmlns:a16="http://schemas.microsoft.com/office/drawing/2014/main" id="{08BA5EC6-A113-5934-9328-603FDBAE5196}"/>
+              </a:ext>
+            </a:extLst>
+          </p:cNvPr>
+          <p:cNvCxnSpPr/>
+          <p:nvPr/>
+        </p:nvCxnSpPr>
+        <p:spPr>
+          <a:xfrm flipH="1">
+            <a:off x="1855650" y="4359127"/>
+            <a:ext cx="718681" cy="0"/>
+          </a:xfrm>
+          <a:prstGeom prst="line">
+            <a:avLst/>
+          </a:prstGeom>
+        </p:spPr>
+        <p:style>
+          <a:lnRef idx="1">
+            <a:schemeClr val="accent1"/>
+          </a:lnRef>
+          <a:fillRef idx="0">
+            <a:schemeClr val="accent1"/>
+          </a:fillRef>
+          <a:effectRef idx="0">
+            <a:schemeClr val="accent1"/>
+          </a:effectRef>
+          <a:fontRef idx="minor">
+            <a:schemeClr val="tx1"/>
+          </a:fontRef>
+        </p:style>
+      </p:cxnSp>
+    </p:spTree>
+    <p:extLst>
+      <p:ext uri="{BB962C8B-B14F-4D97-AF65-F5344CB8AC3E}">
+        <p14:creationId xmlns:p14="http://schemas.microsoft.com/office/powerpoint/2010/main" val="2065096883"/>
+      </p:ext>
+    </p:extLst>
+  </p:cSld>
+  <p:clrMapOvr>
+    <a:masterClrMapping/>
+  </p:clrMapOvr>
+</p:sld>
+</file>
+
+<file path=ppt/slides/slide5.xml><?xml version="1.0" encoding="utf-8"?>
+<p:sld xmlns:a="http://schemas.openxmlformats.org/drawingml/2006/main" xmlns:r="http://schemas.openxmlformats.org/officeDocument/2006/relationships" xmlns:p="http://schemas.openxmlformats.org/presentationml/2006/main">
+  <p:cSld>
+    <p:spTree>
+      <p:nvGrpSpPr>
+        <p:cNvPr id="1" name=""/>
+        <p:cNvGrpSpPr/>
+        <p:nvPr/>
+      </p:nvGrpSpPr>
+      <p:grpSpPr>
+        <a:xfrm>
+          <a:off x="0" y="0"/>
+          <a:ext cx="0" cy="0"/>
+          <a:chOff x="0" y="0"/>
+          <a:chExt cx="0" cy="0"/>
+        </a:xfrm>
+      </p:grpSpPr>
+      <p:graphicFrame>
+        <p:nvGraphicFramePr>
+          <p:cNvPr id="28" name="Table 27">
+            <a:extLst>
+              <a:ext uri="{FF2B5EF4-FFF2-40B4-BE49-F238E27FC236}">
+                <a16:creationId xmlns:a16="http://schemas.microsoft.com/office/drawing/2014/main" id="{FCEA68AE-8C74-0816-62B4-4F89956168B9}"/>
+              </a:ext>
+            </a:extLst>
+          </p:cNvPr>
+          <p:cNvGraphicFramePr>
+            <a:graphicFrameLocks noGrp="1"/>
+          </p:cNvGraphicFramePr>
+          <p:nvPr>
+            <p:extLst>
+              <p:ext uri="{D42A27DB-BD31-4B8C-83A1-F6EECF244321}">
+                <p14:modId xmlns:p14="http://schemas.microsoft.com/office/powerpoint/2010/main" val="2439769733"/>
+              </p:ext>
+            </p:extLst>
+          </p:nvPr>
+        </p:nvGraphicFramePr>
+        <p:xfrm>
+          <a:off x="3762005" y="118501"/>
+          <a:ext cx="2599038" cy="987504"/>
+        </p:xfrm>
+        <a:graphic>
+          <a:graphicData uri="http://schemas.openxmlformats.org/drawingml/2006/table">
+            <a:tbl>
+              <a:tblPr firstRow="1" bandRow="1">
+                <a:tableStyleId>{5C22544A-7EE6-4342-B048-85BDC9FD1C3A}</a:tableStyleId>
+              </a:tblPr>
+              <a:tblGrid>
+                <a:gridCol w="2599038">
+                  <a:extLst>
+                    <a:ext uri="{9D8B030D-6E8A-4147-A177-3AD203B41FA5}">
+                      <a16:colId xmlns:a16="http://schemas.microsoft.com/office/drawing/2014/main" val="1419940822"/>
+                    </a:ext>
+                  </a:extLst>
+                </a:gridCol>
+              </a:tblGrid>
+              <a:tr h="376914">
+                <a:tc>
+                  <a:txBody>
+                    <a:bodyPr/>
+                    <a:lstStyle/>
+                    <a:p>
+                      <a:pPr algn="ctr"/>
+                      <a:r>
+                        <a:rPr lang="en-US" sz="2000" b="0" dirty="0" err="1"/>
+                        <a:t>OrderManagement</a:t>
+                      </a:r>
+                      <a:endParaRPr lang="en-US" sz="2000" b="0" dirty="0"/>
+                    </a:p>
+                  </a:txBody>
+                  <a:tcPr/>
+                </a:tc>
+                <a:extLst>
+                  <a:ext uri="{0D108BD9-81ED-4DB2-BD59-A6C34878D82A}">
+                    <a16:rowId xmlns:a16="http://schemas.microsoft.com/office/drawing/2014/main" val="1122576610"/>
+                  </a:ext>
+                </a:extLst>
+              </a:tr>
+              <a:tr h="591264">
+                <a:tc>
+                  <a:txBody>
+                    <a:bodyPr/>
+                    <a:lstStyle/>
+                    <a:p>
+                      <a:endParaRPr lang="en-US" dirty="0"/>
+                    </a:p>
+                  </a:txBody>
+                  <a:tcPr/>
+                </a:tc>
+                <a:extLst>
+                  <a:ext uri="{0D108BD9-81ED-4DB2-BD59-A6C34878D82A}">
+                    <a16:rowId xmlns:a16="http://schemas.microsoft.com/office/drawing/2014/main" val="1648744592"/>
+                  </a:ext>
+                </a:extLst>
+              </a:tr>
+            </a:tbl>
+          </a:graphicData>
+        </a:graphic>
+      </p:graphicFrame>
+      <p:graphicFrame>
+        <p:nvGraphicFramePr>
+          <p:cNvPr id="50" name="Table 49">
+            <a:extLst>
+              <a:ext uri="{FF2B5EF4-FFF2-40B4-BE49-F238E27FC236}">
+                <a16:creationId xmlns:a16="http://schemas.microsoft.com/office/drawing/2014/main" id="{CF23E0C8-FC17-F4B2-BBDB-5CC70EB07845}"/>
+              </a:ext>
+            </a:extLst>
+          </p:cNvPr>
+          <p:cNvGraphicFramePr>
+            <a:graphicFrameLocks noGrp="1"/>
+          </p:cNvGraphicFramePr>
+          <p:nvPr>
+            <p:extLst>
+              <p:ext uri="{D42A27DB-BD31-4B8C-83A1-F6EECF244321}">
+                <p14:modId xmlns:p14="http://schemas.microsoft.com/office/powerpoint/2010/main" val="3269926288"/>
+              </p:ext>
+            </p:extLst>
+          </p:nvPr>
+        </p:nvGraphicFramePr>
+        <p:xfrm>
+          <a:off x="6008464" y="1646578"/>
           <a:ext cx="1846911" cy="1004212"/>
         </p:xfrm>
         <a:graphic>
@@ -6644,13 +8197,13 @@
           <p:nvPr>
             <p:extLst>
               <p:ext uri="{D42A27DB-BD31-4B8C-83A1-F6EECF244321}">
-                <p14:modId xmlns:p14="http://schemas.microsoft.com/office/powerpoint/2010/main" val="363458643"/>
+                <p14:modId xmlns:p14="http://schemas.microsoft.com/office/powerpoint/2010/main" val="271211625"/>
               </p:ext>
             </p:extLst>
           </p:nvPr>
         </p:nvGraphicFramePr>
         <p:xfrm>
-          <a:off x="9530429" y="296981"/>
+          <a:off x="8324482" y="296981"/>
           <a:ext cx="2223970" cy="1600751"/>
         </p:xfrm>
         <a:graphic>
@@ -6773,7 +8326,7 @@
         </p:nvSpPr>
         <p:spPr>
           <a:xfrm flipH="1">
-            <a:off x="8986569" y="727629"/>
+            <a:off x="7780622" y="727629"/>
             <a:ext cx="938210" cy="307777"/>
           </a:xfrm>
           <a:prstGeom prst="rect">
@@ -6808,7 +8361,7 @@
         </p:nvSpPr>
         <p:spPr>
           <a:xfrm flipH="1">
-            <a:off x="9227814" y="1106648"/>
+            <a:off x="8021867" y="1106648"/>
             <a:ext cx="347719" cy="307777"/>
           </a:xfrm>
           <a:prstGeom prst="rect">
@@ -6845,7 +8398,7 @@
         </p:nvCxnSpPr>
         <p:spPr>
           <a:xfrm flipH="1">
-            <a:off x="8453835" y="1097355"/>
+            <a:off x="7247888" y="1097355"/>
             <a:ext cx="1076594" cy="0"/>
           </a:xfrm>
           <a:prstGeom prst="line">
@@ -6882,13 +8435,13 @@
           <p:nvPr>
             <p:extLst>
               <p:ext uri="{D42A27DB-BD31-4B8C-83A1-F6EECF244321}">
-                <p14:modId xmlns:p14="http://schemas.microsoft.com/office/powerpoint/2010/main" val="2845695288"/>
+                <p14:modId xmlns:p14="http://schemas.microsoft.com/office/powerpoint/2010/main" val="38644052"/>
               </p:ext>
             </p:extLst>
           </p:nvPr>
         </p:nvGraphicFramePr>
         <p:xfrm>
-          <a:off x="4491284" y="2138042"/>
+          <a:off x="3298831" y="2296309"/>
           <a:ext cx="2492614" cy="2147162"/>
         </p:xfrm>
         <a:graphic>
@@ -6962,7 +8515,7 @@
                       </a:r>
                       <a:r>
                         <a:rPr lang="en-US" sz="1600" dirty="0" err="1"/>
-                        <a:t>chairId</a:t>
+                        <a:t>tableId</a:t>
                       </a:r>
                       <a:r>
                         <a:rPr lang="en-US" sz="1600" dirty="0"/>
@@ -7000,103 +8553,6 @@
           </a:graphicData>
         </a:graphic>
       </p:graphicFrame>
-      <p:grpSp>
-        <p:nvGrpSpPr>
-          <p:cNvPr id="70" name="Group 69">
-            <a:extLst>
-              <a:ext uri="{FF2B5EF4-FFF2-40B4-BE49-F238E27FC236}">
-                <a16:creationId xmlns:a16="http://schemas.microsoft.com/office/drawing/2014/main" id="{05ED471E-B281-85CB-48F7-AEEF71AE10EA}"/>
-              </a:ext>
-            </a:extLst>
-          </p:cNvPr>
-          <p:cNvGrpSpPr/>
-          <p:nvPr/>
-        </p:nvGrpSpPr>
-        <p:grpSpPr>
-          <a:xfrm flipH="1" flipV="1">
-            <a:off x="2855727" y="836263"/>
-            <a:ext cx="926924" cy="1458980"/>
-            <a:chOff x="7293594" y="3429000"/>
-            <a:chExt cx="3228632" cy="1129747"/>
-          </a:xfrm>
-        </p:grpSpPr>
-        <p:cxnSp>
-          <p:nvCxnSpPr>
-            <p:cNvPr id="8" name="Straight Connector 7">
-              <a:extLst>
-                <a:ext uri="{FF2B5EF4-FFF2-40B4-BE49-F238E27FC236}">
-                  <a16:creationId xmlns:a16="http://schemas.microsoft.com/office/drawing/2014/main" id="{E413CE53-36A1-D28D-3B7D-D0BB1A37B215}"/>
-                </a:ext>
-              </a:extLst>
-            </p:cNvPr>
-            <p:cNvCxnSpPr>
-              <a:cxnSpLocks/>
-            </p:cNvCxnSpPr>
-            <p:nvPr/>
-          </p:nvCxnSpPr>
-          <p:spPr>
-            <a:xfrm>
-              <a:off x="10522226" y="3429000"/>
-              <a:ext cx="0" cy="1129747"/>
-            </a:xfrm>
-            <a:prstGeom prst="line">
-              <a:avLst/>
-            </a:prstGeom>
-          </p:spPr>
-          <p:style>
-            <a:lnRef idx="1">
-              <a:schemeClr val="accent1"/>
-            </a:lnRef>
-            <a:fillRef idx="0">
-              <a:schemeClr val="accent1"/>
-            </a:fillRef>
-            <a:effectRef idx="0">
-              <a:schemeClr val="accent1"/>
-            </a:effectRef>
-            <a:fontRef idx="minor">
-              <a:schemeClr val="tx1"/>
-            </a:fontRef>
-          </p:style>
-        </p:cxnSp>
-        <p:cxnSp>
-          <p:nvCxnSpPr>
-            <p:cNvPr id="61" name="Straight Connector 60">
-              <a:extLst>
-                <a:ext uri="{FF2B5EF4-FFF2-40B4-BE49-F238E27FC236}">
-                  <a16:creationId xmlns:a16="http://schemas.microsoft.com/office/drawing/2014/main" id="{164F8CD1-DEC7-9C62-485A-8E8095E4B50D}"/>
-                </a:ext>
-              </a:extLst>
-            </p:cNvPr>
-            <p:cNvCxnSpPr>
-              <a:cxnSpLocks/>
-            </p:cNvCxnSpPr>
-            <p:nvPr/>
-          </p:nvCxnSpPr>
-          <p:spPr>
-            <a:xfrm flipH="1">
-              <a:off x="7293594" y="4558747"/>
-              <a:ext cx="3228632" cy="0"/>
-            </a:xfrm>
-            <a:prstGeom prst="line">
-              <a:avLst/>
-            </a:prstGeom>
-          </p:spPr>
-          <p:style>
-            <a:lnRef idx="1">
-              <a:schemeClr val="accent1"/>
-            </a:lnRef>
-            <a:fillRef idx="0">
-              <a:schemeClr val="accent1"/>
-            </a:fillRef>
-            <a:effectRef idx="0">
-              <a:schemeClr val="accent1"/>
-            </a:effectRef>
-            <a:fontRef idx="minor">
-              <a:schemeClr val="tx1"/>
-            </a:fontRef>
-          </p:style>
-        </p:cxnSp>
-      </p:grpSp>
       <p:sp>
         <p:nvSpPr>
           <p:cNvPr id="62" name="TextBox 61">
@@ -7111,7 +8567,7 @@
         </p:nvSpPr>
         <p:spPr>
           <a:xfrm>
-            <a:off x="7470120" y="1430739"/>
+            <a:off x="4980920" y="2029597"/>
             <a:ext cx="558105" cy="369332"/>
           </a:xfrm>
           <a:prstGeom prst="rect">
@@ -7147,13 +8603,13 @@
           <p:nvPr>
             <p:extLst>
               <p:ext uri="{D42A27DB-BD31-4B8C-83A1-F6EECF244321}">
-                <p14:modId xmlns:p14="http://schemas.microsoft.com/office/powerpoint/2010/main" val="3196630913"/>
+                <p14:modId xmlns:p14="http://schemas.microsoft.com/office/powerpoint/2010/main" val="2761440986"/>
               </p:ext>
             </p:extLst>
           </p:nvPr>
         </p:nvGraphicFramePr>
         <p:xfrm>
-          <a:off x="9278341" y="2424788"/>
+          <a:off x="8072394" y="2424788"/>
           <a:ext cx="2476058" cy="1188720"/>
         </p:xfrm>
         <a:graphic>
@@ -7271,7 +8727,7 @@
         </p:nvSpPr>
         <p:spPr>
           <a:xfrm>
-            <a:off x="10567494" y="2203722"/>
+            <a:off x="9361547" y="2203722"/>
             <a:ext cx="498761" cy="369332"/>
           </a:xfrm>
           <a:prstGeom prst="rect">
@@ -7308,7 +8764,7 @@
         </p:nvCxnSpPr>
         <p:spPr>
           <a:xfrm>
-            <a:off x="9072689" y="2203722"/>
+            <a:off x="7866742" y="2203722"/>
             <a:ext cx="1454769" cy="0"/>
           </a:xfrm>
           <a:prstGeom prst="line">
@@ -7346,7 +8802,7 @@
         </p:nvCxnSpPr>
         <p:spPr>
           <a:xfrm>
-            <a:off x="10529622" y="2190470"/>
+            <a:off x="9323675" y="2190470"/>
             <a:ext cx="0" cy="241737"/>
           </a:xfrm>
           <a:prstGeom prst="line">
@@ -7382,7 +8838,7 @@
         </p:nvGrpSpPr>
         <p:grpSpPr>
           <a:xfrm>
-            <a:off x="6983898" y="3571769"/>
+            <a:off x="5777951" y="3571769"/>
             <a:ext cx="3690728" cy="369317"/>
             <a:chOff x="7293594" y="3429000"/>
             <a:chExt cx="3228632" cy="1129747"/>
@@ -7465,41 +8921,6 @@
           </p:style>
         </p:cxnSp>
       </p:grpSp>
-      <p:sp>
-        <p:nvSpPr>
-          <p:cNvPr id="74" name="TextBox 73">
-            <a:extLst>
-              <a:ext uri="{FF2B5EF4-FFF2-40B4-BE49-F238E27FC236}">
-                <a16:creationId xmlns:a16="http://schemas.microsoft.com/office/drawing/2014/main" id="{9B9B7355-4410-A42D-CC9D-53982F1E0ED7}"/>
-              </a:ext>
-            </a:extLst>
-          </p:cNvPr>
-          <p:cNvSpPr txBox="1"/>
-          <p:nvPr/>
-        </p:nvSpPr>
-        <p:spPr>
-          <a:xfrm>
-            <a:off x="2936308" y="2035347"/>
-            <a:ext cx="498761" cy="369332"/>
-          </a:xfrm>
-          <a:prstGeom prst="rect">
-            <a:avLst/>
-          </a:prstGeom>
-          <a:noFill/>
-        </p:spPr>
-        <p:txBody>
-          <a:bodyPr wrap="square" rtlCol="0">
-            <a:spAutoFit/>
-          </a:bodyPr>
-          <a:lstStyle/>
-          <a:p>
-            <a:r>
-              <a:rPr lang="en-US" dirty="0"/>
-              <a:t>*</a:t>
-            </a:r>
-          </a:p>
-        </p:txBody>
-      </p:sp>
       <p:cxnSp>
         <p:nvCxnSpPr>
           <p:cNvPr id="76" name="Straight Connector 75">
@@ -7516,7 +8937,7 @@
         </p:nvCxnSpPr>
         <p:spPr>
           <a:xfrm flipV="1">
-            <a:off x="8458585" y="1101315"/>
+            <a:off x="7252638" y="1101315"/>
             <a:ext cx="0" cy="545263"/>
           </a:xfrm>
           <a:prstGeom prst="line">
@@ -7538,103 +8959,6 @@
           </a:fontRef>
         </p:style>
       </p:cxnSp>
-      <p:grpSp>
-        <p:nvGrpSpPr>
-          <p:cNvPr id="31" name="Group 30">
-            <a:extLst>
-              <a:ext uri="{FF2B5EF4-FFF2-40B4-BE49-F238E27FC236}">
-                <a16:creationId xmlns:a16="http://schemas.microsoft.com/office/drawing/2014/main" id="{B4BEA6F2-0CB1-9230-B095-1EFF6BE992EF}"/>
-              </a:ext>
-            </a:extLst>
-          </p:cNvPr>
-          <p:cNvGrpSpPr/>
-          <p:nvPr/>
-        </p:nvGrpSpPr>
-        <p:grpSpPr>
-          <a:xfrm rot="10800000">
-            <a:off x="2539227" y="3603076"/>
-            <a:ext cx="1952054" cy="460179"/>
-            <a:chOff x="7293594" y="3429000"/>
-            <a:chExt cx="3228632" cy="1129747"/>
-          </a:xfrm>
-        </p:grpSpPr>
-        <p:cxnSp>
-          <p:nvCxnSpPr>
-            <p:cNvPr id="32" name="Straight Connector 31">
-              <a:extLst>
-                <a:ext uri="{FF2B5EF4-FFF2-40B4-BE49-F238E27FC236}">
-                  <a16:creationId xmlns:a16="http://schemas.microsoft.com/office/drawing/2014/main" id="{5E2F9156-4258-184B-FF69-10B2EB800BE7}"/>
-                </a:ext>
-              </a:extLst>
-            </p:cNvPr>
-            <p:cNvCxnSpPr>
-              <a:cxnSpLocks/>
-            </p:cNvCxnSpPr>
-            <p:nvPr/>
-          </p:nvCxnSpPr>
-          <p:spPr>
-            <a:xfrm>
-              <a:off x="10522226" y="3429000"/>
-              <a:ext cx="0" cy="1129747"/>
-            </a:xfrm>
-            <a:prstGeom prst="line">
-              <a:avLst/>
-            </a:prstGeom>
-          </p:spPr>
-          <p:style>
-            <a:lnRef idx="1">
-              <a:schemeClr val="accent1"/>
-            </a:lnRef>
-            <a:fillRef idx="0">
-              <a:schemeClr val="accent1"/>
-            </a:fillRef>
-            <a:effectRef idx="0">
-              <a:schemeClr val="accent1"/>
-            </a:effectRef>
-            <a:fontRef idx="minor">
-              <a:schemeClr val="tx1"/>
-            </a:fontRef>
-          </p:style>
-        </p:cxnSp>
-        <p:cxnSp>
-          <p:nvCxnSpPr>
-            <p:cNvPr id="33" name="Straight Connector 32">
-              <a:extLst>
-                <a:ext uri="{FF2B5EF4-FFF2-40B4-BE49-F238E27FC236}">
-                  <a16:creationId xmlns:a16="http://schemas.microsoft.com/office/drawing/2014/main" id="{ED237F05-FFDC-B59D-C031-B7C5BDD7C91F}"/>
-                </a:ext>
-              </a:extLst>
-            </p:cNvPr>
-            <p:cNvCxnSpPr>
-              <a:cxnSpLocks/>
-            </p:cNvCxnSpPr>
-            <p:nvPr/>
-          </p:nvCxnSpPr>
-          <p:spPr>
-            <a:xfrm flipH="1">
-              <a:off x="7293594" y="4558747"/>
-              <a:ext cx="3228632" cy="0"/>
-            </a:xfrm>
-            <a:prstGeom prst="line">
-              <a:avLst/>
-            </a:prstGeom>
-          </p:spPr>
-          <p:style>
-            <a:lnRef idx="1">
-              <a:schemeClr val="accent1"/>
-            </a:lnRef>
-            <a:fillRef idx="0">
-              <a:schemeClr val="accent1"/>
-            </a:fillRef>
-            <a:effectRef idx="0">
-              <a:schemeClr val="accent1"/>
-            </a:effectRef>
-            <a:fontRef idx="minor">
-              <a:schemeClr val="tx1"/>
-            </a:fontRef>
-          </p:style>
-        </p:cxnSp>
-      </p:grpSp>
       <p:graphicFrame>
         <p:nvGraphicFramePr>
           <p:cNvPr id="38" name="Table 37">
@@ -7650,13 +8974,13 @@
           <p:nvPr>
             <p:extLst>
               <p:ext uri="{D42A27DB-BD31-4B8C-83A1-F6EECF244321}">
-                <p14:modId xmlns:p14="http://schemas.microsoft.com/office/powerpoint/2010/main" val="1960875076"/>
+                <p14:modId xmlns:p14="http://schemas.microsoft.com/office/powerpoint/2010/main" val="2065520418"/>
               </p:ext>
             </p:extLst>
           </p:nvPr>
         </p:nvGraphicFramePr>
         <p:xfrm>
-          <a:off x="8388466" y="4507118"/>
+          <a:off x="7182519" y="4507118"/>
           <a:ext cx="2354253" cy="1188720"/>
         </p:xfrm>
         <a:graphic>
@@ -7771,14 +9095,14 @@
           <p:nvPr>
             <p:extLst>
               <p:ext uri="{D42A27DB-BD31-4B8C-83A1-F6EECF244321}">
-                <p14:modId xmlns:p14="http://schemas.microsoft.com/office/powerpoint/2010/main" val="1761903079"/>
+                <p14:modId xmlns:p14="http://schemas.microsoft.com/office/powerpoint/2010/main" val="3914858081"/>
               </p:ext>
             </p:extLst>
           </p:nvPr>
         </p:nvGraphicFramePr>
         <p:xfrm>
-          <a:off x="4528841" y="4516794"/>
-          <a:ext cx="2375542" cy="1128632"/>
+          <a:off x="3322894" y="4516794"/>
+          <a:ext cx="2388794" cy="1128632"/>
         </p:xfrm>
         <a:graphic>
           <a:graphicData uri="http://schemas.openxmlformats.org/drawingml/2006/table">
@@ -7787,7 +9111,7 @@
                 <a:tableStyleId>{5C22544A-7EE6-4342-B048-85BDC9FD1C3A}</a:tableStyleId>
               </a:tblPr>
               <a:tblGrid>
-                <a:gridCol w="2375542">
+                <a:gridCol w="2388794">
                   <a:extLst>
                     <a:ext uri="{9D8B030D-6E8A-4147-A177-3AD203B41FA5}">
                       <a16:colId xmlns:a16="http://schemas.microsoft.com/office/drawing/2014/main" val="1419940822"/>
@@ -7878,13 +9202,13 @@
           <p:nvPr>
             <p:extLst>
               <p:ext uri="{D42A27DB-BD31-4B8C-83A1-F6EECF244321}">
-                <p14:modId xmlns:p14="http://schemas.microsoft.com/office/powerpoint/2010/main" val="884714101"/>
+                <p14:modId xmlns:p14="http://schemas.microsoft.com/office/powerpoint/2010/main" val="3318347720"/>
               </p:ext>
             </p:extLst>
           </p:nvPr>
         </p:nvGraphicFramePr>
         <p:xfrm>
-          <a:off x="1648085" y="5612772"/>
+          <a:off x="442138" y="5612772"/>
           <a:ext cx="2014343" cy="1219200"/>
         </p:xfrm>
         <a:graphic>
@@ -7993,7 +9317,7 @@
         </p:nvCxnSpPr>
         <p:spPr>
           <a:xfrm>
-            <a:off x="9068436" y="3979494"/>
+            <a:off x="7862489" y="3979494"/>
             <a:ext cx="4253" cy="554128"/>
           </a:xfrm>
           <a:prstGeom prst="line">
@@ -8031,7 +9355,7 @@
         </p:nvCxnSpPr>
         <p:spPr>
           <a:xfrm>
-            <a:off x="6883094" y="5249011"/>
+            <a:off x="5677147" y="5249011"/>
             <a:ext cx="1505372" cy="0"/>
           </a:xfrm>
           <a:prstGeom prst="line">
@@ -8067,7 +9391,7 @@
         </p:nvGrpSpPr>
         <p:grpSpPr>
           <a:xfrm rot="10800000" flipH="1" flipV="1">
-            <a:off x="3662427" y="5620978"/>
+            <a:off x="2456480" y="5620978"/>
             <a:ext cx="2014343" cy="157653"/>
             <a:chOff x="7293594" y="3429000"/>
             <a:chExt cx="3228632" cy="1129747"/>
@@ -8164,7 +9488,7 @@
         </p:nvSpPr>
         <p:spPr>
           <a:xfrm flipH="1">
-            <a:off x="3642918" y="5887070"/>
+            <a:off x="2436971" y="5887070"/>
             <a:ext cx="409164" cy="369332"/>
           </a:xfrm>
           <a:prstGeom prst="rect">
@@ -8185,41 +9509,6 @@
           </a:p>
         </p:txBody>
       </p:sp>
-      <p:sp>
-        <p:nvSpPr>
-          <p:cNvPr id="67" name="TextBox 66">
-            <a:extLst>
-              <a:ext uri="{FF2B5EF4-FFF2-40B4-BE49-F238E27FC236}">
-                <a16:creationId xmlns:a16="http://schemas.microsoft.com/office/drawing/2014/main" id="{A9156B8E-4361-7F84-511A-52EA23D71A59}"/>
-              </a:ext>
-            </a:extLst>
-          </p:cNvPr>
-          <p:cNvSpPr txBox="1"/>
-          <p:nvPr/>
-        </p:nvSpPr>
-        <p:spPr>
-          <a:xfrm>
-            <a:off x="2587645" y="3616522"/>
-            <a:ext cx="498761" cy="369332"/>
-          </a:xfrm>
-          <a:prstGeom prst="rect">
-            <a:avLst/>
-          </a:prstGeom>
-          <a:noFill/>
-        </p:spPr>
-        <p:txBody>
-          <a:bodyPr wrap="square" rtlCol="0">
-            <a:spAutoFit/>
-          </a:bodyPr>
-          <a:lstStyle/>
-          <a:p>
-            <a:r>
-              <a:rPr lang="en-US" dirty="0"/>
-              <a:t>*</a:t>
-            </a:r>
-          </a:p>
-        </p:txBody>
-      </p:sp>
       <p:graphicFrame>
         <p:nvGraphicFramePr>
           <p:cNvPr id="69" name="Table 68">
@@ -8235,13 +9524,13 @@
           <p:nvPr>
             <p:extLst>
               <p:ext uri="{D42A27DB-BD31-4B8C-83A1-F6EECF244321}">
-                <p14:modId xmlns:p14="http://schemas.microsoft.com/office/powerpoint/2010/main" val="824332265"/>
+                <p14:modId xmlns:p14="http://schemas.microsoft.com/office/powerpoint/2010/main" val="610766368"/>
               </p:ext>
             </p:extLst>
           </p:nvPr>
         </p:nvGraphicFramePr>
         <p:xfrm>
-          <a:off x="4902958" y="6048570"/>
+          <a:off x="3697011" y="6048570"/>
           <a:ext cx="1363665" cy="701040"/>
         </p:xfrm>
         <a:graphic>
@@ -8321,13 +9610,13 @@
           <p:nvPr>
             <p:extLst>
               <p:ext uri="{D42A27DB-BD31-4B8C-83A1-F6EECF244321}">
-                <p14:modId xmlns:p14="http://schemas.microsoft.com/office/powerpoint/2010/main" val="1342585208"/>
+                <p14:modId xmlns:p14="http://schemas.microsoft.com/office/powerpoint/2010/main" val="417235312"/>
               </p:ext>
             </p:extLst>
           </p:nvPr>
         </p:nvGraphicFramePr>
         <p:xfrm>
-          <a:off x="6437730" y="6025484"/>
+          <a:off x="5231783" y="6025484"/>
           <a:ext cx="1359538" cy="701040"/>
         </p:xfrm>
         <a:graphic>
@@ -8406,7 +9695,7 @@
         </p:nvSpPr>
         <p:spPr>
           <a:xfrm rot="5400000">
-            <a:off x="6029477" y="5050025"/>
+            <a:off x="4823530" y="5050025"/>
             <a:ext cx="456323" cy="1913539"/>
           </a:xfrm>
           <a:prstGeom prst="leftBracket">
@@ -8450,7 +9739,7 @@
         </p:nvSpPr>
         <p:spPr>
           <a:xfrm flipH="1">
-            <a:off x="5328427" y="5786112"/>
+            <a:off x="4122480" y="5786112"/>
             <a:ext cx="409164" cy="369332"/>
           </a:xfrm>
           <a:prstGeom prst="rect">
@@ -8485,7 +9774,7 @@
         </p:nvSpPr>
         <p:spPr>
           <a:xfrm flipH="1">
-            <a:off x="7159708" y="5751414"/>
+            <a:off x="5953761" y="5751414"/>
             <a:ext cx="409164" cy="369332"/>
           </a:xfrm>
           <a:prstGeom prst="rect">
@@ -8506,76 +9795,6 @@
           </a:p>
         </p:txBody>
       </p:sp>
-      <p:sp>
-        <p:nvSpPr>
-          <p:cNvPr id="79" name="TextBox 78">
-            <a:extLst>
-              <a:ext uri="{FF2B5EF4-FFF2-40B4-BE49-F238E27FC236}">
-                <a16:creationId xmlns:a16="http://schemas.microsoft.com/office/drawing/2014/main" id="{5DB3AD75-643A-C3FF-96D1-39C9754EF780}"/>
-              </a:ext>
-            </a:extLst>
-          </p:cNvPr>
-          <p:cNvSpPr txBox="1"/>
-          <p:nvPr/>
-        </p:nvSpPr>
-        <p:spPr>
-          <a:xfrm flipH="1">
-            <a:off x="9101989" y="4219906"/>
-            <a:ext cx="409164" cy="369332"/>
-          </a:xfrm>
-          <a:prstGeom prst="rect">
-            <a:avLst/>
-          </a:prstGeom>
-          <a:noFill/>
-        </p:spPr>
-        <p:txBody>
-          <a:bodyPr wrap="square" rtlCol="0">
-            <a:spAutoFit/>
-          </a:bodyPr>
-          <a:lstStyle/>
-          <a:p>
-            <a:r>
-              <a:rPr lang="en-US" dirty="0"/>
-              <a:t>1</a:t>
-            </a:r>
-          </a:p>
-        </p:txBody>
-      </p:sp>
-      <p:sp>
-        <p:nvSpPr>
-          <p:cNvPr id="80" name="TextBox 79">
-            <a:extLst>
-              <a:ext uri="{FF2B5EF4-FFF2-40B4-BE49-F238E27FC236}">
-                <a16:creationId xmlns:a16="http://schemas.microsoft.com/office/drawing/2014/main" id="{9EC85E20-B021-4519-66A8-94C22657F463}"/>
-              </a:ext>
-            </a:extLst>
-          </p:cNvPr>
-          <p:cNvSpPr txBox="1"/>
-          <p:nvPr/>
-        </p:nvSpPr>
-        <p:spPr>
-          <a:xfrm flipH="1">
-            <a:off x="10674626" y="3616522"/>
-            <a:ext cx="409164" cy="369332"/>
-          </a:xfrm>
-          <a:prstGeom prst="rect">
-            <a:avLst/>
-          </a:prstGeom>
-          <a:noFill/>
-        </p:spPr>
-        <p:txBody>
-          <a:bodyPr wrap="square" rtlCol="0">
-            <a:spAutoFit/>
-          </a:bodyPr>
-          <a:lstStyle/>
-          <a:p>
-            <a:r>
-              <a:rPr lang="en-US" dirty="0"/>
-              <a:t>1</a:t>
-            </a:r>
-          </a:p>
-        </p:txBody>
-      </p:sp>
       <p:grpSp>
         <p:nvGrpSpPr>
           <p:cNvPr id="81" name="Group 80">
@@ -8590,8 +9809,8 @@
         </p:nvGrpSpPr>
         <p:grpSpPr>
           <a:xfrm rot="16200000">
-            <a:off x="6528653" y="512248"/>
-            <a:ext cx="1108938" cy="1428300"/>
+            <a:off x="5921715" y="1111257"/>
+            <a:ext cx="1108938" cy="230282"/>
             <a:chOff x="7293594" y="3429000"/>
             <a:chExt cx="3228632" cy="1129747"/>
           </a:xfrm>
@@ -8673,6 +9892,424 @@
           </p:style>
         </p:cxnSp>
       </p:grpSp>
+      <p:graphicFrame>
+        <p:nvGraphicFramePr>
+          <p:cNvPr id="55" name="Table 54">
+            <a:extLst>
+              <a:ext uri="{FF2B5EF4-FFF2-40B4-BE49-F238E27FC236}">
+                <a16:creationId xmlns:a16="http://schemas.microsoft.com/office/drawing/2014/main" id="{8E9576E1-6E28-A0A0-6F9C-C4338C507D76}"/>
+              </a:ext>
+            </a:extLst>
+          </p:cNvPr>
+          <p:cNvGraphicFramePr>
+            <a:graphicFrameLocks noGrp="1"/>
+          </p:cNvGraphicFramePr>
+          <p:nvPr>
+            <p:extLst>
+              <p:ext uri="{D42A27DB-BD31-4B8C-83A1-F6EECF244321}">
+                <p14:modId xmlns:p14="http://schemas.microsoft.com/office/powerpoint/2010/main" val="1606163178"/>
+              </p:ext>
+            </p:extLst>
+          </p:nvPr>
+        </p:nvGraphicFramePr>
+        <p:xfrm>
+          <a:off x="416492" y="838332"/>
+          <a:ext cx="1846911" cy="1004212"/>
+        </p:xfrm>
+        <a:graphic>
+          <a:graphicData uri="http://schemas.openxmlformats.org/drawingml/2006/table">
+            <a:tbl>
+              <a:tblPr firstRow="1" bandRow="1">
+                <a:tableStyleId>{5C22544A-7EE6-4342-B048-85BDC9FD1C3A}</a:tableStyleId>
+              </a:tblPr>
+              <a:tblGrid>
+                <a:gridCol w="1846911">
+                  <a:extLst>
+                    <a:ext uri="{9D8B030D-6E8A-4147-A177-3AD203B41FA5}">
+                      <a16:colId xmlns:a16="http://schemas.microsoft.com/office/drawing/2014/main" val="1419940822"/>
+                    </a:ext>
+                  </a:extLst>
+                </a:gridCol>
+              </a:tblGrid>
+              <a:tr h="352153">
+                <a:tc>
+                  <a:txBody>
+                    <a:bodyPr/>
+                    <a:lstStyle/>
+                    <a:p>
+                      <a:pPr algn="ctr"/>
+                      <a:r>
+                        <a:rPr lang="en-US" sz="1800" b="0" dirty="0"/>
+                        <a:t>Kitchen</a:t>
+                      </a:r>
+                      <a:endParaRPr lang="en-US" sz="2400" b="0" dirty="0"/>
+                    </a:p>
+                  </a:txBody>
+                  <a:tcPr/>
+                </a:tc>
+                <a:extLst>
+                  <a:ext uri="{0D108BD9-81ED-4DB2-BD59-A6C34878D82A}">
+                    <a16:rowId xmlns:a16="http://schemas.microsoft.com/office/drawing/2014/main" val="1122576610"/>
+                  </a:ext>
+                </a:extLst>
+              </a:tr>
+              <a:tr h="638452">
+                <a:tc>
+                  <a:txBody>
+                    <a:bodyPr/>
+                    <a:lstStyle/>
+                    <a:p>
+                      <a:pPr marL="285750" indent="-285750">
+                        <a:buFontTx/>
+                        <a:buChar char="-"/>
+                      </a:pPr>
+                      <a:r>
+                        <a:rPr lang="en-US" sz="1600" dirty="0" err="1"/>
+                        <a:t>chefId</a:t>
+                      </a:r>
+                      <a:r>
+                        <a:rPr lang="en-US" sz="1600" dirty="0"/>
+                        <a:t>: number</a:t>
+                      </a:r>
+                    </a:p>
+                    <a:p>
+                      <a:pPr marL="285750" indent="-285750">
+                        <a:buFontTx/>
+                        <a:buChar char="-"/>
+                      </a:pPr>
+                      <a:r>
+                        <a:rPr lang="en-US" sz="1600" dirty="0" err="1"/>
+                        <a:t>orderId</a:t>
+                      </a:r>
+                      <a:r>
+                        <a:rPr lang="en-US" sz="1600" dirty="0"/>
+                        <a:t>: number</a:t>
+                      </a:r>
+                    </a:p>
+                  </a:txBody>
+                  <a:tcPr/>
+                </a:tc>
+                <a:extLst>
+                  <a:ext uri="{0D108BD9-81ED-4DB2-BD59-A6C34878D82A}">
+                    <a16:rowId xmlns:a16="http://schemas.microsoft.com/office/drawing/2014/main" val="1648744592"/>
+                  </a:ext>
+                </a:extLst>
+              </a:tr>
+            </a:tbl>
+          </a:graphicData>
+        </a:graphic>
+      </p:graphicFrame>
+      <p:grpSp>
+        <p:nvGrpSpPr>
+          <p:cNvPr id="68" name="Group 67">
+            <a:extLst>
+              <a:ext uri="{FF2B5EF4-FFF2-40B4-BE49-F238E27FC236}">
+                <a16:creationId xmlns:a16="http://schemas.microsoft.com/office/drawing/2014/main" id="{84BE01A2-E850-E127-98AF-88203222A319}"/>
+              </a:ext>
+            </a:extLst>
+          </p:cNvPr>
+          <p:cNvGrpSpPr/>
+          <p:nvPr/>
+        </p:nvGrpSpPr>
+        <p:grpSpPr>
+          <a:xfrm rot="16200000">
+            <a:off x="2423147" y="1134714"/>
+            <a:ext cx="1108938" cy="1428300"/>
+            <a:chOff x="7293594" y="3429000"/>
+            <a:chExt cx="3228632" cy="1129747"/>
+          </a:xfrm>
+        </p:grpSpPr>
+        <p:cxnSp>
+          <p:nvCxnSpPr>
+            <p:cNvPr id="84" name="Straight Connector 83">
+              <a:extLst>
+                <a:ext uri="{FF2B5EF4-FFF2-40B4-BE49-F238E27FC236}">
+                  <a16:creationId xmlns:a16="http://schemas.microsoft.com/office/drawing/2014/main" id="{D27E9547-BB51-079D-83FE-E8618F2AAB98}"/>
+                </a:ext>
+              </a:extLst>
+            </p:cNvPr>
+            <p:cNvCxnSpPr>
+              <a:cxnSpLocks/>
+            </p:cNvCxnSpPr>
+            <p:nvPr/>
+          </p:nvCxnSpPr>
+          <p:spPr>
+            <a:xfrm>
+              <a:off x="10522226" y="3429000"/>
+              <a:ext cx="0" cy="1129747"/>
+            </a:xfrm>
+            <a:prstGeom prst="line">
+              <a:avLst/>
+            </a:prstGeom>
+          </p:spPr>
+          <p:style>
+            <a:lnRef idx="1">
+              <a:schemeClr val="accent1"/>
+            </a:lnRef>
+            <a:fillRef idx="0">
+              <a:schemeClr val="accent1"/>
+            </a:fillRef>
+            <a:effectRef idx="0">
+              <a:schemeClr val="accent1"/>
+            </a:effectRef>
+            <a:fontRef idx="minor">
+              <a:schemeClr val="tx1"/>
+            </a:fontRef>
+          </p:style>
+        </p:cxnSp>
+        <p:cxnSp>
+          <p:nvCxnSpPr>
+            <p:cNvPr id="85" name="Straight Connector 84">
+              <a:extLst>
+                <a:ext uri="{FF2B5EF4-FFF2-40B4-BE49-F238E27FC236}">
+                  <a16:creationId xmlns:a16="http://schemas.microsoft.com/office/drawing/2014/main" id="{786B0A75-9A0A-1157-5DEB-D43641E587D9}"/>
+                </a:ext>
+              </a:extLst>
+            </p:cNvPr>
+            <p:cNvCxnSpPr>
+              <a:cxnSpLocks/>
+            </p:cNvCxnSpPr>
+            <p:nvPr/>
+          </p:nvCxnSpPr>
+          <p:spPr>
+            <a:xfrm flipH="1">
+              <a:off x="7293594" y="4558747"/>
+              <a:ext cx="3228632" cy="0"/>
+            </a:xfrm>
+            <a:prstGeom prst="line">
+              <a:avLst/>
+            </a:prstGeom>
+          </p:spPr>
+          <p:style>
+            <a:lnRef idx="1">
+              <a:schemeClr val="accent1"/>
+            </a:lnRef>
+            <a:fillRef idx="0">
+              <a:schemeClr val="accent1"/>
+            </a:fillRef>
+            <a:effectRef idx="0">
+              <a:schemeClr val="accent1"/>
+            </a:effectRef>
+            <a:fontRef idx="minor">
+              <a:schemeClr val="tx1"/>
+            </a:fontRef>
+          </p:style>
+        </p:cxnSp>
+      </p:grpSp>
+      <p:sp>
+        <p:nvSpPr>
+          <p:cNvPr id="88" name="TextBox 87">
+            <a:extLst>
+              <a:ext uri="{FF2B5EF4-FFF2-40B4-BE49-F238E27FC236}">
+                <a16:creationId xmlns:a16="http://schemas.microsoft.com/office/drawing/2014/main" id="{52CB4D85-A77D-B5C8-D5C6-7B3C7EF8FD0B}"/>
+              </a:ext>
+            </a:extLst>
+          </p:cNvPr>
+          <p:cNvSpPr txBox="1"/>
+          <p:nvPr/>
+        </p:nvSpPr>
+        <p:spPr>
+          <a:xfrm flipH="1">
+            <a:off x="7828871" y="1922404"/>
+            <a:ext cx="347719" cy="307777"/>
+          </a:xfrm>
+          <a:prstGeom prst="rect">
+            <a:avLst/>
+          </a:prstGeom>
+          <a:noFill/>
+        </p:spPr>
+        <p:txBody>
+          <a:bodyPr wrap="square" rtlCol="0">
+            <a:spAutoFit/>
+          </a:bodyPr>
+          <a:lstStyle/>
+          <a:p>
+            <a:r>
+              <a:rPr lang="en-US" sz="1400" dirty="0"/>
+              <a:t>1</a:t>
+            </a:r>
+          </a:p>
+        </p:txBody>
+      </p:sp>
+      <p:sp>
+        <p:nvSpPr>
+          <p:cNvPr id="89" name="TextBox 88">
+            <a:extLst>
+              <a:ext uri="{FF2B5EF4-FFF2-40B4-BE49-F238E27FC236}">
+                <a16:creationId xmlns:a16="http://schemas.microsoft.com/office/drawing/2014/main" id="{C381E6ED-A538-646F-DE84-89512CFCAA86}"/>
+              </a:ext>
+            </a:extLst>
+          </p:cNvPr>
+          <p:cNvSpPr txBox="1"/>
+          <p:nvPr/>
+        </p:nvSpPr>
+        <p:spPr>
+          <a:xfrm flipH="1">
+            <a:off x="9610927" y="3541456"/>
+            <a:ext cx="347719" cy="307777"/>
+          </a:xfrm>
+          <a:prstGeom prst="rect">
+            <a:avLst/>
+          </a:prstGeom>
+          <a:noFill/>
+        </p:spPr>
+        <p:txBody>
+          <a:bodyPr wrap="square" rtlCol="0">
+            <a:spAutoFit/>
+          </a:bodyPr>
+          <a:lstStyle/>
+          <a:p>
+            <a:r>
+              <a:rPr lang="en-US" sz="1400" dirty="0"/>
+              <a:t>1</a:t>
+            </a:r>
+          </a:p>
+        </p:txBody>
+      </p:sp>
+      <p:sp>
+        <p:nvSpPr>
+          <p:cNvPr id="90" name="TextBox 89">
+            <a:extLst>
+              <a:ext uri="{FF2B5EF4-FFF2-40B4-BE49-F238E27FC236}">
+                <a16:creationId xmlns:a16="http://schemas.microsoft.com/office/drawing/2014/main" id="{9D4F7588-22DA-FB54-DCC6-FFBFBDECE820}"/>
+              </a:ext>
+            </a:extLst>
+          </p:cNvPr>
+          <p:cNvSpPr txBox="1"/>
+          <p:nvPr/>
+        </p:nvSpPr>
+        <p:spPr>
+          <a:xfrm flipH="1">
+            <a:off x="5777951" y="3623409"/>
+            <a:ext cx="347719" cy="307777"/>
+          </a:xfrm>
+          <a:prstGeom prst="rect">
+            <a:avLst/>
+          </a:prstGeom>
+          <a:noFill/>
+        </p:spPr>
+        <p:txBody>
+          <a:bodyPr wrap="square" rtlCol="0">
+            <a:spAutoFit/>
+          </a:bodyPr>
+          <a:lstStyle/>
+          <a:p>
+            <a:r>
+              <a:rPr lang="en-US" sz="1400" dirty="0"/>
+              <a:t>*</a:t>
+            </a:r>
+          </a:p>
+        </p:txBody>
+      </p:sp>
+      <p:cxnSp>
+        <p:nvCxnSpPr>
+          <p:cNvPr id="91" name="Straight Connector 90">
+            <a:extLst>
+              <a:ext uri="{FF2B5EF4-FFF2-40B4-BE49-F238E27FC236}">
+                <a16:creationId xmlns:a16="http://schemas.microsoft.com/office/drawing/2014/main" id="{8DC3795B-066C-66D4-92FB-BCC1AC47EA53}"/>
+              </a:ext>
+            </a:extLst>
+          </p:cNvPr>
+          <p:cNvCxnSpPr>
+            <a:cxnSpLocks/>
+          </p:cNvCxnSpPr>
+          <p:nvPr/>
+        </p:nvCxnSpPr>
+        <p:spPr>
+          <a:xfrm>
+            <a:off x="5762166" y="2432207"/>
+            <a:ext cx="246295" cy="0"/>
+          </a:xfrm>
+          <a:prstGeom prst="line">
+            <a:avLst/>
+          </a:prstGeom>
+        </p:spPr>
+        <p:style>
+          <a:lnRef idx="1">
+            <a:schemeClr val="accent1"/>
+          </a:lnRef>
+          <a:fillRef idx="0">
+            <a:schemeClr val="accent1"/>
+          </a:fillRef>
+          <a:effectRef idx="0">
+            <a:schemeClr val="accent1"/>
+          </a:effectRef>
+          <a:fontRef idx="minor">
+            <a:schemeClr val="tx1"/>
+          </a:fontRef>
+        </p:style>
+      </p:cxnSp>
+      <p:cxnSp>
+        <p:nvCxnSpPr>
+          <p:cNvPr id="5" name="Straight Connector 4">
+            <a:extLst>
+              <a:ext uri="{FF2B5EF4-FFF2-40B4-BE49-F238E27FC236}">
+                <a16:creationId xmlns:a16="http://schemas.microsoft.com/office/drawing/2014/main" id="{AC33541C-BE37-4486-1A26-8BE9425A10F0}"/>
+              </a:ext>
+            </a:extLst>
+          </p:cNvPr>
+          <p:cNvCxnSpPr/>
+          <p:nvPr/>
+        </p:nvCxnSpPr>
+        <p:spPr>
+          <a:xfrm>
+            <a:off x="4895456" y="1106005"/>
+            <a:ext cx="0" cy="1205333"/>
+          </a:xfrm>
+          <a:prstGeom prst="line">
+            <a:avLst/>
+          </a:prstGeom>
+        </p:spPr>
+        <p:style>
+          <a:lnRef idx="1">
+            <a:schemeClr val="accent1"/>
+          </a:lnRef>
+          <a:fillRef idx="0">
+            <a:schemeClr val="accent1"/>
+          </a:fillRef>
+          <a:effectRef idx="0">
+            <a:schemeClr val="accent1"/>
+          </a:effectRef>
+          <a:fontRef idx="minor">
+            <a:schemeClr val="tx1"/>
+          </a:fontRef>
+        </p:style>
+      </p:cxnSp>
+      <p:sp>
+        <p:nvSpPr>
+          <p:cNvPr id="92" name="TextBox 91">
+            <a:extLst>
+              <a:ext uri="{FF2B5EF4-FFF2-40B4-BE49-F238E27FC236}">
+                <a16:creationId xmlns:a16="http://schemas.microsoft.com/office/drawing/2014/main" id="{6CF0CC19-1EC3-2480-FB06-D809847E9B8B}"/>
+              </a:ext>
+            </a:extLst>
+          </p:cNvPr>
+          <p:cNvSpPr txBox="1"/>
+          <p:nvPr/>
+        </p:nvSpPr>
+        <p:spPr>
+          <a:xfrm>
+            <a:off x="6271695" y="1383135"/>
+            <a:ext cx="558105" cy="369332"/>
+          </a:xfrm>
+          <a:prstGeom prst="rect">
+            <a:avLst/>
+          </a:prstGeom>
+          <a:noFill/>
+        </p:spPr>
+        <p:txBody>
+          <a:bodyPr wrap="square" rtlCol="0">
+            <a:spAutoFit/>
+          </a:bodyPr>
+          <a:lstStyle/>
+          <a:p>
+            <a:r>
+              <a:rPr lang="en-US" dirty="0"/>
+              <a:t>*</a:t>
+            </a:r>
+          </a:p>
+        </p:txBody>
+      </p:sp>
     </p:spTree>
     <p:extLst>
       <p:ext uri="{BB962C8B-B14F-4D97-AF65-F5344CB8AC3E}">

</xml_diff>

<commit_message>
update diagram in Stock Management
</commit_message>
<xml_diff>
--- a/Restaurant Management System.pptx
+++ b/Restaurant Management System.pptx
@@ -6133,7 +6133,7 @@
           <p:nvPr>
             <p:extLst>
               <p:ext uri="{D42A27DB-BD31-4B8C-83A1-F6EECF244321}">
-                <p14:modId xmlns:p14="http://schemas.microsoft.com/office/powerpoint/2010/main" val="906783243"/>
+                <p14:modId xmlns:p14="http://schemas.microsoft.com/office/powerpoint/2010/main" val="1160519063"/>
               </p:ext>
             </p:extLst>
           </p:nvPr>
@@ -6184,28 +6184,34 @@
                     <a:bodyPr/>
                     <a:lstStyle/>
                     <a:p>
+                      <a:pPr marL="0" marR="0" lvl="0" indent="0" algn="l" defTabSz="914400" rtl="0" eaLnBrk="1" fontAlgn="auto" latinLnBrk="0" hangingPunct="1">
+                        <a:lnSpc>
+                          <a:spcPct val="100000"/>
+                        </a:lnSpc>
+                        <a:spcBef>
+                          <a:spcPts val="0"/>
+                        </a:spcBef>
+                        <a:spcAft>
+                          <a:spcPts val="0"/>
+                        </a:spcAft>
+                        <a:buClrTx/>
+                        <a:buSzTx/>
+                        <a:buFontTx/>
+                        <a:buNone/>
+                        <a:tabLst/>
+                        <a:defRPr/>
+                      </a:pPr>
+                      <a:r>
+                        <a:rPr lang="en-US" sz="1400" dirty="0"/>
+                        <a:t># price: number</a:t>
+                      </a:r>
+                    </a:p>
+                    <a:p>
                       <a:pPr marL="285750" indent="-285750">
                         <a:buFontTx/>
                         <a:buChar char="-"/>
                       </a:pPr>
-                      <a:r>
-                        <a:rPr lang="en-US" sz="1400" dirty="0"/>
-                        <a:t>quantity: number</a:t>
-                      </a:r>
-                    </a:p>
-                    <a:p>
-                      <a:pPr marL="285750" indent="-285750">
-                        <a:buFontTx/>
-                        <a:buChar char="-"/>
-                      </a:pPr>
-                      <a:r>
-                        <a:rPr lang="en-US" sz="1400" dirty="0" err="1"/>
-                        <a:t>categoryName</a:t>
-                      </a:r>
-                      <a:r>
-                        <a:rPr lang="en-US" sz="1400" dirty="0"/>
-                        <a:t>: string</a:t>
-                      </a:r>
+                      <a:endParaRPr lang="en-US" sz="1400" dirty="0"/>
                     </a:p>
                   </a:txBody>
                   <a:tcPr/>
@@ -6235,14 +6241,14 @@
           <p:nvPr>
             <p:extLst>
               <p:ext uri="{D42A27DB-BD31-4B8C-83A1-F6EECF244321}">
-                <p14:modId xmlns:p14="http://schemas.microsoft.com/office/powerpoint/2010/main" val="3161927108"/>
+                <p14:modId xmlns:p14="http://schemas.microsoft.com/office/powerpoint/2010/main" val="3383165783"/>
               </p:ext>
             </p:extLst>
           </p:nvPr>
         </p:nvGraphicFramePr>
         <p:xfrm>
           <a:off x="2348147" y="2652273"/>
-          <a:ext cx="1932305" cy="1025199"/>
+          <a:ext cx="1932305" cy="1029234"/>
         </p:xfrm>
         <a:graphic>
           <a:graphicData uri="http://schemas.openxmlformats.org/drawingml/2006/table">
@@ -6286,7 +6292,24 @@
                     <a:bodyPr/>
                     <a:lstStyle/>
                     <a:p>
-                      <a:endParaRPr lang="en-US" sz="1400" dirty="0"/>
+                      <a:pPr marL="285750" indent="-285750">
+                        <a:buFontTx/>
+                        <a:buChar char="-"/>
+                      </a:pPr>
+                      <a:r>
+                        <a:rPr lang="en-US" sz="1400" dirty="0"/>
+                        <a:t>drinks</a:t>
+                      </a:r>
+                    </a:p>
+                    <a:p>
+                      <a:pPr marL="285750" indent="-285750">
+                        <a:buFontTx/>
+                        <a:buChar char="-"/>
+                      </a:pPr>
+                      <a:r>
+                        <a:rPr lang="en-US" sz="1400" dirty="0"/>
+                        <a:t>wine</a:t>
+                      </a:r>
                     </a:p>
                   </a:txBody>
                   <a:tcPr/>
@@ -6738,14 +6761,14 @@
           <p:nvPr>
             <p:extLst>
               <p:ext uri="{D42A27DB-BD31-4B8C-83A1-F6EECF244321}">
-                <p14:modId xmlns:p14="http://schemas.microsoft.com/office/powerpoint/2010/main" val="2642440369"/>
+                <p14:modId xmlns:p14="http://schemas.microsoft.com/office/powerpoint/2010/main" val="2271651874"/>
               </p:ext>
             </p:extLst>
           </p:nvPr>
         </p:nvGraphicFramePr>
         <p:xfrm>
-          <a:off x="5208688" y="4697553"/>
-          <a:ext cx="2627155" cy="1158240"/>
+          <a:off x="5208689" y="4697554"/>
+          <a:ext cx="2596842" cy="1015977"/>
         </p:xfrm>
         <a:graphic>
           <a:graphicData uri="http://schemas.openxmlformats.org/drawingml/2006/table">
@@ -6754,7 +6777,7 @@
                 <a:tableStyleId>{5C22544A-7EE6-4342-B048-85BDC9FD1C3A}</a:tableStyleId>
               </a:tblPr>
               <a:tblGrid>
-                <a:gridCol w="2627155">
+                <a:gridCol w="2596842">
                   <a:extLst>
                     <a:ext uri="{9D8B030D-6E8A-4147-A177-3AD203B41FA5}">
                       <a16:colId xmlns:a16="http://schemas.microsoft.com/office/drawing/2014/main" val="1419940822"/>
@@ -6762,7 +6785,7 @@
                   </a:extLst>
                 </a:gridCol>
               </a:tblGrid>
-              <a:tr h="369291">
+              <a:tr h="516317">
                 <a:tc>
                   <a:txBody>
                     <a:bodyPr/>
@@ -6790,7 +6813,7 @@
                   </a:ext>
                 </a:extLst>
               </a:tr>
-              <a:tr h="499593">
+              <a:tr h="497817">
                 <a:tc>
                   <a:txBody>
                     <a:bodyPr/>
@@ -6799,12 +6822,6 @@
                       <a:r>
                         <a:rPr lang="en-US" sz="1200" dirty="0"/>
                         <a:t># name: string</a:t>
-                      </a:r>
-                    </a:p>
-                    <a:p>
-                      <a:r>
-                        <a:rPr lang="en-US" sz="1200" dirty="0"/>
-                        <a:t># price: number</a:t>
                       </a:r>
                     </a:p>
                     <a:p>
@@ -6952,9 +6969,9 @@
           <p:nvPr/>
         </p:nvCxnSpPr>
         <p:spPr>
-          <a:xfrm>
-            <a:off x="8706674" y="3651843"/>
-            <a:ext cx="0" cy="1651334"/>
+          <a:xfrm flipH="1">
+            <a:off x="8706674" y="3677472"/>
+            <a:ext cx="1" cy="1625705"/>
           </a:xfrm>
           <a:prstGeom prst="line">
             <a:avLst/>
@@ -6990,14 +7007,14 @@
           <p:nvPr>
             <p:extLst>
               <p:ext uri="{D42A27DB-BD31-4B8C-83A1-F6EECF244321}">
-                <p14:modId xmlns:p14="http://schemas.microsoft.com/office/powerpoint/2010/main" val="2374029796"/>
+                <p14:modId xmlns:p14="http://schemas.microsoft.com/office/powerpoint/2010/main" val="2485479633"/>
               </p:ext>
             </p:extLst>
           </p:nvPr>
         </p:nvGraphicFramePr>
         <p:xfrm>
           <a:off x="1077317" y="107129"/>
-          <a:ext cx="2153398" cy="1889760"/>
+          <a:ext cx="2089953" cy="1889760"/>
         </p:xfrm>
         <a:graphic>
           <a:graphicData uri="http://schemas.openxmlformats.org/drawingml/2006/table">
@@ -7006,7 +7023,7 @@
                 <a:tableStyleId>{5C22544A-7EE6-4342-B048-85BDC9FD1C3A}</a:tableStyleId>
               </a:tblPr>
               <a:tblGrid>
-                <a:gridCol w="2153398">
+                <a:gridCol w="2089953">
                   <a:extLst>
                     <a:ext uri="{9D8B030D-6E8A-4147-A177-3AD203B41FA5}">
                       <a16:colId xmlns:a16="http://schemas.microsoft.com/office/drawing/2014/main" val="1419940822"/>
@@ -7014,7 +7031,7 @@
                   </a:extLst>
                 </a:gridCol>
               </a:tblGrid>
-              <a:tr h="419489">
+              <a:tr h="504774">
                 <a:tc>
                   <a:txBody>
                     <a:bodyPr/>
@@ -7051,7 +7068,7 @@
                   </a:ext>
                 </a:extLst>
               </a:tr>
-              <a:tr h="528906">
+              <a:tr h="1336167">
                 <a:tc>
                   <a:txBody>
                     <a:bodyPr/>
@@ -7071,7 +7088,7 @@
                     <a:p>
                       <a:r>
                         <a:rPr lang="en-US" sz="1200" dirty="0"/>
-                        <a:t>BACHUS,</a:t>
+                        <a:t>BACCHUS,</a:t>
                       </a:r>
                     </a:p>
                     <a:p>
@@ -7089,7 +7106,7 @@
                     <a:p>
                       <a:r>
                         <a:rPr lang="en-US" sz="1200" dirty="0"/>
-                        <a:t>CAFÉ MEAL</a:t>
+                        <a:t>CAFÉ</a:t>
                       </a:r>
                     </a:p>
                     <a:p>
@@ -7123,14 +7140,14 @@
           <p:nvPr>
             <p:extLst>
               <p:ext uri="{D42A27DB-BD31-4B8C-83A1-F6EECF244321}">
-                <p14:modId xmlns:p14="http://schemas.microsoft.com/office/powerpoint/2010/main" val="1512248214"/>
+                <p14:modId xmlns:p14="http://schemas.microsoft.com/office/powerpoint/2010/main" val="977632256"/>
               </p:ext>
             </p:extLst>
           </p:nvPr>
         </p:nvGraphicFramePr>
         <p:xfrm>
-          <a:off x="862706" y="2620968"/>
-          <a:ext cx="1032138" cy="921891"/>
+          <a:off x="436339" y="2620968"/>
+          <a:ext cx="1458506" cy="921891"/>
         </p:xfrm>
         <a:graphic>
           <a:graphicData uri="http://schemas.openxmlformats.org/drawingml/2006/table">
@@ -7139,7 +7156,7 @@
                 <a:tableStyleId>{5C22544A-7EE6-4342-B048-85BDC9FD1C3A}</a:tableStyleId>
               </a:tblPr>
               <a:tblGrid>
-                <a:gridCol w="1032138">
+                <a:gridCol w="1458506">
                   <a:extLst>
                     <a:ext uri="{9D8B030D-6E8A-4147-A177-3AD203B41FA5}">
                       <a16:colId xmlns:a16="http://schemas.microsoft.com/office/drawing/2014/main" val="1419940822"/>
@@ -7174,7 +7191,10 @@
                     <a:bodyPr/>
                     <a:lstStyle/>
                     <a:p>
-                      <a:endParaRPr lang="en-US" sz="1400" dirty="0"/>
+                      <a:r>
+                        <a:rPr lang="en-US" sz="1400" dirty="0"/>
+                        <a:t>#price:number</a:t>
+                      </a:r>
                     </a:p>
                   </a:txBody>
                   <a:tcPr/>
@@ -7204,14 +7224,14 @@
           <p:nvPr>
             <p:extLst>
               <p:ext uri="{D42A27DB-BD31-4B8C-83A1-F6EECF244321}">
-                <p14:modId xmlns:p14="http://schemas.microsoft.com/office/powerpoint/2010/main" val="204017347"/>
+                <p14:modId xmlns:p14="http://schemas.microsoft.com/office/powerpoint/2010/main" val="3859020925"/>
               </p:ext>
             </p:extLst>
           </p:nvPr>
         </p:nvGraphicFramePr>
         <p:xfrm>
-          <a:off x="862706" y="4125928"/>
-          <a:ext cx="1006289" cy="1023051"/>
+          <a:off x="436340" y="4125928"/>
+          <a:ext cx="1432656" cy="1023051"/>
         </p:xfrm>
         <a:graphic>
           <a:graphicData uri="http://schemas.openxmlformats.org/drawingml/2006/table">
@@ -7220,7 +7240,7 @@
                 <a:tableStyleId>{5C22544A-7EE6-4342-B048-85BDC9FD1C3A}</a:tableStyleId>
               </a:tblPr>
               <a:tblGrid>
-                <a:gridCol w="1006289">
+                <a:gridCol w="1432656">
                   <a:extLst>
                     <a:ext uri="{9D8B030D-6E8A-4147-A177-3AD203B41FA5}">
                       <a16:colId xmlns:a16="http://schemas.microsoft.com/office/drawing/2014/main" val="1419940822"/>
@@ -7255,7 +7275,10 @@
                     <a:bodyPr/>
                     <a:lstStyle/>
                     <a:p>
-                      <a:endParaRPr lang="en-US" sz="1400" dirty="0"/>
+                      <a:r>
+                        <a:rPr lang="en-US" sz="1400" dirty="0"/>
+                        <a:t>#price:number</a:t>
+                      </a:r>
                     </a:p>
                   </a:txBody>
                   <a:tcPr/>
@@ -7507,14 +7530,14 @@
           <p:nvPr>
             <p:extLst>
               <p:ext uri="{D42A27DB-BD31-4B8C-83A1-F6EECF244321}">
-                <p14:modId xmlns:p14="http://schemas.microsoft.com/office/powerpoint/2010/main" val="1883588419"/>
+                <p14:modId xmlns:p14="http://schemas.microsoft.com/office/powerpoint/2010/main" val="284348385"/>
               </p:ext>
             </p:extLst>
           </p:nvPr>
         </p:nvGraphicFramePr>
         <p:xfrm>
           <a:off x="5504316" y="3147074"/>
-          <a:ext cx="1932305" cy="1025199"/>
+          <a:ext cx="1932305" cy="1029234"/>
         </p:xfrm>
         <a:graphic>
           <a:graphicData uri="http://schemas.openxmlformats.org/drawingml/2006/table">
@@ -7558,6 +7581,29 @@
                     <a:bodyPr/>
                     <a:lstStyle/>
                     <a:p>
+                      <a:pPr marL="0" marR="0" lvl="0" indent="0" algn="l" defTabSz="914400" rtl="0" eaLnBrk="1" fontAlgn="auto" latinLnBrk="0" hangingPunct="1">
+                        <a:lnSpc>
+                          <a:spcPct val="100000"/>
+                        </a:lnSpc>
+                        <a:spcBef>
+                          <a:spcPts val="0"/>
+                        </a:spcBef>
+                        <a:spcAft>
+                          <a:spcPts val="0"/>
+                        </a:spcAft>
+                        <a:buClrTx/>
+                        <a:buSzTx/>
+                        <a:buFontTx/>
+                        <a:buNone/>
+                        <a:tabLst/>
+                        <a:defRPr/>
+                      </a:pPr>
+                      <a:r>
+                        <a:rPr lang="en-US" sz="1400" dirty="0"/>
+                        <a:t># price: number</a:t>
+                      </a:r>
+                    </a:p>
+                    <a:p>
                       <a:endParaRPr lang="en-US" sz="1400" dirty="0"/>
                     </a:p>
                   </a:txBody>
@@ -7589,7 +7635,7 @@
         </p:nvCxnSpPr>
         <p:spPr>
           <a:xfrm>
-            <a:off x="1378775" y="1991284"/>
+            <a:off x="1378775" y="1964780"/>
             <a:ext cx="0" cy="687163"/>
           </a:xfrm>
           <a:prstGeom prst="line">
@@ -7953,6 +7999,324 @@
           <a:xfrm flipH="1">
             <a:off x="1855650" y="4359127"/>
             <a:ext cx="718681" cy="0"/>
+          </a:xfrm>
+          <a:prstGeom prst="line">
+            <a:avLst/>
+          </a:prstGeom>
+        </p:spPr>
+        <p:style>
+          <a:lnRef idx="1">
+            <a:schemeClr val="accent1"/>
+          </a:lnRef>
+          <a:fillRef idx="0">
+            <a:schemeClr val="accent1"/>
+          </a:fillRef>
+          <a:effectRef idx="0">
+            <a:schemeClr val="accent1"/>
+          </a:effectRef>
+          <a:fontRef idx="minor">
+            <a:schemeClr val="tx1"/>
+          </a:fontRef>
+        </p:style>
+      </p:cxnSp>
+      <p:graphicFrame>
+        <p:nvGraphicFramePr>
+          <p:cNvPr id="47" name="Table 46">
+            <a:extLst>
+              <a:ext uri="{FF2B5EF4-FFF2-40B4-BE49-F238E27FC236}">
+                <a16:creationId xmlns:a16="http://schemas.microsoft.com/office/drawing/2014/main" id="{83B386CE-4112-6B3B-8E6A-3A42A7B22866}"/>
+              </a:ext>
+            </a:extLst>
+          </p:cNvPr>
+          <p:cNvGraphicFramePr>
+            <a:graphicFrameLocks noGrp="1"/>
+          </p:cNvGraphicFramePr>
+          <p:nvPr>
+            <p:extLst>
+              <p:ext uri="{D42A27DB-BD31-4B8C-83A1-F6EECF244321}">
+                <p14:modId xmlns:p14="http://schemas.microsoft.com/office/powerpoint/2010/main" val="1147361775"/>
+              </p:ext>
+            </p:extLst>
+          </p:nvPr>
+        </p:nvGraphicFramePr>
+        <p:xfrm>
+          <a:off x="401277" y="5589851"/>
+          <a:ext cx="1758827" cy="1233567"/>
+        </p:xfrm>
+        <a:graphic>
+          <a:graphicData uri="http://schemas.openxmlformats.org/drawingml/2006/table">
+            <a:tbl>
+              <a:tblPr firstRow="1" bandRow="1">
+                <a:tableStyleId>{5C22544A-7EE6-4342-B048-85BDC9FD1C3A}</a:tableStyleId>
+              </a:tblPr>
+              <a:tblGrid>
+                <a:gridCol w="1758827">
+                  <a:extLst>
+                    <a:ext uri="{9D8B030D-6E8A-4147-A177-3AD203B41FA5}">
+                      <a16:colId xmlns:a16="http://schemas.microsoft.com/office/drawing/2014/main" val="1419940822"/>
+                    </a:ext>
+                  </a:extLst>
+                </a:gridCol>
+              </a:tblGrid>
+              <a:tr h="506359">
+                <a:tc>
+                  <a:txBody>
+                    <a:bodyPr/>
+                    <a:lstStyle/>
+                    <a:p>
+                      <a:pPr algn="ctr"/>
+                      <a:r>
+                        <a:rPr lang="en-US" sz="1400" b="0" dirty="0"/>
+                        <a:t>&lt;</a:t>
+                      </a:r>
+                      <a:r>
+                        <a:rPr lang="en-US" sz="1400" b="0" dirty="0" err="1"/>
+                        <a:t>enum</a:t>
+                      </a:r>
+                      <a:r>
+                        <a:rPr lang="en-US" sz="1400" b="0" dirty="0"/>
+                        <a:t>&gt;</a:t>
+                      </a:r>
+                    </a:p>
+                    <a:p>
+                      <a:pPr algn="ctr"/>
+                      <a:r>
+                        <a:rPr lang="en-US" sz="1400" b="0" dirty="0" err="1"/>
+                        <a:t>WineCategory</a:t>
+                      </a:r>
+                      <a:endParaRPr lang="en-US" sz="1400" b="0" dirty="0"/>
+                    </a:p>
+                  </a:txBody>
+                  <a:tcPr/>
+                </a:tc>
+                <a:extLst>
+                  <a:ext uri="{0D108BD9-81ED-4DB2-BD59-A6C34878D82A}">
+                    <a16:rowId xmlns:a16="http://schemas.microsoft.com/office/drawing/2014/main" val="1122576610"/>
+                  </a:ext>
+                </a:extLst>
+              </a:tr>
+              <a:tr h="715407">
+                <a:tc>
+                  <a:txBody>
+                    <a:bodyPr/>
+                    <a:lstStyle/>
+                    <a:p>
+                      <a:r>
+                        <a:rPr lang="en-US" sz="1200" dirty="0"/>
+                        <a:t>GRAPE WINE,</a:t>
+                      </a:r>
+                    </a:p>
+                    <a:p>
+                      <a:r>
+                        <a:rPr lang="en-US" sz="1200" dirty="0"/>
+                        <a:t>ROYAL WINE,</a:t>
+                      </a:r>
+                    </a:p>
+                  </a:txBody>
+                  <a:tcPr/>
+                </a:tc>
+                <a:extLst>
+                  <a:ext uri="{0D108BD9-81ED-4DB2-BD59-A6C34878D82A}">
+                    <a16:rowId xmlns:a16="http://schemas.microsoft.com/office/drawing/2014/main" val="1648744592"/>
+                  </a:ext>
+                </a:extLst>
+              </a:tr>
+            </a:tbl>
+          </a:graphicData>
+        </a:graphic>
+      </p:graphicFrame>
+      <p:cxnSp>
+        <p:nvCxnSpPr>
+          <p:cNvPr id="49" name="Straight Connector 48">
+            <a:extLst>
+              <a:ext uri="{FF2B5EF4-FFF2-40B4-BE49-F238E27FC236}">
+                <a16:creationId xmlns:a16="http://schemas.microsoft.com/office/drawing/2014/main" id="{233CC39F-246A-B797-4115-0A88BE2D6F89}"/>
+              </a:ext>
+            </a:extLst>
+          </p:cNvPr>
+          <p:cNvCxnSpPr>
+            <a:cxnSpLocks/>
+          </p:cNvCxnSpPr>
+          <p:nvPr/>
+        </p:nvCxnSpPr>
+        <p:spPr>
+          <a:xfrm>
+            <a:off x="1165592" y="5148979"/>
+            <a:ext cx="0" cy="564552"/>
+          </a:xfrm>
+          <a:prstGeom prst="line">
+            <a:avLst/>
+          </a:prstGeom>
+        </p:spPr>
+        <p:style>
+          <a:lnRef idx="1">
+            <a:schemeClr val="accent1"/>
+          </a:lnRef>
+          <a:fillRef idx="0">
+            <a:schemeClr val="accent1"/>
+          </a:fillRef>
+          <a:effectRef idx="0">
+            <a:schemeClr val="accent1"/>
+          </a:effectRef>
+          <a:fontRef idx="minor">
+            <a:schemeClr val="tx1"/>
+          </a:fontRef>
+        </p:style>
+      </p:cxnSp>
+      <p:graphicFrame>
+        <p:nvGraphicFramePr>
+          <p:cNvPr id="50" name="Table 49">
+            <a:extLst>
+              <a:ext uri="{FF2B5EF4-FFF2-40B4-BE49-F238E27FC236}">
+                <a16:creationId xmlns:a16="http://schemas.microsoft.com/office/drawing/2014/main" id="{8876D33E-1A2C-CB01-8907-87EF7632EBC3}"/>
+              </a:ext>
+            </a:extLst>
+          </p:cNvPr>
+          <p:cNvGraphicFramePr>
+            <a:graphicFrameLocks noGrp="1"/>
+          </p:cNvGraphicFramePr>
+          <p:nvPr>
+            <p:extLst>
+              <p:ext uri="{D42A27DB-BD31-4B8C-83A1-F6EECF244321}">
+                <p14:modId xmlns:p14="http://schemas.microsoft.com/office/powerpoint/2010/main" val="4236236425"/>
+              </p:ext>
+            </p:extLst>
+          </p:nvPr>
+        </p:nvGraphicFramePr>
+        <p:xfrm>
+          <a:off x="9095289" y="3936278"/>
+          <a:ext cx="1758827" cy="1889760"/>
+        </p:xfrm>
+        <a:graphic>
+          <a:graphicData uri="http://schemas.openxmlformats.org/drawingml/2006/table">
+            <a:tbl>
+              <a:tblPr firstRow="1" bandRow="1">
+                <a:tableStyleId>{5C22544A-7EE6-4342-B048-85BDC9FD1C3A}</a:tableStyleId>
+              </a:tblPr>
+              <a:tblGrid>
+                <a:gridCol w="1758827">
+                  <a:extLst>
+                    <a:ext uri="{9D8B030D-6E8A-4147-A177-3AD203B41FA5}">
+                      <a16:colId xmlns:a16="http://schemas.microsoft.com/office/drawing/2014/main" val="1419940822"/>
+                    </a:ext>
+                  </a:extLst>
+                </a:gridCol>
+              </a:tblGrid>
+              <a:tr h="506359">
+                <a:tc>
+                  <a:txBody>
+                    <a:bodyPr/>
+                    <a:lstStyle/>
+                    <a:p>
+                      <a:pPr algn="ctr"/>
+                      <a:r>
+                        <a:rPr lang="en-US" sz="1400" b="0" dirty="0"/>
+                        <a:t>&lt;</a:t>
+                      </a:r>
+                      <a:r>
+                        <a:rPr lang="en-US" sz="1400" b="0" dirty="0" err="1"/>
+                        <a:t>enum</a:t>
+                      </a:r>
+                      <a:r>
+                        <a:rPr lang="en-US" sz="1400" b="0" dirty="0"/>
+                        <a:t>&gt;</a:t>
+                      </a:r>
+                    </a:p>
+                    <a:p>
+                      <a:pPr algn="ctr"/>
+                      <a:r>
+                        <a:rPr lang="en-US" sz="1400" b="0" dirty="0" err="1"/>
+                        <a:t>FoodCategory</a:t>
+                      </a:r>
+                      <a:endParaRPr lang="en-US" sz="1400" b="0" dirty="0"/>
+                    </a:p>
+                  </a:txBody>
+                  <a:tcPr/>
+                </a:tc>
+                <a:extLst>
+                  <a:ext uri="{0D108BD9-81ED-4DB2-BD59-A6C34878D82A}">
+                    <a16:rowId xmlns:a16="http://schemas.microsoft.com/office/drawing/2014/main" val="1122576610"/>
+                  </a:ext>
+                </a:extLst>
+              </a:tr>
+              <a:tr h="715407">
+                <a:tc>
+                  <a:txBody>
+                    <a:bodyPr/>
+                    <a:lstStyle/>
+                    <a:p>
+                      <a:r>
+                        <a:rPr lang="en-US" sz="1200" dirty="0"/>
+                        <a:t>LOK LAK,</a:t>
+                      </a:r>
+                    </a:p>
+                    <a:p>
+                      <a:r>
+                        <a:rPr lang="en-US" sz="1200" dirty="0"/>
+                        <a:t>AMOK,</a:t>
+                      </a:r>
+                    </a:p>
+                    <a:p>
+                      <a:r>
+                        <a:rPr lang="en-US" sz="1200" dirty="0"/>
+                        <a:t>PORK AND RICE</a:t>
+                      </a:r>
+                    </a:p>
+                    <a:p>
+                      <a:r>
+                        <a:rPr lang="en-US" sz="1200" dirty="0"/>
+                        <a:t>CHECKEN RED CURRY</a:t>
+                      </a:r>
+                    </a:p>
+                    <a:p>
+                      <a:r>
+                        <a:rPr lang="en-US" sz="1200" dirty="0"/>
+                        <a:t>PRAHOK KTIS</a:t>
+                      </a:r>
+                    </a:p>
+                    <a:p>
+                      <a:r>
+                        <a:rPr lang="en-US" sz="1200" dirty="0"/>
+                        <a:t>NOM BANH CHOK</a:t>
+                      </a:r>
+                    </a:p>
+                    <a:p>
+                      <a:r>
+                        <a:rPr lang="en-US" sz="1200" dirty="0"/>
+                        <a:t>SOMLOR KORKO</a:t>
+                      </a:r>
+                    </a:p>
+                  </a:txBody>
+                  <a:tcPr/>
+                </a:tc>
+                <a:extLst>
+                  <a:ext uri="{0D108BD9-81ED-4DB2-BD59-A6C34878D82A}">
+                    <a16:rowId xmlns:a16="http://schemas.microsoft.com/office/drawing/2014/main" val="1648744592"/>
+                  </a:ext>
+                </a:extLst>
+              </a:tr>
+            </a:tbl>
+          </a:graphicData>
+        </a:graphic>
+      </p:graphicFrame>
+      <p:cxnSp>
+        <p:nvCxnSpPr>
+          <p:cNvPr id="7" name="Straight Connector 6">
+            <a:extLst>
+              <a:ext uri="{FF2B5EF4-FFF2-40B4-BE49-F238E27FC236}">
+                <a16:creationId xmlns:a16="http://schemas.microsoft.com/office/drawing/2014/main" id="{D8098584-22B7-FB38-30DB-323B541EB530}"/>
+              </a:ext>
+            </a:extLst>
+          </p:cNvPr>
+          <p:cNvCxnSpPr>
+            <a:endCxn id="50" idx="0"/>
+          </p:cNvCxnSpPr>
+          <p:nvPr/>
+        </p:nvCxnSpPr>
+        <p:spPr>
+          <a:xfrm>
+            <a:off x="9974702" y="3677472"/>
+            <a:ext cx="0" cy="258806"/>
           </a:xfrm>
           <a:prstGeom prst="line">
             <a:avLst/>

</xml_diff>